<commit_message>
Slide about advantages and disadvantages for all scheduler
</commit_message>
<xml_diff>
--- a/ppt/presentation.pptx
+++ b/ppt/presentation.pptx
@@ -6,11 +6,14 @@
   </p:sldMasterIdLst>
   <p:sldIdLst>
     <p:sldId id="257" r:id="rId2"/>
-    <p:sldId id="262" r:id="rId3"/>
-    <p:sldId id="261" r:id="rId4"/>
-    <p:sldId id="260" r:id="rId5"/>
-    <p:sldId id="258" r:id="rId6"/>
-    <p:sldId id="259" r:id="rId7"/>
+    <p:sldId id="266" r:id="rId3"/>
+    <p:sldId id="262" r:id="rId4"/>
+    <p:sldId id="264" r:id="rId5"/>
+    <p:sldId id="265" r:id="rId6"/>
+    <p:sldId id="261" r:id="rId7"/>
+    <p:sldId id="260" r:id="rId8"/>
+    <p:sldId id="258" r:id="rId9"/>
+    <p:sldId id="259" r:id="rId10"/>
   </p:sldIdLst>
   <p:sldSz cx="9144000" cy="6858000" type="screen4x3"/>
   <p:notesSz cx="6858000" cy="9144000"/>
@@ -300,7 +303,7 @@
           <a:p>
             <a:fld id="{02B29D59-80A7-42AB-BA98-B46C05CBCD2D}" type="datetimeFigureOut">
               <a:rPr lang="fr-FR" smtClean="0"/>
-              <a:t>12/11/13</a:t>
+              <a:t>18/11/2013</a:t>
             </a:fld>
             <a:endParaRPr lang="fr-FR"/>
           </a:p>
@@ -342,7 +345,7 @@
           <a:p>
             <a:fld id="{F02C3570-90AD-431D-9871-FE88EA036DFC}" type="slidenum">
               <a:rPr lang="fr-FR" smtClean="0"/>
-              <a:t>‹#›</a:t>
+              <a:t>‹N°›</a:t>
             </a:fld>
             <a:endParaRPr lang="fr-FR"/>
           </a:p>
@@ -500,7 +503,7 @@
           <a:p>
             <a:fld id="{02B29D59-80A7-42AB-BA98-B46C05CBCD2D}" type="datetimeFigureOut">
               <a:rPr lang="fr-FR" smtClean="0"/>
-              <a:t>12/11/13</a:t>
+              <a:t>18/11/2013</a:t>
             </a:fld>
             <a:endParaRPr lang="fr-FR"/>
           </a:p>
@@ -542,7 +545,7 @@
           <a:p>
             <a:fld id="{F02C3570-90AD-431D-9871-FE88EA036DFC}" type="slidenum">
               <a:rPr lang="fr-FR" smtClean="0"/>
-              <a:t>‹#›</a:t>
+              <a:t>‹N°›</a:t>
             </a:fld>
             <a:endParaRPr lang="fr-FR"/>
           </a:p>
@@ -675,7 +678,7 @@
           <a:p>
             <a:fld id="{02B29D59-80A7-42AB-BA98-B46C05CBCD2D}" type="datetimeFigureOut">
               <a:rPr lang="fr-FR" smtClean="0"/>
-              <a:t>12/11/13</a:t>
+              <a:t>18/11/2013</a:t>
             </a:fld>
             <a:endParaRPr lang="fr-FR"/>
           </a:p>
@@ -717,7 +720,7 @@
           <a:p>
             <a:fld id="{F02C3570-90AD-431D-9871-FE88EA036DFC}" type="slidenum">
               <a:rPr lang="fr-FR" smtClean="0"/>
-              <a:t>‹#›</a:t>
+              <a:t>‹N°›</a:t>
             </a:fld>
             <a:endParaRPr lang="fr-FR"/>
           </a:p>
@@ -840,7 +843,7 @@
           <a:p>
             <a:fld id="{02B29D59-80A7-42AB-BA98-B46C05CBCD2D}" type="datetimeFigureOut">
               <a:rPr lang="fr-FR" smtClean="0"/>
-              <a:t>12/11/13</a:t>
+              <a:t>18/11/2013</a:t>
             </a:fld>
             <a:endParaRPr lang="fr-FR"/>
           </a:p>
@@ -882,7 +885,7 @@
           <a:p>
             <a:fld id="{F02C3570-90AD-431D-9871-FE88EA036DFC}" type="slidenum">
               <a:rPr lang="fr-FR" smtClean="0"/>
-              <a:t>‹#›</a:t>
+              <a:t>‹N°›</a:t>
             </a:fld>
             <a:endParaRPr lang="fr-FR"/>
           </a:p>
@@ -1088,7 +1091,7 @@
           <a:p>
             <a:fld id="{02B29D59-80A7-42AB-BA98-B46C05CBCD2D}" type="datetimeFigureOut">
               <a:rPr lang="fr-FR" smtClean="0"/>
-              <a:t>12/11/13</a:t>
+              <a:t>18/11/2013</a:t>
             </a:fld>
             <a:endParaRPr lang="fr-FR"/>
           </a:p>
@@ -1130,7 +1133,7 @@
           <a:p>
             <a:fld id="{F02C3570-90AD-431D-9871-FE88EA036DFC}" type="slidenum">
               <a:rPr lang="fr-FR" smtClean="0"/>
-              <a:t>‹#›</a:t>
+              <a:t>‹N°›</a:t>
             </a:fld>
             <a:endParaRPr lang="fr-FR"/>
           </a:p>
@@ -1406,7 +1409,7 @@
           <a:p>
             <a:fld id="{02B29D59-80A7-42AB-BA98-B46C05CBCD2D}" type="datetimeFigureOut">
               <a:rPr lang="fr-FR" smtClean="0"/>
-              <a:t>12/11/13</a:t>
+              <a:t>18/11/2013</a:t>
             </a:fld>
             <a:endParaRPr lang="fr-FR"/>
           </a:p>
@@ -1448,7 +1451,7 @@
           <a:p>
             <a:fld id="{F02C3570-90AD-431D-9871-FE88EA036DFC}" type="slidenum">
               <a:rPr lang="fr-FR" smtClean="0"/>
-              <a:t>‹#›</a:t>
+              <a:t>‹N°›</a:t>
             </a:fld>
             <a:endParaRPr lang="fr-FR"/>
           </a:p>
@@ -1872,7 +1875,7 @@
           <a:p>
             <a:fld id="{02B29D59-80A7-42AB-BA98-B46C05CBCD2D}" type="datetimeFigureOut">
               <a:rPr lang="fr-FR" smtClean="0"/>
-              <a:t>12/11/13</a:t>
+              <a:t>18/11/2013</a:t>
             </a:fld>
             <a:endParaRPr lang="fr-FR"/>
           </a:p>
@@ -1914,7 +1917,7 @@
           <a:p>
             <a:fld id="{F02C3570-90AD-431D-9871-FE88EA036DFC}" type="slidenum">
               <a:rPr lang="fr-FR" smtClean="0"/>
-              <a:t>‹#›</a:t>
+              <a:t>‹N°›</a:t>
             </a:fld>
             <a:endParaRPr lang="fr-FR"/>
           </a:p>
@@ -2020,7 +2023,7 @@
           <a:p>
             <a:fld id="{02B29D59-80A7-42AB-BA98-B46C05CBCD2D}" type="datetimeFigureOut">
               <a:rPr lang="fr-FR" smtClean="0"/>
-              <a:t>12/11/13</a:t>
+              <a:t>18/11/2013</a:t>
             </a:fld>
             <a:endParaRPr lang="fr-FR"/>
           </a:p>
@@ -2062,7 +2065,7 @@
           <a:p>
             <a:fld id="{F02C3570-90AD-431D-9871-FE88EA036DFC}" type="slidenum">
               <a:rPr lang="fr-FR" smtClean="0"/>
-              <a:t>‹#›</a:t>
+              <a:t>‹N°›</a:t>
             </a:fld>
             <a:endParaRPr lang="fr-FR"/>
           </a:p>
@@ -2110,7 +2113,7 @@
           <a:p>
             <a:fld id="{02B29D59-80A7-42AB-BA98-B46C05CBCD2D}" type="datetimeFigureOut">
               <a:rPr lang="fr-FR" smtClean="0"/>
-              <a:t>12/11/13</a:t>
+              <a:t>18/11/2013</a:t>
             </a:fld>
             <a:endParaRPr lang="fr-FR"/>
           </a:p>
@@ -2152,7 +2155,7 @@
           <a:p>
             <a:fld id="{F02C3570-90AD-431D-9871-FE88EA036DFC}" type="slidenum">
               <a:rPr lang="fr-FR" smtClean="0"/>
-              <a:t>‹#›</a:t>
+              <a:t>‹N°›</a:t>
             </a:fld>
             <a:endParaRPr lang="fr-FR"/>
           </a:p>
@@ -2384,7 +2387,7 @@
           <a:p>
             <a:fld id="{02B29D59-80A7-42AB-BA98-B46C05CBCD2D}" type="datetimeFigureOut">
               <a:rPr lang="fr-FR" smtClean="0"/>
-              <a:t>12/11/13</a:t>
+              <a:t>18/11/2013</a:t>
             </a:fld>
             <a:endParaRPr lang="fr-FR"/>
           </a:p>
@@ -2426,7 +2429,7 @@
           <a:p>
             <a:fld id="{F02C3570-90AD-431D-9871-FE88EA036DFC}" type="slidenum">
               <a:rPr lang="fr-FR" smtClean="0"/>
-              <a:t>‹#›</a:t>
+              <a:t>‹N°›</a:t>
             </a:fld>
             <a:endParaRPr lang="fr-FR"/>
           </a:p>
@@ -2689,7 +2692,7 @@
           <a:p>
             <a:fld id="{02B29D59-80A7-42AB-BA98-B46C05CBCD2D}" type="datetimeFigureOut">
               <a:rPr lang="fr-FR" smtClean="0"/>
-              <a:t>12/11/13</a:t>
+              <a:t>18/11/2013</a:t>
             </a:fld>
             <a:endParaRPr lang="fr-FR"/>
           </a:p>
@@ -2731,7 +2734,7 @@
           <a:p>
             <a:fld id="{F02C3570-90AD-431D-9871-FE88EA036DFC}" type="slidenum">
               <a:rPr lang="fr-FR" smtClean="0"/>
-              <a:t>‹#›</a:t>
+              <a:t>‹N°›</a:t>
             </a:fld>
             <a:endParaRPr lang="fr-FR"/>
           </a:p>
@@ -2987,7 +2990,7 @@
           <a:p>
             <a:fld id="{02B29D59-80A7-42AB-BA98-B46C05CBCD2D}" type="datetimeFigureOut">
               <a:rPr lang="fr-FR" smtClean="0"/>
-              <a:t>12/11/13</a:t>
+              <a:t>18/11/2013</a:t>
             </a:fld>
             <a:endParaRPr lang="fr-FR"/>
           </a:p>
@@ -3061,7 +3064,7 @@
           <a:p>
             <a:fld id="{F02C3570-90AD-431D-9871-FE88EA036DFC}" type="slidenum">
               <a:rPr lang="fr-FR" smtClean="0"/>
-              <a:t>‹#›</a:t>
+              <a:t>‹N°›</a:t>
             </a:fld>
             <a:endParaRPr lang="fr-FR"/>
           </a:p>
@@ -3519,7 +3522,7 @@
   <p:timing>
     <p:tnLst>
       <p:par>
-        <p:cTn xmlns:p14="http://schemas.microsoft.com/office/powerpoint/2010/main" id="1" dur="indefinite" restart="never" nodeType="tmRoot"/>
+        <p:cTn id="1" dur="indefinite" restart="never" nodeType="tmRoot"/>
       </p:par>
     </p:tnLst>
   </p:timing>
@@ -3560,7 +3563,7 @@
           <a:p>
             <a:r>
               <a:rPr lang="fr-FR" dirty="0" smtClean="0"/>
-              <a:t>Ordonnanceurs</a:t>
+              <a:t>Sommaire</a:t>
             </a:r>
             <a:endParaRPr lang="fr-FR" dirty="0"/>
           </a:p>
@@ -3578,70 +3581,17 @@
         </p:nvSpPr>
         <p:spPr/>
         <p:txBody>
-          <a:bodyPr>
-            <a:normAutofit/>
-          </a:bodyPr>
-          <a:lstStyle/>
-          <a:p>
-            <a:r>
-              <a:rPr lang="fr-FR" dirty="0" smtClean="0"/>
-              <a:t>Un ordonnanceur = une FIFO (liste simplement chainée)</a:t>
-            </a:r>
-          </a:p>
-          <a:p>
-            <a:r>
-              <a:rPr lang="fr-FR" dirty="0" smtClean="0"/>
-              <a:t>Un sémaphore = une FIFO (de même)</a:t>
-            </a:r>
-          </a:p>
-          <a:p>
-            <a:r>
-              <a:rPr lang="fr-FR" dirty="0" smtClean="0"/>
-              <a:t>Un pointeur global sur le PCB courant</a:t>
-            </a:r>
-          </a:p>
-          <a:p>
-            <a:r>
-              <a:rPr lang="fr-FR" dirty="0" smtClean="0"/>
-              <a:t>Ordonnanceur collaboratif</a:t>
-            </a:r>
-            <a:endParaRPr lang="fr-FR" dirty="0" smtClean="0"/>
-          </a:p>
-          <a:p>
-            <a:r>
-              <a:rPr lang="fr-FR" dirty="0" smtClean="0"/>
-              <a:t>Ordonnanceur round robin a priorités</a:t>
-            </a:r>
-          </a:p>
-          <a:p>
-            <a:pPr lvl="1"/>
-            <a:r>
-              <a:rPr lang="fr-FR" dirty="0" smtClean="0"/>
-              <a:t>Nombre de priorités configurable a la compilation</a:t>
-            </a:r>
-          </a:p>
-          <a:p>
-            <a:pPr lvl="1"/>
-            <a:r>
-              <a:rPr lang="fr-FR" dirty="0" smtClean="0"/>
-              <a:t>Sans priorités -&gt; toutes les taches on la même priorité</a:t>
-            </a:r>
-          </a:p>
-          <a:p>
-            <a:r>
-              <a:rPr lang="fr-FR" dirty="0" smtClean="0"/>
-              <a:t>Tous disponible a l’exécution !</a:t>
-            </a:r>
-          </a:p>
-          <a:p>
-            <a:endParaRPr lang="fr-FR" dirty="0" smtClean="0"/>
+          <a:bodyPr/>
+          <a:lstStyle/>
+          <a:p>
+            <a:endParaRPr lang="fr-FR"/>
           </a:p>
         </p:txBody>
       </p:sp>
     </p:spTree>
     <p:extLst>
       <p:ext uri="{BB962C8B-B14F-4D97-AF65-F5344CB8AC3E}">
-        <p14:creationId xmlns:p14="http://schemas.microsoft.com/office/powerpoint/2010/main" val="1461854876"/>
+        <p14:creationId xmlns:p14="http://schemas.microsoft.com/office/powerpoint/2010/main" val="3214261540"/>
       </p:ext>
     </p:extLst>
   </p:cSld>
@@ -3651,7 +3601,7 @@
   <p:timing>
     <p:tnLst>
       <p:par>
-        <p:cTn xmlns:p14="http://schemas.microsoft.com/office/powerpoint/2010/main" id="1" dur="indefinite" restart="never" nodeType="tmRoot"/>
+        <p:cTn id="1" dur="indefinite" restart="never" nodeType="tmRoot"/>
       </p:par>
     </p:tnLst>
   </p:timing>
@@ -3677,546 +3627,123 @@
       </p:grpSpPr>
       <p:sp>
         <p:nvSpPr>
-          <p:cNvPr id="18" name="Rectangle 17"/>
-          <p:cNvSpPr/>
-          <p:nvPr/>
-        </p:nvSpPr>
-        <p:spPr>
-          <a:xfrm>
-            <a:off x="1104923" y="2024094"/>
-            <a:ext cx="2414726" cy="1694226"/>
-          </a:xfrm>
-          <a:prstGeom prst="rect">
-            <a:avLst/>
-          </a:prstGeom>
-        </p:spPr>
-        <p:style>
-          <a:lnRef idx="1">
-            <a:schemeClr val="accent2"/>
-          </a:lnRef>
-          <a:fillRef idx="3">
-            <a:schemeClr val="accent2"/>
-          </a:fillRef>
-          <a:effectRef idx="2">
-            <a:schemeClr val="accent2"/>
-          </a:effectRef>
-          <a:fontRef idx="minor">
-            <a:schemeClr val="lt1"/>
-          </a:fontRef>
-        </p:style>
-        <p:txBody>
-          <a:bodyPr rtlCol="0" anchor="ctr"/>
-          <a:lstStyle/>
-          <a:p>
-            <a:pPr algn="ctr"/>
+          <p:cNvPr id="2" name="Titre 1"/>
+          <p:cNvSpPr>
+            <a:spLocks noGrp="1"/>
+          </p:cNvSpPr>
+          <p:nvPr>
+            <p:ph type="title"/>
+          </p:nvPr>
+        </p:nvSpPr>
+        <p:spPr/>
+        <p:txBody>
+          <a:bodyPr/>
+          <a:lstStyle/>
+          <a:p>
+            <a:r>
+              <a:rPr lang="fr-FR" dirty="0" smtClean="0"/>
+              <a:t>Ordonnanceurs</a:t>
+            </a:r>
             <a:endParaRPr lang="fr-FR" dirty="0"/>
           </a:p>
         </p:txBody>
       </p:sp>
       <p:sp>
         <p:nvSpPr>
-          <p:cNvPr id="13" name="Rectangle 12"/>
-          <p:cNvSpPr/>
-          <p:nvPr/>
-        </p:nvSpPr>
-        <p:spPr>
-          <a:xfrm>
-            <a:off x="5907307" y="2022097"/>
-            <a:ext cx="2414726" cy="3776809"/>
-          </a:xfrm>
-          <a:prstGeom prst="rect">
-            <a:avLst/>
-          </a:prstGeom>
-        </p:spPr>
-        <p:style>
-          <a:lnRef idx="1">
-            <a:schemeClr val="accent2"/>
-          </a:lnRef>
-          <a:fillRef idx="3">
-            <a:schemeClr val="accent2"/>
-          </a:fillRef>
-          <a:effectRef idx="2">
-            <a:schemeClr val="accent2"/>
-          </a:effectRef>
-          <a:fontRef idx="minor">
-            <a:schemeClr val="lt1"/>
-          </a:fontRef>
-        </p:style>
-        <p:txBody>
-          <a:bodyPr rtlCol="0" anchor="ctr"/>
-          <a:lstStyle/>
-          <a:p>
-            <a:pPr algn="ctr"/>
+          <p:cNvPr id="3" name="Espace réservé du contenu 2"/>
+          <p:cNvSpPr>
+            <a:spLocks noGrp="1"/>
+          </p:cNvSpPr>
+          <p:nvPr>
+            <p:ph idx="1"/>
+          </p:nvPr>
+        </p:nvSpPr>
+        <p:spPr/>
+        <p:txBody>
+          <a:bodyPr>
+            <a:normAutofit/>
+          </a:bodyPr>
+          <a:lstStyle/>
+          <a:p>
+            <a:r>
+              <a:rPr lang="fr-FR" dirty="0" smtClean="0"/>
+              <a:t>Un ordonnanceur = une FIFO (liste simplement </a:t>
+            </a:r>
+            <a:r>
+              <a:rPr lang="fr-FR" dirty="0" smtClean="0"/>
+              <a:t>chaînée</a:t>
+            </a:r>
+            <a:r>
+              <a:rPr lang="fr-FR" dirty="0" smtClean="0"/>
+              <a:t>)</a:t>
+            </a:r>
+          </a:p>
+          <a:p>
+            <a:r>
+              <a:rPr lang="fr-FR" dirty="0" smtClean="0"/>
+              <a:t>Un sémaphore = une FIFO </a:t>
+            </a:r>
+            <a:endParaRPr lang="fr-FR" dirty="0" smtClean="0"/>
+          </a:p>
+          <a:p>
+            <a:r>
+              <a:rPr lang="fr-FR" dirty="0" smtClean="0"/>
+              <a:t>Un </a:t>
+            </a:r>
+            <a:r>
+              <a:rPr lang="fr-FR" dirty="0" smtClean="0"/>
+              <a:t>pointeur global sur le PCB </a:t>
+            </a:r>
+            <a:r>
+              <a:rPr lang="fr-FR" dirty="0" smtClean="0"/>
+              <a:t>courant</a:t>
+            </a:r>
+          </a:p>
+          <a:p>
             <a:endParaRPr lang="fr-FR" dirty="0"/>
           </a:p>
-        </p:txBody>
-      </p:sp>
-      <p:sp>
-        <p:nvSpPr>
-          <p:cNvPr id="2" name="Titre 1"/>
-          <p:cNvSpPr>
-            <a:spLocks noGrp="1"/>
-          </p:cNvSpPr>
-          <p:nvPr>
-            <p:ph type="title"/>
-          </p:nvPr>
-        </p:nvSpPr>
-        <p:spPr/>
-        <p:txBody>
-          <a:bodyPr/>
-          <a:lstStyle/>
+          <a:p>
+            <a:endParaRPr lang="fr-FR" dirty="0" smtClean="0"/>
+          </a:p>
           <a:p>
             <a:r>
               <a:rPr lang="fr-FR" dirty="0" smtClean="0"/>
-              <a:t>Architecture : </a:t>
-            </a:r>
-            <a:r>
-              <a:rPr lang="fr-FR" dirty="0" err="1" smtClean="0"/>
-              <a:t>FIFOs</a:t>
-            </a:r>
-            <a:endParaRPr lang="fr-FR" dirty="0"/>
-          </a:p>
-        </p:txBody>
-      </p:sp>
-      <p:sp>
-        <p:nvSpPr>
-          <p:cNvPr id="5" name="Rectangle 4"/>
-          <p:cNvSpPr/>
-          <p:nvPr/>
-        </p:nvSpPr>
-        <p:spPr>
-          <a:xfrm>
-            <a:off x="6141260" y="3534491"/>
-            <a:ext cx="1938465" cy="543125"/>
-          </a:xfrm>
-          <a:prstGeom prst="rect">
-            <a:avLst/>
-          </a:prstGeom>
-        </p:spPr>
-        <p:style>
-          <a:lnRef idx="1">
-            <a:schemeClr val="accent1"/>
-          </a:lnRef>
-          <a:fillRef idx="3">
-            <a:schemeClr val="accent1"/>
-          </a:fillRef>
-          <a:effectRef idx="2">
-            <a:schemeClr val="accent1"/>
-          </a:effectRef>
-          <a:fontRef idx="minor">
-            <a:schemeClr val="lt1"/>
-          </a:fontRef>
-        </p:style>
-        <p:txBody>
-          <a:bodyPr rtlCol="0" anchor="ctr"/>
-          <a:lstStyle/>
-          <a:p>
-            <a:pPr algn="ctr"/>
+              <a:t>Ordonnanceur collaboratif</a:t>
+            </a:r>
+          </a:p>
+          <a:p>
             <a:r>
               <a:rPr lang="fr-FR" dirty="0" smtClean="0"/>
-              <a:t>Round Robin </a:t>
+              <a:t>Ordonnanceur round robin </a:t>
             </a:r>
             <a:r>
               <a:rPr lang="fr-FR" dirty="0" smtClean="0"/>
-              <a:t>…</a:t>
-            </a:r>
-            <a:endParaRPr lang="fr-FR" dirty="0"/>
-          </a:p>
-        </p:txBody>
-      </p:sp>
-      <p:sp>
-        <p:nvSpPr>
-          <p:cNvPr id="6" name="Rectangle 5"/>
-          <p:cNvSpPr/>
-          <p:nvPr/>
-        </p:nvSpPr>
-        <p:spPr>
-          <a:xfrm>
-            <a:off x="1455851" y="4363709"/>
-            <a:ext cx="1696157" cy="543125"/>
-          </a:xfrm>
-          <a:prstGeom prst="rect">
-            <a:avLst/>
-          </a:prstGeom>
-        </p:spPr>
-        <p:style>
-          <a:lnRef idx="1">
-            <a:schemeClr val="accent1"/>
-          </a:lnRef>
-          <a:fillRef idx="3">
-            <a:schemeClr val="accent1"/>
-          </a:fillRef>
-          <a:effectRef idx="2">
-            <a:schemeClr val="accent1"/>
-          </a:effectRef>
-          <a:fontRef idx="minor">
-            <a:schemeClr val="lt1"/>
-          </a:fontRef>
-        </p:style>
-        <p:txBody>
-          <a:bodyPr rtlCol="0" anchor="ctr"/>
-          <a:lstStyle/>
-          <a:p>
-            <a:pPr algn="ctr"/>
+              <a:t>à </a:t>
+            </a:r>
             <a:r>
               <a:rPr lang="fr-FR" dirty="0" smtClean="0"/>
-              <a:t>Pause</a:t>
-            </a:r>
-            <a:endParaRPr lang="fr-FR" dirty="0"/>
-          </a:p>
-        </p:txBody>
-      </p:sp>
-      <p:sp>
-        <p:nvSpPr>
-          <p:cNvPr id="8" name="Rectangle 7"/>
-          <p:cNvSpPr/>
-          <p:nvPr/>
-        </p:nvSpPr>
-        <p:spPr>
-          <a:xfrm>
-            <a:off x="6143262" y="4288507"/>
-            <a:ext cx="1938465" cy="543125"/>
-          </a:xfrm>
-          <a:prstGeom prst="rect">
-            <a:avLst/>
-          </a:prstGeom>
-        </p:spPr>
-        <p:style>
-          <a:lnRef idx="1">
-            <a:schemeClr val="accent1"/>
-          </a:lnRef>
-          <a:fillRef idx="3">
-            <a:schemeClr val="accent1"/>
-          </a:fillRef>
-          <a:effectRef idx="2">
-            <a:schemeClr val="accent1"/>
-          </a:effectRef>
-          <a:fontRef idx="minor">
-            <a:schemeClr val="lt1"/>
-          </a:fontRef>
-        </p:style>
-        <p:txBody>
-          <a:bodyPr rtlCol="0" anchor="ctr"/>
-          <a:lstStyle/>
-          <a:p>
-            <a:pPr algn="ctr"/>
+              <a:t>priorités</a:t>
+            </a:r>
+          </a:p>
+          <a:p>
             <a:r>
               <a:rPr lang="fr-FR" dirty="0" smtClean="0"/>
-              <a:t>Round Robin 1</a:t>
-            </a:r>
-            <a:endParaRPr lang="fr-FR" dirty="0"/>
-          </a:p>
-        </p:txBody>
-      </p:sp>
-      <p:sp>
-        <p:nvSpPr>
-          <p:cNvPr id="9" name="Rectangle 8"/>
-          <p:cNvSpPr/>
-          <p:nvPr/>
-        </p:nvSpPr>
-        <p:spPr>
-          <a:xfrm>
-            <a:off x="6145263" y="5050878"/>
-            <a:ext cx="1938465" cy="543125"/>
-          </a:xfrm>
-          <a:prstGeom prst="rect">
-            <a:avLst/>
-          </a:prstGeom>
-        </p:spPr>
-        <p:style>
-          <a:lnRef idx="1">
-            <a:schemeClr val="accent1"/>
-          </a:lnRef>
-          <a:fillRef idx="3">
-            <a:schemeClr val="accent1"/>
-          </a:fillRef>
-          <a:effectRef idx="2">
-            <a:schemeClr val="accent1"/>
-          </a:effectRef>
-          <a:fontRef idx="minor">
-            <a:schemeClr val="lt1"/>
-          </a:fontRef>
-        </p:style>
-        <p:txBody>
-          <a:bodyPr rtlCol="0" anchor="ctr"/>
-          <a:lstStyle/>
-          <a:p>
-            <a:pPr algn="ctr"/>
+              <a:t>Tous disponibles à </a:t>
+            </a:r>
             <a:r>
               <a:rPr lang="fr-FR" dirty="0" smtClean="0"/>
-              <a:t>Round Robin </a:t>
-            </a:r>
-            <a:r>
-              <a:rPr lang="fr-FR" dirty="0" smtClean="0"/>
-              <a:t>0</a:t>
-            </a:r>
-            <a:endParaRPr lang="fr-FR" dirty="0"/>
-          </a:p>
-        </p:txBody>
-      </p:sp>
-      <p:sp>
-        <p:nvSpPr>
-          <p:cNvPr id="10" name="Rectangle 9"/>
-          <p:cNvSpPr/>
-          <p:nvPr/>
-        </p:nvSpPr>
-        <p:spPr>
-          <a:xfrm>
-            <a:off x="1432789" y="2886734"/>
-            <a:ext cx="1696157" cy="543125"/>
-          </a:xfrm>
-          <a:prstGeom prst="rect">
-            <a:avLst/>
-          </a:prstGeom>
-        </p:spPr>
-        <p:style>
-          <a:lnRef idx="1">
-            <a:schemeClr val="accent1"/>
-          </a:lnRef>
-          <a:fillRef idx="3">
-            <a:schemeClr val="accent1"/>
-          </a:fillRef>
-          <a:effectRef idx="2">
-            <a:schemeClr val="accent1"/>
-          </a:effectRef>
-          <a:fontRef idx="minor">
-            <a:schemeClr val="lt1"/>
-          </a:fontRef>
-        </p:style>
-        <p:txBody>
-          <a:bodyPr rtlCol="0" anchor="ctr"/>
-          <a:lstStyle/>
-          <a:p>
-            <a:pPr algn="ctr"/>
-            <a:r>
-              <a:rPr lang="fr-FR" dirty="0" smtClean="0"/>
-              <a:t>List d’attente</a:t>
-            </a:r>
-            <a:endParaRPr lang="fr-FR" dirty="0"/>
-          </a:p>
-        </p:txBody>
-      </p:sp>
-      <p:sp>
-        <p:nvSpPr>
-          <p:cNvPr id="12" name="Rectangle 11"/>
-          <p:cNvSpPr/>
-          <p:nvPr/>
-        </p:nvSpPr>
-        <p:spPr>
-          <a:xfrm>
-            <a:off x="6143262" y="2784468"/>
-            <a:ext cx="1938465" cy="543125"/>
-          </a:xfrm>
-          <a:prstGeom prst="rect">
-            <a:avLst/>
-          </a:prstGeom>
-        </p:spPr>
-        <p:style>
-          <a:lnRef idx="1">
-            <a:schemeClr val="accent1"/>
-          </a:lnRef>
-          <a:fillRef idx="3">
-            <a:schemeClr val="accent1"/>
-          </a:fillRef>
-          <a:effectRef idx="2">
-            <a:schemeClr val="accent1"/>
-          </a:effectRef>
-          <a:fontRef idx="minor">
-            <a:schemeClr val="lt1"/>
-          </a:fontRef>
-        </p:style>
-        <p:txBody>
-          <a:bodyPr rtlCol="0" anchor="ctr"/>
-          <a:lstStyle/>
-          <a:p>
-            <a:pPr algn="ctr"/>
-            <a:r>
-              <a:rPr lang="en-CA" dirty="0" err="1" smtClean="0"/>
-              <a:t>Collaboratif</a:t>
-            </a:r>
-            <a:endParaRPr lang="fr-FR" dirty="0"/>
-          </a:p>
-        </p:txBody>
-      </p:sp>
-      <p:sp>
-        <p:nvSpPr>
-          <p:cNvPr id="14" name="ZoneTexte 13"/>
-          <p:cNvSpPr txBox="1"/>
-          <p:nvPr/>
-        </p:nvSpPr>
-        <p:spPr>
-          <a:xfrm>
-            <a:off x="6224813" y="2164147"/>
-            <a:ext cx="1775809" cy="369332"/>
-          </a:xfrm>
-          <a:prstGeom prst="rect">
-            <a:avLst/>
-          </a:prstGeom>
-          <a:noFill/>
-        </p:spPr>
-        <p:txBody>
-          <a:bodyPr wrap="none" rtlCol="0">
-            <a:spAutoFit/>
-          </a:bodyPr>
-          <a:lstStyle/>
-          <a:p>
-            <a:pPr algn="ctr"/>
-            <a:r>
-              <a:rPr lang="fr-FR" dirty="0" smtClean="0">
-                <a:solidFill>
-                  <a:schemeClr val="bg1"/>
-                </a:solidFill>
-              </a:rPr>
-              <a:t>Ordonnanceurs</a:t>
-            </a:r>
-            <a:endParaRPr lang="fr-FR" dirty="0">
-              <a:solidFill>
-                <a:schemeClr val="bg1"/>
-              </a:solidFill>
-            </a:endParaRPr>
-          </a:p>
-        </p:txBody>
-      </p:sp>
-      <p:sp>
-        <p:nvSpPr>
-          <p:cNvPr id="15" name="ZoneTexte 14"/>
-          <p:cNvSpPr txBox="1"/>
-          <p:nvPr/>
-        </p:nvSpPr>
-        <p:spPr>
-          <a:xfrm>
-            <a:off x="1612956" y="2283124"/>
-            <a:ext cx="1378052" cy="369332"/>
-          </a:xfrm>
-          <a:prstGeom prst="rect">
-            <a:avLst/>
-          </a:prstGeom>
-          <a:noFill/>
-        </p:spPr>
-        <p:txBody>
-          <a:bodyPr wrap="none" rtlCol="0">
-            <a:spAutoFit/>
-          </a:bodyPr>
-          <a:lstStyle/>
-          <a:p>
-            <a:pPr algn="ctr"/>
-            <a:r>
-              <a:rPr lang="fr-FR" dirty="0" smtClean="0">
-                <a:solidFill>
-                  <a:schemeClr val="bg1"/>
-                </a:solidFill>
-              </a:rPr>
-              <a:t>Sémaphore</a:t>
-            </a:r>
-            <a:endParaRPr lang="fr-FR" dirty="0">
-              <a:solidFill>
-                <a:schemeClr val="bg1"/>
-              </a:solidFill>
-            </a:endParaRPr>
-          </a:p>
-        </p:txBody>
-      </p:sp>
-      <p:cxnSp>
-        <p:nvCxnSpPr>
-          <p:cNvPr id="17" name="Connecteur droit 16"/>
-          <p:cNvCxnSpPr/>
-          <p:nvPr/>
-        </p:nvCxnSpPr>
-        <p:spPr>
-          <a:xfrm>
-            <a:off x="4603865" y="1729645"/>
-            <a:ext cx="16711" cy="4746078"/>
-          </a:xfrm>
-          <a:prstGeom prst="line">
-            <a:avLst/>
-          </a:prstGeom>
-          <a:ln>
-            <a:solidFill>
-              <a:schemeClr val="accent2"/>
-            </a:solidFill>
-            <a:prstDash val="dash"/>
-          </a:ln>
-        </p:spPr>
-        <p:style>
-          <a:lnRef idx="2">
-            <a:schemeClr val="accent1"/>
-          </a:lnRef>
-          <a:fillRef idx="0">
-            <a:schemeClr val="accent1"/>
-          </a:fillRef>
-          <a:effectRef idx="1">
-            <a:schemeClr val="accent1"/>
-          </a:effectRef>
-          <a:fontRef idx="minor">
-            <a:schemeClr val="tx1"/>
-          </a:fontRef>
-        </p:style>
-      </p:cxnSp>
-      <p:sp>
-        <p:nvSpPr>
-          <p:cNvPr id="19" name="ZoneTexte 18"/>
-          <p:cNvSpPr txBox="1"/>
-          <p:nvPr/>
-        </p:nvSpPr>
-        <p:spPr>
-          <a:xfrm>
-            <a:off x="3506841" y="5999444"/>
-            <a:ext cx="890576" cy="369332"/>
-          </a:xfrm>
-          <a:prstGeom prst="rect">
-            <a:avLst/>
-          </a:prstGeom>
-          <a:noFill/>
-        </p:spPr>
-        <p:txBody>
-          <a:bodyPr wrap="none" rtlCol="0">
-            <a:spAutoFit/>
-          </a:bodyPr>
-          <a:lstStyle/>
-          <a:p>
-            <a:pPr algn="r"/>
-            <a:r>
-              <a:rPr lang="fr-FR" dirty="0" smtClean="0"/>
-              <a:t>attente</a:t>
-            </a:r>
-            <a:endParaRPr lang="fr-FR" dirty="0"/>
-          </a:p>
-        </p:txBody>
-      </p:sp>
-      <p:sp>
-        <p:nvSpPr>
-          <p:cNvPr id="20" name="ZoneTexte 19"/>
-          <p:cNvSpPr txBox="1"/>
-          <p:nvPr/>
-        </p:nvSpPr>
-        <p:spPr>
-          <a:xfrm>
-            <a:off x="4819722" y="6001440"/>
-            <a:ext cx="1814244" cy="369332"/>
-          </a:xfrm>
-          <a:prstGeom prst="rect">
-            <a:avLst/>
-          </a:prstGeom>
-          <a:noFill/>
-        </p:spPr>
-        <p:txBody>
-          <a:bodyPr wrap="none" rtlCol="0">
-            <a:spAutoFit/>
-          </a:bodyPr>
-          <a:lstStyle/>
-          <a:p>
-            <a:r>
-              <a:rPr lang="fr-FR" dirty="0" smtClean="0"/>
-              <a:t>près / exécution</a:t>
-            </a:r>
-            <a:endParaRPr lang="fr-FR" dirty="0"/>
+              <a:t>l’exécution !</a:t>
+            </a:r>
+          </a:p>
+          <a:p>
+            <a:endParaRPr lang="fr-FR" dirty="0" smtClean="0"/>
           </a:p>
         </p:txBody>
       </p:sp>
     </p:spTree>
     <p:extLst>
       <p:ext uri="{BB962C8B-B14F-4D97-AF65-F5344CB8AC3E}">
-        <p14:creationId xmlns:p14="http://schemas.microsoft.com/office/powerpoint/2010/main" val="1170686574"/>
+        <p14:creationId xmlns:p14="http://schemas.microsoft.com/office/powerpoint/2010/main" val="1461854876"/>
       </p:ext>
     </p:extLst>
   </p:cSld>
@@ -4226,7 +3753,7 @@
   <p:timing>
     <p:tnLst>
       <p:par>
-        <p:cTn xmlns:p14="http://schemas.microsoft.com/office/powerpoint/2010/main" id="1" dur="indefinite" restart="never" nodeType="tmRoot"/>
+        <p:cTn id="1" dur="indefinite" restart="never" nodeType="tmRoot"/>
       </p:par>
     </p:tnLst>
   </p:timing>
@@ -4266,25 +3793,307 @@
           <a:lstStyle/>
           <a:p>
             <a:r>
+              <a:rPr lang="fr-FR" dirty="0" smtClean="0"/>
+              <a:t>Ordonnanceur collaboratif</a:t>
+            </a:r>
+            <a:endParaRPr lang="fr-FR" dirty="0"/>
+          </a:p>
+        </p:txBody>
+      </p:sp>
+      <p:sp>
+        <p:nvSpPr>
+          <p:cNvPr id="3" name="Espace réservé du contenu 2"/>
+          <p:cNvSpPr>
+            <a:spLocks noGrp="1"/>
+          </p:cNvSpPr>
+          <p:nvPr>
+            <p:ph idx="1"/>
+          </p:nvPr>
+        </p:nvSpPr>
+        <p:spPr/>
+        <p:txBody>
+          <a:bodyPr/>
+          <a:lstStyle/>
+          <a:p>
+            <a:r>
+              <a:rPr lang="fr-FR" dirty="0" smtClean="0"/>
+              <a:t>Pas de quantum de temps</a:t>
+            </a:r>
+          </a:p>
+          <a:p>
+            <a:r>
+              <a:rPr lang="fr-FR" dirty="0" smtClean="0"/>
+              <a:t>Processus courant garde la main tant qu’il ne la cède pas ou n’a pas terminé</a:t>
+            </a:r>
+          </a:p>
+          <a:p>
+            <a:endParaRPr lang="fr-FR" dirty="0" smtClean="0"/>
+          </a:p>
+          <a:p>
+            <a:r>
+              <a:rPr lang="fr-FR" dirty="0" smtClean="0"/>
+              <a:t>Couplage fort : pas de concurrence d’accès</a:t>
+            </a:r>
+          </a:p>
+          <a:p>
+            <a:r>
+              <a:rPr lang="fr-FR" dirty="0" smtClean="0"/>
+              <a:t>Pas d’interruption </a:t>
+            </a:r>
+            <a:r>
+              <a:rPr lang="fr-FR" dirty="0"/>
+              <a:t>non </a:t>
+            </a:r>
+            <a:r>
+              <a:rPr lang="fr-FR" dirty="0" smtClean="0"/>
+              <a:t>prévisible du processus</a:t>
+            </a:r>
+          </a:p>
+          <a:p>
+            <a:endParaRPr lang="fr-FR" dirty="0" smtClean="0"/>
+          </a:p>
+          <a:p>
+            <a:r>
+              <a:rPr lang="fr-FR" dirty="0" smtClean="0"/>
+              <a:t>Responsive time et </a:t>
+            </a:r>
+            <a:r>
               <a:rPr lang="fr-FR" dirty="0" err="1" smtClean="0"/>
-              <a:t>Process</a:t>
+              <a:t>waiting</a:t>
             </a:r>
             <a:r>
               <a:rPr lang="fr-FR" dirty="0" smtClean="0"/>
-              <a:t> Control Block</a:t>
-            </a:r>
-            <a:endParaRPr lang="fr-FR" dirty="0"/>
-          </a:p>
-        </p:txBody>
-      </p:sp>
-      <p:sp>
-        <p:nvSpPr>
-          <p:cNvPr id="3" name="Espace réservé du contenu 2"/>
-          <p:cNvSpPr>
-            <a:spLocks noGrp="1"/>
-          </p:cNvSpPr>
-          <p:nvPr>
-            <p:ph idx="1"/>
+              <a:t> time potentiellement très grands</a:t>
+            </a:r>
+          </a:p>
+          <a:p>
+            <a:r>
+              <a:rPr lang="fr-FR" dirty="0" smtClean="0"/>
+              <a:t>Partage des ressources inefficace</a:t>
+            </a:r>
+          </a:p>
+          <a:p>
+            <a:endParaRPr lang="fr-FR" dirty="0" smtClean="0"/>
+          </a:p>
+        </p:txBody>
+      </p:sp>
+      <p:sp>
+        <p:nvSpPr>
+          <p:cNvPr id="4" name="Organigramme : Ou 3"/>
+          <p:cNvSpPr/>
+          <p:nvPr/>
+        </p:nvSpPr>
+        <p:spPr>
+          <a:xfrm>
+            <a:off x="457201" y="3411749"/>
+            <a:ext cx="224286" cy="215660"/>
+          </a:xfrm>
+          <a:prstGeom prst="flowChartOr">
+            <a:avLst/>
+          </a:prstGeom>
+          <a:solidFill>
+            <a:srgbClr val="00B050"/>
+          </a:solidFill>
+        </p:spPr>
+        <p:style>
+          <a:lnRef idx="2">
+            <a:schemeClr val="accent1">
+              <a:shade val="50000"/>
+            </a:schemeClr>
+          </a:lnRef>
+          <a:fillRef idx="1">
+            <a:schemeClr val="accent1"/>
+          </a:fillRef>
+          <a:effectRef idx="0">
+            <a:schemeClr val="accent1"/>
+          </a:effectRef>
+          <a:fontRef idx="minor">
+            <a:schemeClr val="lt1"/>
+          </a:fontRef>
+        </p:style>
+        <p:txBody>
+          <a:bodyPr rtlCol="0" anchor="ctr"/>
+          <a:lstStyle/>
+          <a:p>
+            <a:pPr algn="ctr"/>
+            <a:endParaRPr lang="fr-FR"/>
+          </a:p>
+        </p:txBody>
+      </p:sp>
+      <p:sp>
+        <p:nvSpPr>
+          <p:cNvPr id="5" name="Organigramme : Ou 4"/>
+          <p:cNvSpPr/>
+          <p:nvPr/>
+        </p:nvSpPr>
+        <p:spPr>
+          <a:xfrm>
+            <a:off x="454333" y="3857433"/>
+            <a:ext cx="224286" cy="215660"/>
+          </a:xfrm>
+          <a:prstGeom prst="flowChartOr">
+            <a:avLst/>
+          </a:prstGeom>
+          <a:solidFill>
+            <a:srgbClr val="00B050"/>
+          </a:solidFill>
+        </p:spPr>
+        <p:style>
+          <a:lnRef idx="2">
+            <a:schemeClr val="accent1">
+              <a:shade val="50000"/>
+            </a:schemeClr>
+          </a:lnRef>
+          <a:fillRef idx="1">
+            <a:schemeClr val="accent1"/>
+          </a:fillRef>
+          <a:effectRef idx="0">
+            <a:schemeClr val="accent1"/>
+          </a:effectRef>
+          <a:fontRef idx="minor">
+            <a:schemeClr val="lt1"/>
+          </a:fontRef>
+        </p:style>
+        <p:txBody>
+          <a:bodyPr rtlCol="0" anchor="ctr"/>
+          <a:lstStyle/>
+          <a:p>
+            <a:pPr algn="ctr"/>
+            <a:endParaRPr lang="fr-FR"/>
+          </a:p>
+        </p:txBody>
+      </p:sp>
+      <p:sp>
+        <p:nvSpPr>
+          <p:cNvPr id="6" name="Organigramme : Jonction de sommaire 5"/>
+          <p:cNvSpPr/>
+          <p:nvPr/>
+        </p:nvSpPr>
+        <p:spPr>
+          <a:xfrm>
+            <a:off x="454333" y="4731527"/>
+            <a:ext cx="227154" cy="215660"/>
+          </a:xfrm>
+          <a:prstGeom prst="flowChartSummingJunction">
+            <a:avLst/>
+          </a:prstGeom>
+          <a:solidFill>
+            <a:srgbClr val="C00000"/>
+          </a:solidFill>
+        </p:spPr>
+        <p:style>
+          <a:lnRef idx="2">
+            <a:schemeClr val="accent1">
+              <a:shade val="50000"/>
+            </a:schemeClr>
+          </a:lnRef>
+          <a:fillRef idx="1">
+            <a:schemeClr val="accent1"/>
+          </a:fillRef>
+          <a:effectRef idx="0">
+            <a:schemeClr val="accent1"/>
+          </a:effectRef>
+          <a:fontRef idx="minor">
+            <a:schemeClr val="lt1"/>
+          </a:fontRef>
+        </p:style>
+        <p:txBody>
+          <a:bodyPr rtlCol="0" anchor="ctr"/>
+          <a:lstStyle/>
+          <a:p>
+            <a:pPr algn="ctr"/>
+            <a:endParaRPr lang="fr-FR"/>
+          </a:p>
+        </p:txBody>
+      </p:sp>
+      <p:sp>
+        <p:nvSpPr>
+          <p:cNvPr id="7" name="Organigramme : Jonction de sommaire 6"/>
+          <p:cNvSpPr/>
+          <p:nvPr/>
+        </p:nvSpPr>
+        <p:spPr>
+          <a:xfrm>
+            <a:off x="451465" y="5539503"/>
+            <a:ext cx="227154" cy="215660"/>
+          </a:xfrm>
+          <a:prstGeom prst="flowChartSummingJunction">
+            <a:avLst/>
+          </a:prstGeom>
+          <a:solidFill>
+            <a:srgbClr val="C00000"/>
+          </a:solidFill>
+        </p:spPr>
+        <p:style>
+          <a:lnRef idx="2">
+            <a:schemeClr val="accent1">
+              <a:shade val="50000"/>
+            </a:schemeClr>
+          </a:lnRef>
+          <a:fillRef idx="1">
+            <a:schemeClr val="accent1"/>
+          </a:fillRef>
+          <a:effectRef idx="0">
+            <a:schemeClr val="accent1"/>
+          </a:effectRef>
+          <a:fontRef idx="minor">
+            <a:schemeClr val="lt1"/>
+          </a:fontRef>
+        </p:style>
+        <p:txBody>
+          <a:bodyPr rtlCol="0" anchor="ctr"/>
+          <a:lstStyle/>
+          <a:p>
+            <a:pPr algn="ctr"/>
+            <a:endParaRPr lang="fr-FR"/>
+          </a:p>
+        </p:txBody>
+      </p:sp>
+    </p:spTree>
+    <p:extLst>
+      <p:ext uri="{BB962C8B-B14F-4D97-AF65-F5344CB8AC3E}">
+        <p14:creationId xmlns:p14="http://schemas.microsoft.com/office/powerpoint/2010/main" val="316796425"/>
+      </p:ext>
+    </p:extLst>
+  </p:cSld>
+  <p:clrMapOvr>
+    <a:masterClrMapping/>
+  </p:clrMapOvr>
+  <p:timing>
+    <p:tnLst>
+      <p:par>
+        <p:cTn id="1" dur="indefinite" restart="never" nodeType="tmRoot"/>
+      </p:par>
+    </p:tnLst>
+  </p:timing>
+</p:sld>
+</file>
+
+<file path=ppt/slides/slide5.xml><?xml version="1.0" encoding="utf-8"?>
+<p:sld xmlns:a="http://schemas.openxmlformats.org/drawingml/2006/main" xmlns:r="http://schemas.openxmlformats.org/officeDocument/2006/relationships" xmlns:p="http://schemas.openxmlformats.org/presentationml/2006/main">
+  <p:cSld>
+    <p:spTree>
+      <p:nvGrpSpPr>
+        <p:cNvPr id="1" name=""/>
+        <p:cNvGrpSpPr/>
+        <p:nvPr/>
+      </p:nvGrpSpPr>
+      <p:grpSpPr>
+        <a:xfrm>
+          <a:off x="0" y="0"/>
+          <a:ext cx="0" cy="0"/>
+          <a:chOff x="0" y="0"/>
+          <a:chExt cx="0" cy="0"/>
+        </a:xfrm>
+      </p:grpSpPr>
+      <p:sp>
+        <p:nvSpPr>
+          <p:cNvPr id="2" name="Titre 1"/>
+          <p:cNvSpPr>
+            <a:spLocks noGrp="1"/>
+          </p:cNvSpPr>
+          <p:nvPr>
+            <p:ph type="title"/>
           </p:nvPr>
         </p:nvSpPr>
         <p:spPr/>
@@ -4296,11 +4105,1575 @@
           <a:p>
             <a:r>
               <a:rPr lang="fr-FR" dirty="0" smtClean="0"/>
-              <a:t>U</a:t>
-            </a:r>
+              <a:t>Ordonnanceur Round-robin</a:t>
+            </a:r>
+            <a:endParaRPr lang="fr-FR" dirty="0"/>
+          </a:p>
+        </p:txBody>
+      </p:sp>
+      <p:sp>
+        <p:nvSpPr>
+          <p:cNvPr id="3" name="Espace réservé du contenu 2"/>
+          <p:cNvSpPr>
+            <a:spLocks noGrp="1"/>
+          </p:cNvSpPr>
+          <p:nvPr>
+            <p:ph idx="1"/>
+          </p:nvPr>
+        </p:nvSpPr>
+        <p:spPr>
+          <a:xfrm>
+            <a:off x="457200" y="1600201"/>
+            <a:ext cx="8229600" cy="1358659"/>
+          </a:xfrm>
+        </p:spPr>
+        <p:txBody>
+          <a:bodyPr>
+            <a:normAutofit/>
+          </a:bodyPr>
+          <a:lstStyle/>
+          <a:p>
             <a:r>
               <a:rPr lang="fr-FR" dirty="0" smtClean="0"/>
-              <a:t>n </a:t>
+              <a:t>Nombre </a:t>
+            </a:r>
+            <a:r>
+              <a:rPr lang="fr-FR" dirty="0"/>
+              <a:t>de priorités configurable à la </a:t>
+            </a:r>
+            <a:r>
+              <a:rPr lang="fr-FR" dirty="0" smtClean="0"/>
+              <a:t>compilation</a:t>
+            </a:r>
+          </a:p>
+          <a:p>
+            <a:r>
+              <a:rPr lang="fr-FR" dirty="0" smtClean="0"/>
+              <a:t>Une FIFO par priorité</a:t>
+            </a:r>
+          </a:p>
+          <a:p>
+            <a:r>
+              <a:rPr lang="fr-FR" dirty="0" smtClean="0"/>
+              <a:t>Sans priorité -&gt; toutes les tâches ont la même priorité</a:t>
+            </a:r>
+          </a:p>
+        </p:txBody>
+      </p:sp>
+      <p:sp>
+        <p:nvSpPr>
+          <p:cNvPr id="4" name="Espace réservé du contenu 2"/>
+          <p:cNvSpPr txBox="1">
+            <a:spLocks/>
+          </p:cNvSpPr>
+          <p:nvPr/>
+        </p:nvSpPr>
+        <p:spPr>
+          <a:xfrm>
+            <a:off x="462958" y="4685441"/>
+            <a:ext cx="8229600" cy="1792997"/>
+          </a:xfrm>
+          <a:prstGeom prst="rect">
+            <a:avLst/>
+          </a:prstGeom>
+        </p:spPr>
+        <p:txBody>
+          <a:bodyPr vert="horz" lIns="91440" tIns="45720" rIns="91440" bIns="45720" rtlCol="0">
+            <a:normAutofit fontScale="92500"/>
+          </a:bodyPr>
+          <a:lstStyle>
+            <a:lvl1pPr marL="182880" indent="-182880" algn="l" defTabSz="914400" rtl="0" eaLnBrk="1" latinLnBrk="0" hangingPunct="1">
+              <a:spcBef>
+                <a:spcPct val="20000"/>
+              </a:spcBef>
+              <a:buClr>
+                <a:schemeClr val="accent1"/>
+              </a:buClr>
+              <a:buSzPct val="85000"/>
+              <a:buFont typeface="Arial" pitchFamily="34" charset="0"/>
+              <a:buChar char="•"/>
+              <a:defRPr sz="2400" kern="1200">
+                <a:solidFill>
+                  <a:schemeClr val="tx1"/>
+                </a:solidFill>
+                <a:latin typeface="+mn-lt"/>
+                <a:ea typeface="+mn-ea"/>
+                <a:cs typeface="+mn-cs"/>
+              </a:defRPr>
+            </a:lvl1pPr>
+            <a:lvl2pPr marL="457200" indent="-182880" algn="l" defTabSz="914400" rtl="0" eaLnBrk="1" latinLnBrk="0" hangingPunct="1">
+              <a:spcBef>
+                <a:spcPct val="20000"/>
+              </a:spcBef>
+              <a:buClr>
+                <a:schemeClr val="accent1"/>
+              </a:buClr>
+              <a:buSzPct val="85000"/>
+              <a:buFont typeface="Arial" pitchFamily="34" charset="0"/>
+              <a:buChar char="•"/>
+              <a:defRPr sz="2000" kern="1200">
+                <a:solidFill>
+                  <a:schemeClr val="tx1"/>
+                </a:solidFill>
+                <a:latin typeface="+mn-lt"/>
+                <a:ea typeface="+mn-ea"/>
+                <a:cs typeface="+mn-cs"/>
+              </a:defRPr>
+            </a:lvl2pPr>
+            <a:lvl3pPr marL="731520" indent="-182880" algn="l" defTabSz="914400" rtl="0" eaLnBrk="1" latinLnBrk="0" hangingPunct="1">
+              <a:spcBef>
+                <a:spcPct val="20000"/>
+              </a:spcBef>
+              <a:buClr>
+                <a:schemeClr val="accent1"/>
+              </a:buClr>
+              <a:buSzPct val="90000"/>
+              <a:buFont typeface="Arial" pitchFamily="34" charset="0"/>
+              <a:buChar char="•"/>
+              <a:defRPr sz="1800" kern="1200">
+                <a:solidFill>
+                  <a:schemeClr val="tx1"/>
+                </a:solidFill>
+                <a:latin typeface="+mn-lt"/>
+                <a:ea typeface="+mn-ea"/>
+                <a:cs typeface="+mn-cs"/>
+              </a:defRPr>
+            </a:lvl3pPr>
+            <a:lvl4pPr marL="1005840" indent="-182880" algn="l" defTabSz="914400" rtl="0" eaLnBrk="1" latinLnBrk="0" hangingPunct="1">
+              <a:spcBef>
+                <a:spcPct val="20000"/>
+              </a:spcBef>
+              <a:buClr>
+                <a:schemeClr val="accent1"/>
+              </a:buClr>
+              <a:buFont typeface="Arial" pitchFamily="34" charset="0"/>
+              <a:buChar char="•"/>
+              <a:defRPr sz="1600" kern="1200">
+                <a:solidFill>
+                  <a:schemeClr val="tx1"/>
+                </a:solidFill>
+                <a:latin typeface="+mn-lt"/>
+                <a:ea typeface="+mn-ea"/>
+                <a:cs typeface="+mn-cs"/>
+              </a:defRPr>
+            </a:lvl4pPr>
+            <a:lvl5pPr marL="1188720" indent="-137160" algn="l" defTabSz="914400" rtl="0" eaLnBrk="1" latinLnBrk="0" hangingPunct="1">
+              <a:spcBef>
+                <a:spcPct val="20000"/>
+              </a:spcBef>
+              <a:buClr>
+                <a:schemeClr val="accent1"/>
+              </a:buClr>
+              <a:buSzPct val="100000"/>
+              <a:buFont typeface="Arial" pitchFamily="34" charset="0"/>
+              <a:buChar char="•"/>
+              <a:defRPr sz="1400" kern="1200" baseline="0">
+                <a:solidFill>
+                  <a:schemeClr val="tx1"/>
+                </a:solidFill>
+                <a:latin typeface="+mn-lt"/>
+                <a:ea typeface="+mn-ea"/>
+                <a:cs typeface="+mn-cs"/>
+              </a:defRPr>
+            </a:lvl5pPr>
+            <a:lvl6pPr marL="1371600" indent="-182880" algn="l" defTabSz="914400" rtl="0" eaLnBrk="1" latinLnBrk="0" hangingPunct="1">
+              <a:spcBef>
+                <a:spcPct val="20000"/>
+              </a:spcBef>
+              <a:buClr>
+                <a:schemeClr val="accent1"/>
+              </a:buClr>
+              <a:buFont typeface="Arial" pitchFamily="34" charset="0"/>
+              <a:buChar char="•"/>
+              <a:defRPr sz="1300" kern="1200">
+                <a:solidFill>
+                  <a:schemeClr val="tx1"/>
+                </a:solidFill>
+                <a:latin typeface="+mn-lt"/>
+                <a:ea typeface="+mn-ea"/>
+                <a:cs typeface="+mn-cs"/>
+              </a:defRPr>
+            </a:lvl6pPr>
+            <a:lvl7pPr marL="1554480" indent="-182880" algn="l" defTabSz="914400" rtl="0" eaLnBrk="1" latinLnBrk="0" hangingPunct="1">
+              <a:spcBef>
+                <a:spcPct val="20000"/>
+              </a:spcBef>
+              <a:buClr>
+                <a:schemeClr val="accent1"/>
+              </a:buClr>
+              <a:buFont typeface="Arial" pitchFamily="34" charset="0"/>
+              <a:buChar char="•"/>
+              <a:defRPr sz="1300" kern="1200">
+                <a:solidFill>
+                  <a:schemeClr val="tx1"/>
+                </a:solidFill>
+                <a:latin typeface="+mn-lt"/>
+                <a:ea typeface="+mn-ea"/>
+                <a:cs typeface="+mn-cs"/>
+              </a:defRPr>
+            </a:lvl7pPr>
+            <a:lvl8pPr marL="1737360" indent="-182880" algn="l" defTabSz="914400" rtl="0" eaLnBrk="1" latinLnBrk="0" hangingPunct="1">
+              <a:spcBef>
+                <a:spcPct val="20000"/>
+              </a:spcBef>
+              <a:buClr>
+                <a:schemeClr val="accent1"/>
+              </a:buClr>
+              <a:buFont typeface="Arial" pitchFamily="34" charset="0"/>
+              <a:buChar char="•"/>
+              <a:defRPr sz="1300" kern="1200">
+                <a:solidFill>
+                  <a:schemeClr val="tx1"/>
+                </a:solidFill>
+                <a:latin typeface="+mn-lt"/>
+                <a:ea typeface="+mn-ea"/>
+                <a:cs typeface="+mn-cs"/>
+              </a:defRPr>
+            </a:lvl8pPr>
+            <a:lvl9pPr marL="1920240" indent="-182880" algn="l" defTabSz="914400" rtl="0" eaLnBrk="1" latinLnBrk="0" hangingPunct="1">
+              <a:spcBef>
+                <a:spcPct val="20000"/>
+              </a:spcBef>
+              <a:buClr>
+                <a:schemeClr val="accent1"/>
+              </a:buClr>
+              <a:buFont typeface="Arial" pitchFamily="34" charset="0"/>
+              <a:buChar char="•"/>
+              <a:defRPr sz="1300" kern="1200">
+                <a:solidFill>
+                  <a:schemeClr val="tx1"/>
+                </a:solidFill>
+                <a:latin typeface="+mn-lt"/>
+                <a:ea typeface="+mn-ea"/>
+                <a:cs typeface="+mn-cs"/>
+              </a:defRPr>
+            </a:lvl9pPr>
+          </a:lstStyle>
+          <a:p>
+            <a:r>
+              <a:rPr lang="fr-FR" dirty="0" smtClean="0"/>
+              <a:t>Partage de temps équitable sur une même priorité</a:t>
+            </a:r>
+          </a:p>
+          <a:p>
+            <a:endParaRPr lang="fr-FR" dirty="0" smtClean="0"/>
+          </a:p>
+          <a:p>
+            <a:r>
+              <a:rPr lang="fr-FR" dirty="0" smtClean="0"/>
+              <a:t>Famine pour les processus à plus faible priorité</a:t>
+            </a:r>
+          </a:p>
+          <a:p>
+            <a:r>
+              <a:rPr lang="fr-FR" dirty="0" smtClean="0"/>
+              <a:t>Responsive time important pour de grands quantums de temps</a:t>
+            </a:r>
+            <a:endParaRPr lang="fr-FR" dirty="0" smtClean="0"/>
+          </a:p>
+        </p:txBody>
+      </p:sp>
+      <p:sp>
+        <p:nvSpPr>
+          <p:cNvPr id="6" name="Rectangle 5"/>
+          <p:cNvSpPr/>
+          <p:nvPr/>
+        </p:nvSpPr>
+        <p:spPr>
+          <a:xfrm>
+            <a:off x="2188138" y="3140016"/>
+            <a:ext cx="4779239" cy="966998"/>
+          </a:xfrm>
+          <a:prstGeom prst="rect">
+            <a:avLst/>
+          </a:prstGeom>
+        </p:spPr>
+        <p:style>
+          <a:lnRef idx="1">
+            <a:schemeClr val="accent1"/>
+          </a:lnRef>
+          <a:fillRef idx="3">
+            <a:schemeClr val="accent1"/>
+          </a:fillRef>
+          <a:effectRef idx="2">
+            <a:schemeClr val="accent1"/>
+          </a:effectRef>
+          <a:fontRef idx="minor">
+            <a:schemeClr val="lt1"/>
+          </a:fontRef>
+        </p:style>
+        <p:txBody>
+          <a:bodyPr rtlCol="0" anchor="ctr"/>
+          <a:lstStyle/>
+          <a:p>
+            <a:pPr algn="ctr"/>
+            <a:endParaRPr lang="fr-FR" dirty="0"/>
+          </a:p>
+        </p:txBody>
+      </p:sp>
+      <p:sp>
+        <p:nvSpPr>
+          <p:cNvPr id="7" name="Rectangle 6"/>
+          <p:cNvSpPr/>
+          <p:nvPr/>
+        </p:nvSpPr>
+        <p:spPr>
+          <a:xfrm>
+            <a:off x="3459143" y="3381556"/>
+            <a:ext cx="569344" cy="500332"/>
+          </a:xfrm>
+          <a:prstGeom prst="rect">
+            <a:avLst/>
+          </a:prstGeom>
+          <a:solidFill>
+            <a:schemeClr val="accent6">
+              <a:lumMod val="60000"/>
+              <a:lumOff val="40000"/>
+            </a:schemeClr>
+          </a:solidFill>
+        </p:spPr>
+        <p:style>
+          <a:lnRef idx="2">
+            <a:schemeClr val="accent1">
+              <a:shade val="50000"/>
+            </a:schemeClr>
+          </a:lnRef>
+          <a:fillRef idx="1">
+            <a:schemeClr val="accent1"/>
+          </a:fillRef>
+          <a:effectRef idx="0">
+            <a:schemeClr val="accent1"/>
+          </a:effectRef>
+          <a:fontRef idx="minor">
+            <a:schemeClr val="lt1"/>
+          </a:fontRef>
+        </p:style>
+        <p:txBody>
+          <a:bodyPr rtlCol="0" anchor="ctr"/>
+          <a:lstStyle/>
+          <a:p>
+            <a:pPr algn="ctr"/>
+            <a:r>
+              <a:rPr lang="fr-FR" dirty="0" smtClean="0">
+                <a:solidFill>
+                  <a:schemeClr val="bg1"/>
+                </a:solidFill>
+              </a:rPr>
+              <a:t>P4</a:t>
+            </a:r>
+          </a:p>
+        </p:txBody>
+      </p:sp>
+      <p:sp>
+        <p:nvSpPr>
+          <p:cNvPr id="8" name="Rectangle 7"/>
+          <p:cNvSpPr/>
+          <p:nvPr/>
+        </p:nvSpPr>
+        <p:spPr>
+          <a:xfrm>
+            <a:off x="6104457" y="3395940"/>
+            <a:ext cx="569344" cy="500332"/>
+          </a:xfrm>
+          <a:prstGeom prst="rect">
+            <a:avLst/>
+          </a:prstGeom>
+          <a:solidFill>
+            <a:schemeClr val="accent6">
+              <a:lumMod val="40000"/>
+              <a:lumOff val="60000"/>
+            </a:schemeClr>
+          </a:solidFill>
+          <a:ln>
+            <a:prstDash val="dash"/>
+          </a:ln>
+        </p:spPr>
+        <p:style>
+          <a:lnRef idx="2">
+            <a:schemeClr val="accent1">
+              <a:shade val="50000"/>
+            </a:schemeClr>
+          </a:lnRef>
+          <a:fillRef idx="1">
+            <a:schemeClr val="accent1"/>
+          </a:fillRef>
+          <a:effectRef idx="0">
+            <a:schemeClr val="accent1"/>
+          </a:effectRef>
+          <a:fontRef idx="minor">
+            <a:schemeClr val="lt1"/>
+          </a:fontRef>
+        </p:style>
+        <p:txBody>
+          <a:bodyPr rtlCol="0" anchor="ctr"/>
+          <a:lstStyle/>
+          <a:p>
+            <a:pPr algn="ctr"/>
+            <a:r>
+              <a:rPr lang="fr-FR" dirty="0" smtClean="0">
+                <a:solidFill>
+                  <a:schemeClr val="bg1"/>
+                </a:solidFill>
+              </a:rPr>
+              <a:t>P1</a:t>
+            </a:r>
+          </a:p>
+        </p:txBody>
+      </p:sp>
+      <p:sp>
+        <p:nvSpPr>
+          <p:cNvPr id="9" name="Rectangle 8"/>
+          <p:cNvSpPr/>
+          <p:nvPr/>
+        </p:nvSpPr>
+        <p:spPr>
+          <a:xfrm>
+            <a:off x="5247615" y="3393072"/>
+            <a:ext cx="569344" cy="500332"/>
+          </a:xfrm>
+          <a:prstGeom prst="rect">
+            <a:avLst/>
+          </a:prstGeom>
+          <a:solidFill>
+            <a:schemeClr val="accent6">
+              <a:lumMod val="60000"/>
+              <a:lumOff val="40000"/>
+            </a:schemeClr>
+          </a:solidFill>
+        </p:spPr>
+        <p:style>
+          <a:lnRef idx="2">
+            <a:schemeClr val="accent1">
+              <a:shade val="50000"/>
+            </a:schemeClr>
+          </a:lnRef>
+          <a:fillRef idx="1">
+            <a:schemeClr val="accent1"/>
+          </a:fillRef>
+          <a:effectRef idx="0">
+            <a:schemeClr val="accent1"/>
+          </a:effectRef>
+          <a:fontRef idx="minor">
+            <a:schemeClr val="lt1"/>
+          </a:fontRef>
+        </p:style>
+        <p:txBody>
+          <a:bodyPr rtlCol="0" anchor="ctr"/>
+          <a:lstStyle/>
+          <a:p>
+            <a:pPr algn="ctr"/>
+            <a:r>
+              <a:rPr lang="fr-FR" dirty="0" smtClean="0">
+                <a:solidFill>
+                  <a:schemeClr val="bg1"/>
+                </a:solidFill>
+              </a:rPr>
+              <a:t>P2</a:t>
+            </a:r>
+          </a:p>
+        </p:txBody>
+      </p:sp>
+      <p:sp>
+        <p:nvSpPr>
+          <p:cNvPr id="10" name="Rectangle 9"/>
+          <p:cNvSpPr/>
+          <p:nvPr/>
+        </p:nvSpPr>
+        <p:spPr>
+          <a:xfrm>
+            <a:off x="4356269" y="3381578"/>
+            <a:ext cx="569344" cy="500332"/>
+          </a:xfrm>
+          <a:prstGeom prst="rect">
+            <a:avLst/>
+          </a:prstGeom>
+          <a:solidFill>
+            <a:schemeClr val="accent6">
+              <a:lumMod val="60000"/>
+              <a:lumOff val="40000"/>
+            </a:schemeClr>
+          </a:solidFill>
+        </p:spPr>
+        <p:style>
+          <a:lnRef idx="2">
+            <a:schemeClr val="accent1">
+              <a:shade val="50000"/>
+            </a:schemeClr>
+          </a:lnRef>
+          <a:fillRef idx="1">
+            <a:schemeClr val="accent1"/>
+          </a:fillRef>
+          <a:effectRef idx="0">
+            <a:schemeClr val="accent1"/>
+          </a:effectRef>
+          <a:fontRef idx="minor">
+            <a:schemeClr val="lt1"/>
+          </a:fontRef>
+        </p:style>
+        <p:txBody>
+          <a:bodyPr rtlCol="0" anchor="ctr"/>
+          <a:lstStyle/>
+          <a:p>
+            <a:pPr algn="ctr"/>
+            <a:r>
+              <a:rPr lang="fr-FR" dirty="0" smtClean="0">
+                <a:solidFill>
+                  <a:schemeClr val="bg1"/>
+                </a:solidFill>
+              </a:rPr>
+              <a:t>P3</a:t>
+            </a:r>
+          </a:p>
+        </p:txBody>
+      </p:sp>
+      <p:cxnSp>
+        <p:nvCxnSpPr>
+          <p:cNvPr id="12" name="Connecteur en arc 11"/>
+          <p:cNvCxnSpPr>
+            <a:stCxn id="8" idx="3"/>
+            <a:endCxn id="6" idx="1"/>
+          </p:cNvCxnSpPr>
+          <p:nvPr/>
+        </p:nvCxnSpPr>
+        <p:spPr>
+          <a:xfrm flipH="1" flipV="1">
+            <a:off x="2188138" y="3623515"/>
+            <a:ext cx="4485663" cy="22591"/>
+          </a:xfrm>
+          <a:prstGeom prst="curvedConnector5">
+            <a:avLst>
+              <a:gd name="adj1" fmla="val -15866"/>
+              <a:gd name="adj2" fmla="val -3926679"/>
+              <a:gd name="adj3" fmla="val 111827"/>
+            </a:avLst>
+          </a:prstGeom>
+          <a:ln w="38100">
+            <a:solidFill>
+              <a:schemeClr val="accent6">
+                <a:lumMod val="60000"/>
+                <a:lumOff val="40000"/>
+              </a:schemeClr>
+            </a:solidFill>
+            <a:prstDash val="dash"/>
+            <a:tailEnd type="arrow"/>
+          </a:ln>
+        </p:spPr>
+        <p:style>
+          <a:lnRef idx="1">
+            <a:schemeClr val="accent1"/>
+          </a:lnRef>
+          <a:fillRef idx="0">
+            <a:schemeClr val="accent1"/>
+          </a:fillRef>
+          <a:effectRef idx="0">
+            <a:schemeClr val="accent1"/>
+          </a:effectRef>
+          <a:fontRef idx="minor">
+            <a:schemeClr val="tx1"/>
+          </a:fontRef>
+        </p:style>
+      </p:cxnSp>
+      <p:sp>
+        <p:nvSpPr>
+          <p:cNvPr id="17" name="Rectangle 16"/>
+          <p:cNvSpPr/>
+          <p:nvPr/>
+        </p:nvSpPr>
+        <p:spPr>
+          <a:xfrm>
+            <a:off x="2556303" y="3384446"/>
+            <a:ext cx="569344" cy="500332"/>
+          </a:xfrm>
+          <a:prstGeom prst="rect">
+            <a:avLst/>
+          </a:prstGeom>
+          <a:solidFill>
+            <a:schemeClr val="accent6">
+              <a:lumMod val="40000"/>
+              <a:lumOff val="60000"/>
+            </a:schemeClr>
+          </a:solidFill>
+          <a:ln>
+            <a:prstDash val="dash"/>
+          </a:ln>
+        </p:spPr>
+        <p:style>
+          <a:lnRef idx="2">
+            <a:schemeClr val="accent1">
+              <a:shade val="50000"/>
+            </a:schemeClr>
+          </a:lnRef>
+          <a:fillRef idx="1">
+            <a:schemeClr val="accent1"/>
+          </a:fillRef>
+          <a:effectRef idx="0">
+            <a:schemeClr val="accent1"/>
+          </a:effectRef>
+          <a:fontRef idx="minor">
+            <a:schemeClr val="lt1"/>
+          </a:fontRef>
+        </p:style>
+        <p:txBody>
+          <a:bodyPr rtlCol="0" anchor="ctr"/>
+          <a:lstStyle/>
+          <a:p>
+            <a:pPr algn="ctr"/>
+            <a:r>
+              <a:rPr lang="fr-FR" dirty="0" smtClean="0">
+                <a:solidFill>
+                  <a:schemeClr val="bg1"/>
+                </a:solidFill>
+              </a:rPr>
+              <a:t>P1</a:t>
+            </a:r>
+          </a:p>
+        </p:txBody>
+      </p:sp>
+      <p:sp>
+        <p:nvSpPr>
+          <p:cNvPr id="18" name="Organigramme : Ou 17"/>
+          <p:cNvSpPr/>
+          <p:nvPr/>
+        </p:nvSpPr>
+        <p:spPr>
+          <a:xfrm>
+            <a:off x="457201" y="4800535"/>
+            <a:ext cx="224286" cy="215660"/>
+          </a:xfrm>
+          <a:prstGeom prst="flowChartOr">
+            <a:avLst/>
+          </a:prstGeom>
+          <a:solidFill>
+            <a:srgbClr val="00B050"/>
+          </a:solidFill>
+        </p:spPr>
+        <p:style>
+          <a:lnRef idx="2">
+            <a:schemeClr val="accent1">
+              <a:shade val="50000"/>
+            </a:schemeClr>
+          </a:lnRef>
+          <a:fillRef idx="1">
+            <a:schemeClr val="accent1"/>
+          </a:fillRef>
+          <a:effectRef idx="0">
+            <a:schemeClr val="accent1"/>
+          </a:effectRef>
+          <a:fontRef idx="minor">
+            <a:schemeClr val="lt1"/>
+          </a:fontRef>
+        </p:style>
+        <p:txBody>
+          <a:bodyPr rtlCol="0" anchor="ctr"/>
+          <a:lstStyle/>
+          <a:p>
+            <a:pPr algn="ctr"/>
+            <a:endParaRPr lang="fr-FR"/>
+          </a:p>
+        </p:txBody>
+      </p:sp>
+      <p:sp>
+        <p:nvSpPr>
+          <p:cNvPr id="19" name="Organigramme : Jonction de sommaire 18"/>
+          <p:cNvSpPr/>
+          <p:nvPr/>
+        </p:nvSpPr>
+        <p:spPr>
+          <a:xfrm>
+            <a:off x="451465" y="5591259"/>
+            <a:ext cx="227154" cy="215660"/>
+          </a:xfrm>
+          <a:prstGeom prst="flowChartSummingJunction">
+            <a:avLst/>
+          </a:prstGeom>
+          <a:solidFill>
+            <a:srgbClr val="C00000"/>
+          </a:solidFill>
+        </p:spPr>
+        <p:style>
+          <a:lnRef idx="2">
+            <a:schemeClr val="accent1">
+              <a:shade val="50000"/>
+            </a:schemeClr>
+          </a:lnRef>
+          <a:fillRef idx="1">
+            <a:schemeClr val="accent1"/>
+          </a:fillRef>
+          <a:effectRef idx="0">
+            <a:schemeClr val="accent1"/>
+          </a:effectRef>
+          <a:fontRef idx="minor">
+            <a:schemeClr val="lt1"/>
+          </a:fontRef>
+        </p:style>
+        <p:txBody>
+          <a:bodyPr rtlCol="0" anchor="ctr"/>
+          <a:lstStyle/>
+          <a:p>
+            <a:pPr algn="ctr"/>
+            <a:endParaRPr lang="fr-FR"/>
+          </a:p>
+        </p:txBody>
+      </p:sp>
+      <p:sp>
+        <p:nvSpPr>
+          <p:cNvPr id="20" name="Organigramme : Jonction de sommaire 19"/>
+          <p:cNvSpPr/>
+          <p:nvPr/>
+        </p:nvSpPr>
+        <p:spPr>
+          <a:xfrm>
+            <a:off x="451465" y="5996681"/>
+            <a:ext cx="227154" cy="215660"/>
+          </a:xfrm>
+          <a:prstGeom prst="flowChartSummingJunction">
+            <a:avLst/>
+          </a:prstGeom>
+          <a:solidFill>
+            <a:srgbClr val="C00000"/>
+          </a:solidFill>
+        </p:spPr>
+        <p:style>
+          <a:lnRef idx="2">
+            <a:schemeClr val="accent1">
+              <a:shade val="50000"/>
+            </a:schemeClr>
+          </a:lnRef>
+          <a:fillRef idx="1">
+            <a:schemeClr val="accent1"/>
+          </a:fillRef>
+          <a:effectRef idx="0">
+            <a:schemeClr val="accent1"/>
+          </a:effectRef>
+          <a:fontRef idx="minor">
+            <a:schemeClr val="lt1"/>
+          </a:fontRef>
+        </p:style>
+        <p:txBody>
+          <a:bodyPr rtlCol="0" anchor="ctr"/>
+          <a:lstStyle/>
+          <a:p>
+            <a:pPr algn="ctr"/>
+            <a:endParaRPr lang="fr-FR"/>
+          </a:p>
+        </p:txBody>
+      </p:sp>
+    </p:spTree>
+    <p:extLst>
+      <p:ext uri="{BB962C8B-B14F-4D97-AF65-F5344CB8AC3E}">
+        <p14:creationId xmlns:p14="http://schemas.microsoft.com/office/powerpoint/2010/main" val="3065433026"/>
+      </p:ext>
+    </p:extLst>
+  </p:cSld>
+  <p:clrMapOvr>
+    <a:masterClrMapping/>
+  </p:clrMapOvr>
+  <p:timing>
+    <p:tnLst>
+      <p:par>
+        <p:cTn id="1" dur="indefinite" restart="never" nodeType="tmRoot">
+          <p:childTnLst>
+            <p:seq concurrent="1" nextAc="seek">
+              <p:cTn id="2" dur="indefinite" nodeType="mainSeq">
+                <p:childTnLst>
+                  <p:par>
+                    <p:cTn id="3" fill="hold">
+                      <p:stCondLst>
+                        <p:cond delay="indefinite"/>
+                      </p:stCondLst>
+                      <p:childTnLst>
+                        <p:par>
+                          <p:cTn id="4" fill="hold">
+                            <p:stCondLst>
+                              <p:cond delay="0"/>
+                            </p:stCondLst>
+                            <p:childTnLst>
+                              <p:par>
+                                <p:cTn id="5" presetID="10" presetClass="exit" presetSubtype="0" fill="hold" grpId="0" nodeType="clickEffect">
+                                  <p:stCondLst>
+                                    <p:cond delay="0"/>
+                                  </p:stCondLst>
+                                  <p:childTnLst>
+                                    <p:animEffect transition="out" filter="fade">
+                                      <p:cBhvr>
+                                        <p:cTn id="6" dur="500"/>
+                                        <p:tgtEl>
+                                          <p:spTgt spid="8"/>
+                                        </p:tgtEl>
+                                      </p:cBhvr>
+                                    </p:animEffect>
+                                    <p:set>
+                                      <p:cBhvr>
+                                        <p:cTn id="7" dur="1" fill="hold">
+                                          <p:stCondLst>
+                                            <p:cond delay="499"/>
+                                          </p:stCondLst>
+                                        </p:cTn>
+                                        <p:tgtEl>
+                                          <p:spTgt spid="8"/>
+                                        </p:tgtEl>
+                                        <p:attrNameLst>
+                                          <p:attrName>style.visibility</p:attrName>
+                                        </p:attrNameLst>
+                                      </p:cBhvr>
+                                      <p:to>
+                                        <p:strVal val="hidden"/>
+                                      </p:to>
+                                    </p:set>
+                                  </p:childTnLst>
+                                </p:cTn>
+                              </p:par>
+                              <p:par>
+                                <p:cTn id="8" presetID="10" presetClass="entr" presetSubtype="0" fill="hold" grpId="0" nodeType="withEffect">
+                                  <p:stCondLst>
+                                    <p:cond delay="0"/>
+                                  </p:stCondLst>
+                                  <p:childTnLst>
+                                    <p:set>
+                                      <p:cBhvr>
+                                        <p:cTn id="9" dur="1" fill="hold">
+                                          <p:stCondLst>
+                                            <p:cond delay="0"/>
+                                          </p:stCondLst>
+                                        </p:cTn>
+                                        <p:tgtEl>
+                                          <p:spTgt spid="17"/>
+                                        </p:tgtEl>
+                                        <p:attrNameLst>
+                                          <p:attrName>style.visibility</p:attrName>
+                                        </p:attrNameLst>
+                                      </p:cBhvr>
+                                      <p:to>
+                                        <p:strVal val="visible"/>
+                                      </p:to>
+                                    </p:set>
+                                    <p:animEffect transition="in" filter="fade">
+                                      <p:cBhvr>
+                                        <p:cTn id="10" dur="500"/>
+                                        <p:tgtEl>
+                                          <p:spTgt spid="17"/>
+                                        </p:tgtEl>
+                                      </p:cBhvr>
+                                    </p:animEffect>
+                                  </p:childTnLst>
+                                </p:cTn>
+                              </p:par>
+                            </p:childTnLst>
+                          </p:cTn>
+                        </p:par>
+                      </p:childTnLst>
+                    </p:cTn>
+                  </p:par>
+                </p:childTnLst>
+              </p:cTn>
+              <p:prevCondLst>
+                <p:cond evt="onPrev" delay="0">
+                  <p:tgtEl>
+                    <p:sldTgt/>
+                  </p:tgtEl>
+                </p:cond>
+              </p:prevCondLst>
+              <p:nextCondLst>
+                <p:cond evt="onNext" delay="0">
+                  <p:tgtEl>
+                    <p:sldTgt/>
+                  </p:tgtEl>
+                </p:cond>
+              </p:nextCondLst>
+            </p:seq>
+          </p:childTnLst>
+        </p:cTn>
+      </p:par>
+    </p:tnLst>
+    <p:bldLst>
+      <p:bldP spid="8" grpId="0" animBg="1"/>
+      <p:bldP spid="17" grpId="0" animBg="1"/>
+    </p:bldLst>
+  </p:timing>
+</p:sld>
+</file>
+
+<file path=ppt/slides/slide6.xml><?xml version="1.0" encoding="utf-8"?>
+<p:sld xmlns:a="http://schemas.openxmlformats.org/drawingml/2006/main" xmlns:r="http://schemas.openxmlformats.org/officeDocument/2006/relationships" xmlns:p="http://schemas.openxmlformats.org/presentationml/2006/main">
+  <p:cSld>
+    <p:spTree>
+      <p:nvGrpSpPr>
+        <p:cNvPr id="1" name=""/>
+        <p:cNvGrpSpPr/>
+        <p:nvPr/>
+      </p:nvGrpSpPr>
+      <p:grpSpPr>
+        <a:xfrm>
+          <a:off x="0" y="0"/>
+          <a:ext cx="0" cy="0"/>
+          <a:chOff x="0" y="0"/>
+          <a:chExt cx="0" cy="0"/>
+        </a:xfrm>
+      </p:grpSpPr>
+      <p:sp>
+        <p:nvSpPr>
+          <p:cNvPr id="18" name="Rectangle 17"/>
+          <p:cNvSpPr/>
+          <p:nvPr/>
+        </p:nvSpPr>
+        <p:spPr>
+          <a:xfrm>
+            <a:off x="1104923" y="2024094"/>
+            <a:ext cx="2414726" cy="1694226"/>
+          </a:xfrm>
+          <a:prstGeom prst="rect">
+            <a:avLst/>
+          </a:prstGeom>
+        </p:spPr>
+        <p:style>
+          <a:lnRef idx="1">
+            <a:schemeClr val="accent2"/>
+          </a:lnRef>
+          <a:fillRef idx="3">
+            <a:schemeClr val="accent2"/>
+          </a:fillRef>
+          <a:effectRef idx="2">
+            <a:schemeClr val="accent2"/>
+          </a:effectRef>
+          <a:fontRef idx="minor">
+            <a:schemeClr val="lt1"/>
+          </a:fontRef>
+        </p:style>
+        <p:txBody>
+          <a:bodyPr rtlCol="0" anchor="ctr"/>
+          <a:lstStyle/>
+          <a:p>
+            <a:pPr algn="ctr"/>
+            <a:endParaRPr lang="fr-FR" dirty="0"/>
+          </a:p>
+        </p:txBody>
+      </p:sp>
+      <p:sp>
+        <p:nvSpPr>
+          <p:cNvPr id="13" name="Rectangle 12"/>
+          <p:cNvSpPr/>
+          <p:nvPr/>
+        </p:nvSpPr>
+        <p:spPr>
+          <a:xfrm>
+            <a:off x="5907307" y="2022097"/>
+            <a:ext cx="2414726" cy="3776809"/>
+          </a:xfrm>
+          <a:prstGeom prst="rect">
+            <a:avLst/>
+          </a:prstGeom>
+        </p:spPr>
+        <p:style>
+          <a:lnRef idx="1">
+            <a:schemeClr val="accent2"/>
+          </a:lnRef>
+          <a:fillRef idx="3">
+            <a:schemeClr val="accent2"/>
+          </a:fillRef>
+          <a:effectRef idx="2">
+            <a:schemeClr val="accent2"/>
+          </a:effectRef>
+          <a:fontRef idx="minor">
+            <a:schemeClr val="lt1"/>
+          </a:fontRef>
+        </p:style>
+        <p:txBody>
+          <a:bodyPr rtlCol="0" anchor="ctr"/>
+          <a:lstStyle/>
+          <a:p>
+            <a:pPr algn="ctr"/>
+            <a:endParaRPr lang="fr-FR" dirty="0"/>
+          </a:p>
+        </p:txBody>
+      </p:sp>
+      <p:sp>
+        <p:nvSpPr>
+          <p:cNvPr id="2" name="Titre 1"/>
+          <p:cNvSpPr>
+            <a:spLocks noGrp="1"/>
+          </p:cNvSpPr>
+          <p:nvPr>
+            <p:ph type="title"/>
+          </p:nvPr>
+        </p:nvSpPr>
+        <p:spPr/>
+        <p:txBody>
+          <a:bodyPr/>
+          <a:lstStyle/>
+          <a:p>
+            <a:r>
+              <a:rPr lang="fr-FR" dirty="0" smtClean="0"/>
+              <a:t>Architecture : </a:t>
+            </a:r>
+            <a:r>
+              <a:rPr lang="fr-FR" dirty="0" err="1" smtClean="0"/>
+              <a:t>FIFOs</a:t>
+            </a:r>
+            <a:endParaRPr lang="fr-FR" dirty="0"/>
+          </a:p>
+        </p:txBody>
+      </p:sp>
+      <p:sp>
+        <p:nvSpPr>
+          <p:cNvPr id="5" name="Rectangle 4"/>
+          <p:cNvSpPr/>
+          <p:nvPr/>
+        </p:nvSpPr>
+        <p:spPr>
+          <a:xfrm>
+            <a:off x="6141260" y="3534491"/>
+            <a:ext cx="1938465" cy="543125"/>
+          </a:xfrm>
+          <a:prstGeom prst="rect">
+            <a:avLst/>
+          </a:prstGeom>
+        </p:spPr>
+        <p:style>
+          <a:lnRef idx="1">
+            <a:schemeClr val="accent1"/>
+          </a:lnRef>
+          <a:fillRef idx="3">
+            <a:schemeClr val="accent1"/>
+          </a:fillRef>
+          <a:effectRef idx="2">
+            <a:schemeClr val="accent1"/>
+          </a:effectRef>
+          <a:fontRef idx="minor">
+            <a:schemeClr val="lt1"/>
+          </a:fontRef>
+        </p:style>
+        <p:txBody>
+          <a:bodyPr rtlCol="0" anchor="ctr"/>
+          <a:lstStyle/>
+          <a:p>
+            <a:pPr algn="ctr"/>
+            <a:r>
+              <a:rPr lang="fr-FR" dirty="0" smtClean="0"/>
+              <a:t>Round Robin …</a:t>
+            </a:r>
+            <a:endParaRPr lang="fr-FR" dirty="0"/>
+          </a:p>
+        </p:txBody>
+      </p:sp>
+      <p:sp>
+        <p:nvSpPr>
+          <p:cNvPr id="6" name="Rectangle 5"/>
+          <p:cNvSpPr/>
+          <p:nvPr/>
+        </p:nvSpPr>
+        <p:spPr>
+          <a:xfrm>
+            <a:off x="1455851" y="4363709"/>
+            <a:ext cx="1696157" cy="543125"/>
+          </a:xfrm>
+          <a:prstGeom prst="rect">
+            <a:avLst/>
+          </a:prstGeom>
+        </p:spPr>
+        <p:style>
+          <a:lnRef idx="1">
+            <a:schemeClr val="accent1"/>
+          </a:lnRef>
+          <a:fillRef idx="3">
+            <a:schemeClr val="accent1"/>
+          </a:fillRef>
+          <a:effectRef idx="2">
+            <a:schemeClr val="accent1"/>
+          </a:effectRef>
+          <a:fontRef idx="minor">
+            <a:schemeClr val="lt1"/>
+          </a:fontRef>
+        </p:style>
+        <p:txBody>
+          <a:bodyPr rtlCol="0" anchor="ctr"/>
+          <a:lstStyle/>
+          <a:p>
+            <a:pPr algn="ctr"/>
+            <a:r>
+              <a:rPr lang="fr-FR" dirty="0" smtClean="0"/>
+              <a:t>Pause</a:t>
+            </a:r>
+            <a:endParaRPr lang="fr-FR" dirty="0"/>
+          </a:p>
+        </p:txBody>
+      </p:sp>
+      <p:sp>
+        <p:nvSpPr>
+          <p:cNvPr id="8" name="Rectangle 7"/>
+          <p:cNvSpPr/>
+          <p:nvPr/>
+        </p:nvSpPr>
+        <p:spPr>
+          <a:xfrm>
+            <a:off x="6143262" y="4288507"/>
+            <a:ext cx="1938465" cy="543125"/>
+          </a:xfrm>
+          <a:prstGeom prst="rect">
+            <a:avLst/>
+          </a:prstGeom>
+        </p:spPr>
+        <p:style>
+          <a:lnRef idx="1">
+            <a:schemeClr val="accent1"/>
+          </a:lnRef>
+          <a:fillRef idx="3">
+            <a:schemeClr val="accent1"/>
+          </a:fillRef>
+          <a:effectRef idx="2">
+            <a:schemeClr val="accent1"/>
+          </a:effectRef>
+          <a:fontRef idx="minor">
+            <a:schemeClr val="lt1"/>
+          </a:fontRef>
+        </p:style>
+        <p:txBody>
+          <a:bodyPr rtlCol="0" anchor="ctr"/>
+          <a:lstStyle/>
+          <a:p>
+            <a:pPr algn="ctr"/>
+            <a:r>
+              <a:rPr lang="fr-FR" dirty="0" smtClean="0"/>
+              <a:t>Round Robin 1</a:t>
+            </a:r>
+            <a:endParaRPr lang="fr-FR" dirty="0"/>
+          </a:p>
+        </p:txBody>
+      </p:sp>
+      <p:sp>
+        <p:nvSpPr>
+          <p:cNvPr id="9" name="Rectangle 8"/>
+          <p:cNvSpPr/>
+          <p:nvPr/>
+        </p:nvSpPr>
+        <p:spPr>
+          <a:xfrm>
+            <a:off x="6145263" y="5050878"/>
+            <a:ext cx="1938465" cy="543125"/>
+          </a:xfrm>
+          <a:prstGeom prst="rect">
+            <a:avLst/>
+          </a:prstGeom>
+        </p:spPr>
+        <p:style>
+          <a:lnRef idx="1">
+            <a:schemeClr val="accent1"/>
+          </a:lnRef>
+          <a:fillRef idx="3">
+            <a:schemeClr val="accent1"/>
+          </a:fillRef>
+          <a:effectRef idx="2">
+            <a:schemeClr val="accent1"/>
+          </a:effectRef>
+          <a:fontRef idx="minor">
+            <a:schemeClr val="lt1"/>
+          </a:fontRef>
+        </p:style>
+        <p:txBody>
+          <a:bodyPr rtlCol="0" anchor="ctr"/>
+          <a:lstStyle/>
+          <a:p>
+            <a:pPr algn="ctr"/>
+            <a:r>
+              <a:rPr lang="fr-FR" dirty="0" smtClean="0"/>
+              <a:t>Round Robin 0</a:t>
+            </a:r>
+            <a:endParaRPr lang="fr-FR" dirty="0"/>
+          </a:p>
+        </p:txBody>
+      </p:sp>
+      <p:sp>
+        <p:nvSpPr>
+          <p:cNvPr id="10" name="Rectangle 9"/>
+          <p:cNvSpPr/>
+          <p:nvPr/>
+        </p:nvSpPr>
+        <p:spPr>
+          <a:xfrm>
+            <a:off x="1432789" y="2886734"/>
+            <a:ext cx="1696157" cy="543125"/>
+          </a:xfrm>
+          <a:prstGeom prst="rect">
+            <a:avLst/>
+          </a:prstGeom>
+        </p:spPr>
+        <p:style>
+          <a:lnRef idx="1">
+            <a:schemeClr val="accent1"/>
+          </a:lnRef>
+          <a:fillRef idx="3">
+            <a:schemeClr val="accent1"/>
+          </a:fillRef>
+          <a:effectRef idx="2">
+            <a:schemeClr val="accent1"/>
+          </a:effectRef>
+          <a:fontRef idx="minor">
+            <a:schemeClr val="lt1"/>
+          </a:fontRef>
+        </p:style>
+        <p:txBody>
+          <a:bodyPr rtlCol="0" anchor="ctr"/>
+          <a:lstStyle/>
+          <a:p>
+            <a:pPr algn="ctr"/>
+            <a:r>
+              <a:rPr lang="fr-FR" dirty="0" smtClean="0"/>
+              <a:t>Liste </a:t>
+            </a:r>
+            <a:r>
+              <a:rPr lang="fr-FR" dirty="0" smtClean="0"/>
+              <a:t>d’attente</a:t>
+            </a:r>
+            <a:endParaRPr lang="fr-FR" dirty="0"/>
+          </a:p>
+        </p:txBody>
+      </p:sp>
+      <p:sp>
+        <p:nvSpPr>
+          <p:cNvPr id="12" name="Rectangle 11"/>
+          <p:cNvSpPr/>
+          <p:nvPr/>
+        </p:nvSpPr>
+        <p:spPr>
+          <a:xfrm>
+            <a:off x="6143262" y="2784468"/>
+            <a:ext cx="1938465" cy="543125"/>
+          </a:xfrm>
+          <a:prstGeom prst="rect">
+            <a:avLst/>
+          </a:prstGeom>
+        </p:spPr>
+        <p:style>
+          <a:lnRef idx="1">
+            <a:schemeClr val="accent1"/>
+          </a:lnRef>
+          <a:fillRef idx="3">
+            <a:schemeClr val="accent1"/>
+          </a:fillRef>
+          <a:effectRef idx="2">
+            <a:schemeClr val="accent1"/>
+          </a:effectRef>
+          <a:fontRef idx="minor">
+            <a:schemeClr val="lt1"/>
+          </a:fontRef>
+        </p:style>
+        <p:txBody>
+          <a:bodyPr rtlCol="0" anchor="ctr"/>
+          <a:lstStyle/>
+          <a:p>
+            <a:pPr algn="ctr"/>
+            <a:r>
+              <a:rPr lang="en-CA" dirty="0" err="1" smtClean="0"/>
+              <a:t>Collaboratif</a:t>
+            </a:r>
+            <a:endParaRPr lang="fr-FR" dirty="0"/>
+          </a:p>
+        </p:txBody>
+      </p:sp>
+      <p:sp>
+        <p:nvSpPr>
+          <p:cNvPr id="14" name="ZoneTexte 13"/>
+          <p:cNvSpPr txBox="1"/>
+          <p:nvPr/>
+        </p:nvSpPr>
+        <p:spPr>
+          <a:xfrm>
+            <a:off x="6224813" y="2164147"/>
+            <a:ext cx="1775809" cy="369332"/>
+          </a:xfrm>
+          <a:prstGeom prst="rect">
+            <a:avLst/>
+          </a:prstGeom>
+          <a:noFill/>
+        </p:spPr>
+        <p:txBody>
+          <a:bodyPr wrap="none" rtlCol="0">
+            <a:spAutoFit/>
+          </a:bodyPr>
+          <a:lstStyle/>
+          <a:p>
+            <a:pPr algn="ctr"/>
+            <a:r>
+              <a:rPr lang="fr-FR" dirty="0" smtClean="0">
+                <a:solidFill>
+                  <a:schemeClr val="bg1"/>
+                </a:solidFill>
+              </a:rPr>
+              <a:t>Ordonnanceurs</a:t>
+            </a:r>
+            <a:endParaRPr lang="fr-FR" dirty="0">
+              <a:solidFill>
+                <a:schemeClr val="bg1"/>
+              </a:solidFill>
+            </a:endParaRPr>
+          </a:p>
+        </p:txBody>
+      </p:sp>
+      <p:sp>
+        <p:nvSpPr>
+          <p:cNvPr id="15" name="ZoneTexte 14"/>
+          <p:cNvSpPr txBox="1"/>
+          <p:nvPr/>
+        </p:nvSpPr>
+        <p:spPr>
+          <a:xfrm>
+            <a:off x="1612956" y="2283124"/>
+            <a:ext cx="1378052" cy="369332"/>
+          </a:xfrm>
+          <a:prstGeom prst="rect">
+            <a:avLst/>
+          </a:prstGeom>
+          <a:noFill/>
+        </p:spPr>
+        <p:txBody>
+          <a:bodyPr wrap="none" rtlCol="0">
+            <a:spAutoFit/>
+          </a:bodyPr>
+          <a:lstStyle/>
+          <a:p>
+            <a:pPr algn="ctr"/>
+            <a:r>
+              <a:rPr lang="fr-FR" dirty="0" smtClean="0">
+                <a:solidFill>
+                  <a:schemeClr val="bg1"/>
+                </a:solidFill>
+              </a:rPr>
+              <a:t>Sémaphore</a:t>
+            </a:r>
+            <a:endParaRPr lang="fr-FR" dirty="0">
+              <a:solidFill>
+                <a:schemeClr val="bg1"/>
+              </a:solidFill>
+            </a:endParaRPr>
+          </a:p>
+        </p:txBody>
+      </p:sp>
+      <p:cxnSp>
+        <p:nvCxnSpPr>
+          <p:cNvPr id="17" name="Connecteur droit 16"/>
+          <p:cNvCxnSpPr/>
+          <p:nvPr/>
+        </p:nvCxnSpPr>
+        <p:spPr>
+          <a:xfrm>
+            <a:off x="4603865" y="1729645"/>
+            <a:ext cx="16711" cy="4746078"/>
+          </a:xfrm>
+          <a:prstGeom prst="line">
+            <a:avLst/>
+          </a:prstGeom>
+          <a:ln>
+            <a:solidFill>
+              <a:schemeClr val="accent2"/>
+            </a:solidFill>
+            <a:prstDash val="dash"/>
+          </a:ln>
+        </p:spPr>
+        <p:style>
+          <a:lnRef idx="2">
+            <a:schemeClr val="accent1"/>
+          </a:lnRef>
+          <a:fillRef idx="0">
+            <a:schemeClr val="accent1"/>
+          </a:fillRef>
+          <a:effectRef idx="1">
+            <a:schemeClr val="accent1"/>
+          </a:effectRef>
+          <a:fontRef idx="minor">
+            <a:schemeClr val="tx1"/>
+          </a:fontRef>
+        </p:style>
+      </p:cxnSp>
+      <p:sp>
+        <p:nvSpPr>
+          <p:cNvPr id="19" name="ZoneTexte 18"/>
+          <p:cNvSpPr txBox="1"/>
+          <p:nvPr/>
+        </p:nvSpPr>
+        <p:spPr>
+          <a:xfrm>
+            <a:off x="3506841" y="5999444"/>
+            <a:ext cx="890576" cy="369332"/>
+          </a:xfrm>
+          <a:prstGeom prst="rect">
+            <a:avLst/>
+          </a:prstGeom>
+          <a:noFill/>
+        </p:spPr>
+        <p:txBody>
+          <a:bodyPr wrap="none" rtlCol="0">
+            <a:spAutoFit/>
+          </a:bodyPr>
+          <a:lstStyle/>
+          <a:p>
+            <a:pPr algn="r"/>
+            <a:r>
+              <a:rPr lang="fr-FR" dirty="0" smtClean="0"/>
+              <a:t>attente</a:t>
+            </a:r>
+            <a:endParaRPr lang="fr-FR" dirty="0"/>
+          </a:p>
+        </p:txBody>
+      </p:sp>
+      <p:sp>
+        <p:nvSpPr>
+          <p:cNvPr id="20" name="ZoneTexte 19"/>
+          <p:cNvSpPr txBox="1"/>
+          <p:nvPr/>
+        </p:nvSpPr>
+        <p:spPr>
+          <a:xfrm>
+            <a:off x="4819722" y="6001440"/>
+            <a:ext cx="1762021" cy="369332"/>
+          </a:xfrm>
+          <a:prstGeom prst="rect">
+            <a:avLst/>
+          </a:prstGeom>
+          <a:noFill/>
+        </p:spPr>
+        <p:txBody>
+          <a:bodyPr wrap="none" rtlCol="0">
+            <a:spAutoFit/>
+          </a:bodyPr>
+          <a:lstStyle/>
+          <a:p>
+            <a:r>
+              <a:rPr lang="fr-FR" dirty="0" smtClean="0"/>
+              <a:t>prêt </a:t>
+            </a:r>
+            <a:r>
+              <a:rPr lang="fr-FR" dirty="0" smtClean="0"/>
+              <a:t>/ exécution</a:t>
+            </a:r>
+            <a:endParaRPr lang="fr-FR" dirty="0"/>
+          </a:p>
+        </p:txBody>
+      </p:sp>
+      <p:sp>
+        <p:nvSpPr>
+          <p:cNvPr id="16" name="Rectangle 15"/>
+          <p:cNvSpPr/>
+          <p:nvPr/>
+        </p:nvSpPr>
+        <p:spPr>
+          <a:xfrm>
+            <a:off x="1470235" y="5223441"/>
+            <a:ext cx="1696157" cy="543125"/>
+          </a:xfrm>
+          <a:prstGeom prst="rect">
+            <a:avLst/>
+          </a:prstGeom>
+        </p:spPr>
+        <p:style>
+          <a:lnRef idx="1">
+            <a:schemeClr val="accent1"/>
+          </a:lnRef>
+          <a:fillRef idx="3">
+            <a:schemeClr val="accent1"/>
+          </a:fillRef>
+          <a:effectRef idx="2">
+            <a:schemeClr val="accent1"/>
+          </a:effectRef>
+          <a:fontRef idx="minor">
+            <a:schemeClr val="lt1"/>
+          </a:fontRef>
+        </p:style>
+        <p:txBody>
+          <a:bodyPr rtlCol="0" anchor="ctr"/>
+          <a:lstStyle/>
+          <a:p>
+            <a:pPr algn="ctr"/>
+            <a:r>
+              <a:rPr lang="fr-FR" dirty="0" smtClean="0"/>
+              <a:t>Dormant</a:t>
+            </a:r>
+            <a:endParaRPr lang="fr-FR" dirty="0"/>
+          </a:p>
+        </p:txBody>
+      </p:sp>
+    </p:spTree>
+    <p:extLst>
+      <p:ext uri="{BB962C8B-B14F-4D97-AF65-F5344CB8AC3E}">
+        <p14:creationId xmlns:p14="http://schemas.microsoft.com/office/powerpoint/2010/main" val="1170686574"/>
+      </p:ext>
+    </p:extLst>
+  </p:cSld>
+  <p:clrMapOvr>
+    <a:masterClrMapping/>
+  </p:clrMapOvr>
+  <p:timing>
+    <p:tnLst>
+      <p:par>
+        <p:cTn id="1" dur="indefinite" restart="never" nodeType="tmRoot"/>
+      </p:par>
+    </p:tnLst>
+  </p:timing>
+</p:sld>
+</file>
+
+<file path=ppt/slides/slide7.xml><?xml version="1.0" encoding="utf-8"?>
+<p:sld xmlns:a="http://schemas.openxmlformats.org/drawingml/2006/main" xmlns:r="http://schemas.openxmlformats.org/officeDocument/2006/relationships" xmlns:p="http://schemas.openxmlformats.org/presentationml/2006/main">
+  <p:cSld>
+    <p:spTree>
+      <p:nvGrpSpPr>
+        <p:cNvPr id="1" name=""/>
+        <p:cNvGrpSpPr/>
+        <p:nvPr/>
+      </p:nvGrpSpPr>
+      <p:grpSpPr>
+        <a:xfrm>
+          <a:off x="0" y="0"/>
+          <a:ext cx="0" cy="0"/>
+          <a:chOff x="0" y="0"/>
+          <a:chExt cx="0" cy="0"/>
+        </a:xfrm>
+      </p:grpSpPr>
+      <p:sp>
+        <p:nvSpPr>
+          <p:cNvPr id="2" name="Titre 1"/>
+          <p:cNvSpPr>
+            <a:spLocks noGrp="1"/>
+          </p:cNvSpPr>
+          <p:nvPr>
+            <p:ph type="title"/>
+          </p:nvPr>
+        </p:nvSpPr>
+        <p:spPr/>
+        <p:txBody>
+          <a:bodyPr/>
+          <a:lstStyle/>
+          <a:p>
+            <a:r>
+              <a:rPr lang="fr-FR" dirty="0" err="1" smtClean="0"/>
+              <a:t>Process</a:t>
+            </a:r>
+            <a:r>
+              <a:rPr lang="fr-FR" dirty="0" smtClean="0"/>
+              <a:t> Control Block</a:t>
+            </a:r>
+            <a:endParaRPr lang="fr-FR" dirty="0"/>
+          </a:p>
+        </p:txBody>
+      </p:sp>
+      <p:sp>
+        <p:nvSpPr>
+          <p:cNvPr id="3" name="Espace réservé du contenu 2"/>
+          <p:cNvSpPr>
+            <a:spLocks noGrp="1"/>
+          </p:cNvSpPr>
+          <p:nvPr>
+            <p:ph idx="1"/>
+          </p:nvPr>
+        </p:nvSpPr>
+        <p:spPr/>
+        <p:txBody>
+          <a:bodyPr>
+            <a:normAutofit/>
+          </a:bodyPr>
+          <a:lstStyle/>
+          <a:p>
+            <a:r>
+              <a:rPr lang="fr-FR" dirty="0" smtClean="0"/>
+              <a:t>Un </a:t>
             </a:r>
             <a:r>
               <a:rPr lang="fr-FR" dirty="0" err="1" smtClean="0"/>
@@ -4366,7 +5739,35 @@
                 <a:latin typeface="Consolas" panose="020B0609020204030204" pitchFamily="49" charset="0"/>
                 <a:cs typeface="Consolas" panose="020B0609020204030204" pitchFamily="49" charset="0"/>
               </a:rPr>
-              <a:t>Liste chainée de tout les </a:t>
+              <a:t>Liste </a:t>
+            </a:r>
+            <a:r>
+              <a:rPr lang="fr-FR" dirty="0" smtClean="0">
+                <a:latin typeface="Consolas" panose="020B0609020204030204" pitchFamily="49" charset="0"/>
+                <a:cs typeface="Consolas" panose="020B0609020204030204" pitchFamily="49" charset="0"/>
+              </a:rPr>
+              <a:t>chaînée </a:t>
+            </a:r>
+            <a:r>
+              <a:rPr lang="fr-FR" dirty="0" smtClean="0">
+                <a:latin typeface="Consolas" panose="020B0609020204030204" pitchFamily="49" charset="0"/>
+                <a:cs typeface="Consolas" panose="020B0609020204030204" pitchFamily="49" charset="0"/>
+              </a:rPr>
+              <a:t>de </a:t>
+            </a:r>
+            <a:r>
+              <a:rPr lang="fr-FR" dirty="0" smtClean="0">
+                <a:latin typeface="Consolas" panose="020B0609020204030204" pitchFamily="49" charset="0"/>
+                <a:cs typeface="Consolas" panose="020B0609020204030204" pitchFamily="49" charset="0"/>
+              </a:rPr>
+              <a:t>tous </a:t>
+            </a:r>
+            <a:r>
+              <a:rPr lang="fr-FR" dirty="0" smtClean="0">
+                <a:latin typeface="Consolas" panose="020B0609020204030204" pitchFamily="49" charset="0"/>
+                <a:cs typeface="Consolas" panose="020B0609020204030204" pitchFamily="49" charset="0"/>
+              </a:rPr>
+              <a:t>les </a:t>
             </a:r>
             <a:r>
               <a:rPr lang="fr-FR" dirty="0" err="1" smtClean="0">
@@ -4396,8 +5797,35 @@
                 <a:latin typeface="Consolas" panose="020B0609020204030204" pitchFamily="49" charset="0"/>
                 <a:cs typeface="Consolas" panose="020B0609020204030204" pitchFamily="49" charset="0"/>
               </a:rPr>
-              <a:t>liste de l’ordonnanceur</a:t>
-            </a:r>
+              <a:t>liste de </a:t>
+            </a:r>
+            <a:r>
+              <a:rPr lang="fr-FR" dirty="0" smtClean="0">
+                <a:solidFill>
+                  <a:schemeClr val="tx2"/>
+                </a:solidFill>
+                <a:latin typeface="Consolas" panose="020B0609020204030204" pitchFamily="49" charset="0"/>
+                <a:cs typeface="Consolas" panose="020B0609020204030204" pitchFamily="49" charset="0"/>
+              </a:rPr>
+              <a:t>son </a:t>
+            </a:r>
+            <a:r>
+              <a:rPr lang="fr-FR" dirty="0" smtClean="0">
+                <a:solidFill>
+                  <a:schemeClr val="tx2"/>
+                </a:solidFill>
+                <a:latin typeface="Consolas" panose="020B0609020204030204" pitchFamily="49" charset="0"/>
+                <a:cs typeface="Consolas" panose="020B0609020204030204" pitchFamily="49" charset="0"/>
+              </a:rPr>
+              <a:t>ordonnanceur</a:t>
+            </a:r>
+            <a:endParaRPr lang="fr-FR" dirty="0" smtClean="0">
+              <a:solidFill>
+                <a:schemeClr val="tx2"/>
+              </a:solidFill>
+              <a:latin typeface="Consolas" panose="020B0609020204030204" pitchFamily="49" charset="0"/>
+              <a:cs typeface="Consolas" panose="020B0609020204030204" pitchFamily="49" charset="0"/>
+            </a:endParaRPr>
           </a:p>
           <a:p>
             <a:r>
@@ -4550,11 +5978,7 @@
             <a:pPr algn="ctr"/>
             <a:r>
               <a:rPr lang="fr-FR" dirty="0" err="1" smtClean="0"/>
-              <a:t>p</a:t>
-            </a:r>
-            <a:r>
-              <a:rPr lang="fr-FR" dirty="0" err="1" smtClean="0"/>
-              <a:t>id</a:t>
+              <a:t>pid</a:t>
             </a:r>
             <a:r>
               <a:rPr lang="fr-FR" dirty="0" smtClean="0"/>
@@ -4565,11 +5989,7 @@
             <a:pPr algn="ctr"/>
             <a:r>
               <a:rPr lang="fr-FR" dirty="0" smtClean="0"/>
-              <a:t>état</a:t>
-            </a:r>
-            <a:r>
-              <a:rPr lang="fr-FR" dirty="0" smtClean="0"/>
-              <a:t> = attente</a:t>
+              <a:t>état = attente</a:t>
             </a:r>
           </a:p>
         </p:txBody>
@@ -4747,14 +6167,14 @@
   <p:timing>
     <p:tnLst>
       <p:par>
-        <p:cTn xmlns:p14="http://schemas.microsoft.com/office/powerpoint/2010/main" id="1" dur="indefinite" restart="never" nodeType="tmRoot"/>
+        <p:cTn id="1" dur="indefinite" restart="never" nodeType="tmRoot"/>
       </p:par>
     </p:tnLst>
   </p:timing>
 </p:sld>
 </file>
 
-<file path=ppt/slides/slide5.xml><?xml version="1.0" encoding="utf-8"?>
+<file path=ppt/slides/slide8.xml><?xml version="1.0" encoding="utf-8"?>
 <p:sld xmlns:a="http://schemas.openxmlformats.org/drawingml/2006/main" xmlns:r="http://schemas.openxmlformats.org/officeDocument/2006/relationships" xmlns:p="http://schemas.openxmlformats.org/presentationml/2006/main">
   <p:cSld>
     <p:spTree>
@@ -5031,14 +6451,14 @@
   <p:timing>
     <p:tnLst>
       <p:par>
-        <p:cTn xmlns:p14="http://schemas.microsoft.com/office/powerpoint/2010/main" id="1" dur="indefinite" restart="never" nodeType="tmRoot"/>
+        <p:cTn id="1" dur="indefinite" restart="never" nodeType="tmRoot"/>
       </p:par>
     </p:tnLst>
   </p:timing>
 </p:sld>
 </file>
 
-<file path=ppt/slides/slide6.xml><?xml version="1.0" encoding="utf-8"?>
+<file path=ppt/slides/slide9.xml><?xml version="1.0" encoding="utf-8"?>
 <p:sld xmlns:a="http://schemas.openxmlformats.org/drawingml/2006/main" xmlns:r="http://schemas.openxmlformats.org/officeDocument/2006/relationships" xmlns:p="http://schemas.openxmlformats.org/presentationml/2006/main">
   <p:cSld>
     <p:spTree>
@@ -5086,7 +6506,7 @@
           </a:prstGeom>
           <a:noFill/>
           <a:extLst>
-            <a:ext uri="{909E8E84-426E-40dd-AFC4-6F175D3DCCD1}">
+            <a:ext uri="{909E8E84-426E-40DD-AFC4-6F175D3DCCD1}">
               <a14:hiddenFill xmlns:a14="http://schemas.microsoft.com/office/drawing/2010/main">
                 <a:solidFill>
                   <a:srgbClr val="FFFFFF"/>
@@ -5173,7 +6593,7 @@
           </a:prstGeom>
           <a:noFill/>
           <a:extLst>
-            <a:ext uri="{909E8E84-426E-40dd-AFC4-6F175D3DCCD1}">
+            <a:ext uri="{909E8E84-426E-40DD-AFC4-6F175D3DCCD1}">
               <a14:hiddenFill xmlns:a14="http://schemas.microsoft.com/office/drawing/2010/main">
                 <a:solidFill>
                   <a:srgbClr val="FFFFFF"/>
@@ -5214,7 +6634,7 @@
           </a:prstGeom>
           <a:noFill/>
           <a:extLst>
-            <a:ext uri="{909E8E84-426E-40dd-AFC4-6F175D3DCCD1}">
+            <a:ext uri="{909E8E84-426E-40DD-AFC4-6F175D3DCCD1}">
               <a14:hiddenFill xmlns:a14="http://schemas.microsoft.com/office/drawing/2010/main">
                 <a:solidFill>
                   <a:srgbClr val="FFFFFF"/>
@@ -5255,7 +6675,7 @@
           </a:prstGeom>
           <a:noFill/>
           <a:extLst>
-            <a:ext uri="{909E8E84-426E-40dd-AFC4-6F175D3DCCD1}">
+            <a:ext uri="{909E8E84-426E-40DD-AFC4-6F175D3DCCD1}">
               <a14:hiddenFill xmlns:a14="http://schemas.microsoft.com/office/drawing/2010/main">
                 <a:solidFill>
                   <a:srgbClr val="FFFFFF"/>
@@ -5296,7 +6716,7 @@
           </a:prstGeom>
           <a:noFill/>
           <a:extLst>
-            <a:ext uri="{909E8E84-426E-40dd-AFC4-6F175D3DCCD1}">
+            <a:ext uri="{909E8E84-426E-40DD-AFC4-6F175D3DCCD1}">
               <a14:hiddenFill xmlns:a14="http://schemas.microsoft.com/office/drawing/2010/main">
                 <a:solidFill>
                   <a:srgbClr val="FFFFFF"/>
@@ -5337,7 +6757,7 @@
           </a:prstGeom>
           <a:noFill/>
           <a:extLst>
-            <a:ext uri="{909E8E84-426E-40dd-AFC4-6F175D3DCCD1}">
+            <a:ext uri="{909E8E84-426E-40DD-AFC4-6F175D3DCCD1}">
               <a14:hiddenFill xmlns:a14="http://schemas.microsoft.com/office/drawing/2010/main">
                 <a:solidFill>
                   <a:srgbClr val="FFFFFF"/>
@@ -5667,7 +7087,7 @@
   <p:timing>
     <p:tnLst>
       <p:par>
-        <p:cTn xmlns:p14="http://schemas.microsoft.com/office/powerpoint/2010/main" id="1" dur="indefinite" restart="never" nodeType="tmRoot">
+        <p:cTn id="1" dur="indefinite" restart="never" nodeType="tmRoot">
           <p:childTnLst>
             <p:seq concurrent="1" nextAc="seek">
               <p:cTn id="2" dur="indefinite" nodeType="mainSeq">

</xml_diff>

<commit_message>
Implements #4174: PPT memory allocator slide
</commit_message>
<xml_diff>
--- a/ppt/presentation.pptx
+++ b/ppt/presentation.pptx
@@ -13,9 +13,10 @@
     <p:sldId id="267" r:id="rId7"/>
     <p:sldId id="261" r:id="rId8"/>
     <p:sldId id="260" r:id="rId9"/>
-    <p:sldId id="268" r:id="rId10"/>
-    <p:sldId id="258" r:id="rId11"/>
-    <p:sldId id="259" r:id="rId12"/>
+    <p:sldId id="269" r:id="rId10"/>
+    <p:sldId id="268" r:id="rId11"/>
+    <p:sldId id="258" r:id="rId12"/>
+    <p:sldId id="259" r:id="rId13"/>
   </p:sldIdLst>
   <p:sldSz cx="9144000" cy="6858000" type="screen4x3"/>
   <p:notesSz cx="6858000" cy="9144000"/>
@@ -3565,6 +3566,130 @@
           <a:p>
             <a:r>
               <a:rPr lang="fr-FR" dirty="0" smtClean="0"/>
+              <a:t>3. Applications</a:t>
+            </a:r>
+            <a:endParaRPr lang="fr-FR" dirty="0"/>
+          </a:p>
+        </p:txBody>
+      </p:sp>
+      <p:sp>
+        <p:nvSpPr>
+          <p:cNvPr id="3" name="Espace réservé du contenu 2"/>
+          <p:cNvSpPr>
+            <a:spLocks noGrp="1"/>
+          </p:cNvSpPr>
+          <p:nvPr>
+            <p:ph idx="1"/>
+          </p:nvPr>
+        </p:nvSpPr>
+        <p:spPr/>
+        <p:txBody>
+          <a:bodyPr/>
+          <a:lstStyle/>
+          <a:p>
+            <a:r>
+              <a:rPr lang="fr-FR" dirty="0" smtClean="0"/>
+              <a:t>Sémaphores, différents ordonnanceurs</a:t>
+            </a:r>
+          </a:p>
+          <a:p>
+            <a:r>
+              <a:rPr lang="fr-FR" dirty="0" smtClean="0"/>
+              <a:t>API du </a:t>
+            </a:r>
+            <a:r>
+              <a:rPr lang="fr-FR" dirty="0" err="1" smtClean="0"/>
+              <a:t>kernel</a:t>
+            </a:r>
+            <a:endParaRPr lang="fr-FR" dirty="0" smtClean="0"/>
+          </a:p>
+          <a:p>
+            <a:pPr marL="0" indent="0">
+              <a:buNone/>
+            </a:pPr>
+            <a:endParaRPr lang="fr-FR" dirty="0" smtClean="0"/>
+          </a:p>
+          <a:p>
+            <a:pPr marL="0" indent="0">
+              <a:buNone/>
+            </a:pPr>
+            <a:endParaRPr lang="fr-FR" dirty="0" smtClean="0"/>
+          </a:p>
+          <a:p>
+            <a:r>
+              <a:rPr lang="fr-FR" dirty="0" smtClean="0"/>
+              <a:t>Philosophes</a:t>
+            </a:r>
+          </a:p>
+          <a:p>
+            <a:r>
+              <a:rPr lang="fr-FR" dirty="0" smtClean="0"/>
+              <a:t>LED</a:t>
+            </a:r>
+          </a:p>
+          <a:p>
+            <a:r>
+              <a:rPr lang="fr-FR" dirty="0" smtClean="0"/>
+              <a:t>Musique</a:t>
+            </a:r>
+            <a:endParaRPr lang="fr-FR" dirty="0"/>
+          </a:p>
+        </p:txBody>
+      </p:sp>
+    </p:spTree>
+    <p:extLst>
+      <p:ext uri="{BB962C8B-B14F-4D97-AF65-F5344CB8AC3E}">
+        <p14:creationId xmlns:p14="http://schemas.microsoft.com/office/powerpoint/2010/main" val="2647578685"/>
+      </p:ext>
+    </p:extLst>
+  </p:cSld>
+  <p:clrMapOvr>
+    <a:masterClrMapping/>
+  </p:clrMapOvr>
+  <p:timing>
+    <p:tnLst>
+      <p:par>
+        <p:cTn id="1" dur="indefinite" restart="never" nodeType="tmRoot"/>
+      </p:par>
+    </p:tnLst>
+  </p:timing>
+</p:sld>
+</file>
+
+<file path=ppt/slides/slide11.xml><?xml version="1.0" encoding="utf-8"?>
+<p:sld xmlns:a="http://schemas.openxmlformats.org/drawingml/2006/main" xmlns:r="http://schemas.openxmlformats.org/officeDocument/2006/relationships" xmlns:p="http://schemas.openxmlformats.org/presentationml/2006/main">
+  <p:cSld>
+    <p:spTree>
+      <p:nvGrpSpPr>
+        <p:cNvPr id="1" name=""/>
+        <p:cNvGrpSpPr/>
+        <p:nvPr/>
+      </p:nvGrpSpPr>
+      <p:grpSpPr>
+        <a:xfrm>
+          <a:off x="0" y="0"/>
+          <a:ext cx="0" cy="0"/>
+          <a:chOff x="0" y="0"/>
+          <a:chExt cx="0" cy="0"/>
+        </a:xfrm>
+      </p:grpSpPr>
+      <p:sp>
+        <p:nvSpPr>
+          <p:cNvPr id="2" name="Titre 1"/>
+          <p:cNvSpPr>
+            <a:spLocks noGrp="1"/>
+          </p:cNvSpPr>
+          <p:nvPr>
+            <p:ph type="title"/>
+          </p:nvPr>
+        </p:nvSpPr>
+        <p:spPr/>
+        <p:txBody>
+          <a:bodyPr/>
+          <a:lstStyle/>
+          <a:p>
+            <a:r>
+              <a:rPr lang="fr-FR" dirty="0" smtClean="0"/>
               <a:t>Dîner des philosophes</a:t>
             </a:r>
             <a:endParaRPr lang="fr-FR" dirty="0"/>
@@ -3815,7 +3940,7 @@
 </p:sld>
 </file>
 
-<file path=ppt/slides/slide11.xml><?xml version="1.0" encoding="utf-8"?>
+<file path=ppt/slides/slide12.xml><?xml version="1.0" encoding="utf-8"?>
 <p:sld xmlns:a="http://schemas.openxmlformats.org/drawingml/2006/main" xmlns:r="http://schemas.openxmlformats.org/officeDocument/2006/relationships" xmlns:p="http://schemas.openxmlformats.org/presentationml/2006/main">
   <p:cSld>
     <p:spTree>
@@ -4923,15 +5048,7 @@
           <a:p>
             <a:r>
               <a:rPr lang="fr-FR" dirty="0" smtClean="0"/>
-              <a:t>Un ordonnanceur = une FIFO (liste simplement </a:t>
-            </a:r>
-            <a:r>
-              <a:rPr lang="fr-FR" dirty="0" smtClean="0"/>
-              <a:t>chaînée</a:t>
-            </a:r>
-            <a:r>
-              <a:rPr lang="fr-FR" dirty="0" smtClean="0"/>
-              <a:t>)</a:t>
+              <a:t>Un ordonnanceur = une FIFO (liste simplement chaînée)</a:t>
             </a:r>
           </a:p>
           <a:p>
@@ -4939,40 +5056,23 @@
               <a:rPr lang="fr-FR" dirty="0" smtClean="0"/>
               <a:t>Un sémaphore = une FIFO </a:t>
             </a:r>
+          </a:p>
+          <a:p>
+            <a:r>
+              <a:rPr lang="fr-FR" dirty="0" smtClean="0"/>
+              <a:t>Un pointeur global sur le PCB courant</a:t>
+            </a:r>
+          </a:p>
+          <a:p>
+            <a:endParaRPr lang="fr-FR" dirty="0"/>
+          </a:p>
+          <a:p>
             <a:endParaRPr lang="fr-FR" dirty="0" smtClean="0"/>
           </a:p>
           <a:p>
             <a:r>
               <a:rPr lang="fr-FR" dirty="0" smtClean="0"/>
-              <a:t>Un </a:t>
-            </a:r>
-            <a:r>
-              <a:rPr lang="fr-FR" dirty="0" smtClean="0"/>
-              <a:t>pointeur global sur le PCB </a:t>
-            </a:r>
-            <a:r>
-              <a:rPr lang="fr-FR" dirty="0" smtClean="0"/>
-              <a:t>courant</a:t>
-            </a:r>
-          </a:p>
-          <a:p>
-            <a:endParaRPr lang="fr-FR" dirty="0"/>
-          </a:p>
-          <a:p>
-            <a:endParaRPr lang="fr-FR" dirty="0" smtClean="0"/>
-          </a:p>
-          <a:p>
-            <a:r>
-              <a:rPr lang="fr-FR" dirty="0" smtClean="0"/>
-              <a:t>Ordonnanceur </a:t>
-            </a:r>
-            <a:r>
-              <a:rPr lang="fr-FR" dirty="0" smtClean="0"/>
-              <a:t>round robin </a:t>
-            </a:r>
-            <a:r>
-              <a:rPr lang="fr-FR" dirty="0" smtClean="0"/>
-              <a:t>à priorités</a:t>
+              <a:t>Ordonnanceur round robin à priorités</a:t>
             </a:r>
           </a:p>
           <a:p>
@@ -4984,16 +5084,11 @@
               <a:rPr lang="fr-FR" dirty="0" smtClean="0"/>
               <a:t>collaboratif</a:t>
             </a:r>
-            <a:endParaRPr lang="fr-FR" dirty="0" smtClean="0"/>
           </a:p>
           <a:p>
             <a:r>
               <a:rPr lang="fr-FR" dirty="0" smtClean="0"/>
-              <a:t>Tous disponibles à </a:t>
-            </a:r>
-            <a:r>
-              <a:rPr lang="fr-FR" dirty="0" smtClean="0"/>
-              <a:t>l’exécution !</a:t>
+              <a:t>Tous disponibles à l’exécution !</a:t>
             </a:r>
           </a:p>
           <a:p>
@@ -5321,7 +5416,6 @@
               <a:rPr lang="fr-FR" dirty="0" smtClean="0"/>
               <a:t>Responsive time important pour de grands quantums de temps</a:t>
             </a:r>
-            <a:endParaRPr lang="fr-FR" dirty="0" smtClean="0"/>
           </a:p>
         </p:txBody>
       </p:sp>
@@ -6733,11 +6827,7 @@
             <a:pPr algn="ctr"/>
             <a:r>
               <a:rPr lang="fr-FR" dirty="0" smtClean="0"/>
-              <a:t>Liste </a:t>
-            </a:r>
-            <a:r>
-              <a:rPr lang="fr-FR" dirty="0" smtClean="0"/>
-              <a:t>d’attente</a:t>
+              <a:t>Liste d’attente</a:t>
             </a:r>
             <a:endParaRPr lang="fr-FR" dirty="0"/>
           </a:p>
@@ -6954,11 +7044,7 @@
           <a:p>
             <a:r>
               <a:rPr lang="fr-FR" dirty="0" smtClean="0"/>
-              <a:t>prêt </a:t>
-            </a:r>
-            <a:r>
-              <a:rPr lang="fr-FR" dirty="0" smtClean="0"/>
-              <a:t>/ exécution</a:t>
+              <a:t>prêt / exécution</a:t>
             </a:r>
             <a:endParaRPr lang="fr-FR" dirty="0"/>
           </a:p>
@@ -7155,35 +7241,7 @@
                 <a:latin typeface="Consolas" panose="020B0609020204030204" pitchFamily="49" charset="0"/>
                 <a:cs typeface="Consolas" panose="020B0609020204030204" pitchFamily="49" charset="0"/>
               </a:rPr>
-              <a:t>Liste </a:t>
-            </a:r>
-            <a:r>
-              <a:rPr lang="fr-FR" dirty="0" smtClean="0">
-                <a:latin typeface="Consolas" panose="020B0609020204030204" pitchFamily="49" charset="0"/>
-                <a:cs typeface="Consolas" panose="020B0609020204030204" pitchFamily="49" charset="0"/>
-              </a:rPr>
-              <a:t>chaînée </a:t>
-            </a:r>
-            <a:r>
-              <a:rPr lang="fr-FR" dirty="0" smtClean="0">
-                <a:latin typeface="Consolas" panose="020B0609020204030204" pitchFamily="49" charset="0"/>
-                <a:cs typeface="Consolas" panose="020B0609020204030204" pitchFamily="49" charset="0"/>
-              </a:rPr>
-              <a:t>de </a:t>
-            </a:r>
-            <a:r>
-              <a:rPr lang="fr-FR" dirty="0" smtClean="0">
-                <a:latin typeface="Consolas" panose="020B0609020204030204" pitchFamily="49" charset="0"/>
-                <a:cs typeface="Consolas" panose="020B0609020204030204" pitchFamily="49" charset="0"/>
-              </a:rPr>
-              <a:t>tous </a:t>
-            </a:r>
-            <a:r>
-              <a:rPr lang="fr-FR" dirty="0" smtClean="0">
-                <a:latin typeface="Consolas" panose="020B0609020204030204" pitchFamily="49" charset="0"/>
-                <a:cs typeface="Consolas" panose="020B0609020204030204" pitchFamily="49" charset="0"/>
-              </a:rPr>
-              <a:t>les </a:t>
+              <a:t>Liste chaînée de tous les </a:t>
             </a:r>
             <a:r>
               <a:rPr lang="fr-FR" dirty="0" err="1" smtClean="0">
@@ -7213,35 +7271,8 @@
                 <a:latin typeface="Consolas" panose="020B0609020204030204" pitchFamily="49" charset="0"/>
                 <a:cs typeface="Consolas" panose="020B0609020204030204" pitchFamily="49" charset="0"/>
               </a:rPr>
-              <a:t>liste de </a:t>
-            </a:r>
-            <a:r>
-              <a:rPr lang="fr-FR" dirty="0" smtClean="0">
-                <a:solidFill>
-                  <a:schemeClr val="tx2"/>
-                </a:solidFill>
-                <a:latin typeface="Consolas" panose="020B0609020204030204" pitchFamily="49" charset="0"/>
-                <a:cs typeface="Consolas" panose="020B0609020204030204" pitchFamily="49" charset="0"/>
-              </a:rPr>
-              <a:t>son </a:t>
-            </a:r>
-            <a:r>
-              <a:rPr lang="fr-FR" dirty="0" smtClean="0">
-                <a:solidFill>
-                  <a:schemeClr val="tx2"/>
-                </a:solidFill>
-                <a:latin typeface="Consolas" panose="020B0609020204030204" pitchFamily="49" charset="0"/>
-                <a:cs typeface="Consolas" panose="020B0609020204030204" pitchFamily="49" charset="0"/>
-              </a:rPr>
-              <a:t>ordonnanceur</a:t>
-            </a:r>
-            <a:endParaRPr lang="fr-FR" dirty="0" smtClean="0">
-              <a:solidFill>
-                <a:schemeClr val="tx2"/>
-              </a:solidFill>
-              <a:latin typeface="Consolas" panose="020B0609020204030204" pitchFamily="49" charset="0"/>
-              <a:cs typeface="Consolas" panose="020B0609020204030204" pitchFamily="49" charset="0"/>
-            </a:endParaRPr>
+              <a:t>liste de son ordonnanceur</a:t>
+            </a:r>
           </a:p>
           <a:p>
             <a:r>
@@ -7624,80 +7655,640 @@
           <a:p>
             <a:r>
               <a:rPr lang="fr-FR" dirty="0" smtClean="0"/>
-              <a:t>3. Applications</a:t>
+              <a:t>Allocateur mémoire</a:t>
             </a:r>
             <a:endParaRPr lang="fr-FR" dirty="0"/>
           </a:p>
         </p:txBody>
       </p:sp>
-      <p:sp>
-        <p:nvSpPr>
-          <p:cNvPr id="3" name="Espace réservé du contenu 2"/>
-          <p:cNvSpPr>
-            <a:spLocks noGrp="1"/>
-          </p:cNvSpPr>
-          <p:nvPr>
-            <p:ph idx="1"/>
-          </p:nvPr>
-        </p:nvSpPr>
-        <p:spPr/>
-        <p:txBody>
-          <a:bodyPr/>
-          <a:lstStyle/>
-          <a:p>
-            <a:r>
-              <a:rPr lang="fr-FR" dirty="0" smtClean="0"/>
-              <a:t>Sémaphores, différents ordonnanceurs</a:t>
-            </a:r>
-          </a:p>
-          <a:p>
-            <a:r>
-              <a:rPr lang="fr-FR" dirty="0" smtClean="0"/>
-              <a:t>API du </a:t>
-            </a:r>
-            <a:r>
-              <a:rPr lang="fr-FR" dirty="0" err="1" smtClean="0"/>
-              <a:t>kernel</a:t>
-            </a:r>
-            <a:endParaRPr lang="fr-FR" dirty="0" smtClean="0"/>
-          </a:p>
-          <a:p>
-            <a:pPr marL="0" indent="0">
-              <a:buNone/>
-            </a:pPr>
-            <a:endParaRPr lang="fr-FR" dirty="0" smtClean="0"/>
-          </a:p>
-          <a:p>
-            <a:pPr marL="0" indent="0">
-              <a:buNone/>
-            </a:pPr>
-            <a:endParaRPr lang="fr-FR" dirty="0" smtClean="0"/>
-          </a:p>
-          <a:p>
-            <a:r>
-              <a:rPr lang="fr-FR" dirty="0" smtClean="0"/>
-              <a:t>Philosophes</a:t>
-            </a:r>
-          </a:p>
-          <a:p>
-            <a:r>
-              <a:rPr lang="fr-FR" dirty="0" smtClean="0"/>
-              <a:t>LED</a:t>
-            </a:r>
-          </a:p>
-          <a:p>
-            <a:r>
-              <a:rPr lang="fr-FR" dirty="0" smtClean="0"/>
-              <a:t>Musique</a:t>
-            </a:r>
-            <a:endParaRPr lang="fr-FR" dirty="0"/>
+      <p:pic>
+        <p:nvPicPr>
+          <p:cNvPr id="4" name="Image 3"/>
+          <p:cNvPicPr>
+            <a:picLocks noChangeAspect="1"/>
+          </p:cNvPicPr>
+          <p:nvPr/>
+        </p:nvPicPr>
+        <p:blipFill>
+          <a:blip r:embed="rId2">
+            <a:extLst>
+              <a:ext uri="{28A0092B-C50C-407E-A947-70E740481C1C}">
+                <a14:useLocalDpi xmlns:a14="http://schemas.microsoft.com/office/drawing/2010/main" val="0"/>
+              </a:ext>
+            </a:extLst>
+          </a:blip>
+          <a:stretch>
+            <a:fillRect/>
+          </a:stretch>
+        </p:blipFill>
+        <p:spPr>
+          <a:xfrm>
+            <a:off x="207037" y="2820423"/>
+            <a:ext cx="8691112" cy="1222440"/>
+          </a:xfrm>
+          <a:prstGeom prst="rect">
+            <a:avLst/>
+          </a:prstGeom>
+        </p:spPr>
+      </p:pic>
+      <p:pic>
+        <p:nvPicPr>
+          <p:cNvPr id="9" name="Image 8"/>
+          <p:cNvPicPr>
+            <a:picLocks noChangeAspect="1"/>
+          </p:cNvPicPr>
+          <p:nvPr/>
+        </p:nvPicPr>
+        <p:blipFill>
+          <a:blip r:embed="rId3">
+            <a:extLst>
+              <a:ext uri="{28A0092B-C50C-407E-A947-70E740481C1C}">
+                <a14:useLocalDpi xmlns:a14="http://schemas.microsoft.com/office/drawing/2010/main" val="0"/>
+              </a:ext>
+            </a:extLst>
+          </a:blip>
+          <a:stretch>
+            <a:fillRect/>
+          </a:stretch>
+        </p:blipFill>
+        <p:spPr>
+          <a:xfrm>
+            <a:off x="0" y="2805918"/>
+            <a:ext cx="9144000" cy="1246164"/>
+          </a:xfrm>
+          <a:prstGeom prst="rect">
+            <a:avLst/>
+          </a:prstGeom>
+        </p:spPr>
+      </p:pic>
+      <p:pic>
+        <p:nvPicPr>
+          <p:cNvPr id="10" name="Image 9"/>
+          <p:cNvPicPr>
+            <a:picLocks noChangeAspect="1"/>
+          </p:cNvPicPr>
+          <p:nvPr/>
+        </p:nvPicPr>
+        <p:blipFill>
+          <a:blip r:embed="rId4">
+            <a:extLst>
+              <a:ext uri="{28A0092B-C50C-407E-A947-70E740481C1C}">
+                <a14:useLocalDpi xmlns:a14="http://schemas.microsoft.com/office/drawing/2010/main" val="0"/>
+              </a:ext>
+            </a:extLst>
+          </a:blip>
+          <a:stretch>
+            <a:fillRect/>
+          </a:stretch>
+        </p:blipFill>
+        <p:spPr>
+          <a:xfrm>
+            <a:off x="0" y="2800452"/>
+            <a:ext cx="9144000" cy="1257095"/>
+          </a:xfrm>
+          <a:prstGeom prst="rect">
+            <a:avLst/>
+          </a:prstGeom>
+        </p:spPr>
+      </p:pic>
+      <p:pic>
+        <p:nvPicPr>
+          <p:cNvPr id="11" name="Image 10"/>
+          <p:cNvPicPr>
+            <a:picLocks noChangeAspect="1"/>
+          </p:cNvPicPr>
+          <p:nvPr/>
+        </p:nvPicPr>
+        <p:blipFill>
+          <a:blip r:embed="rId5">
+            <a:extLst>
+              <a:ext uri="{28A0092B-C50C-407E-A947-70E740481C1C}">
+                <a14:useLocalDpi xmlns:a14="http://schemas.microsoft.com/office/drawing/2010/main" val="0"/>
+              </a:ext>
+            </a:extLst>
+          </a:blip>
+          <a:stretch>
+            <a:fillRect/>
+          </a:stretch>
+        </p:blipFill>
+        <p:spPr>
+          <a:xfrm>
+            <a:off x="0" y="2785768"/>
+            <a:ext cx="9144000" cy="1257095"/>
+          </a:xfrm>
+          <a:prstGeom prst="rect">
+            <a:avLst/>
+          </a:prstGeom>
+        </p:spPr>
+      </p:pic>
+      <p:pic>
+        <p:nvPicPr>
+          <p:cNvPr id="12" name="Image 11"/>
+          <p:cNvPicPr>
+            <a:picLocks noChangeAspect="1"/>
+          </p:cNvPicPr>
+          <p:nvPr/>
+        </p:nvPicPr>
+        <p:blipFill>
+          <a:blip r:embed="rId6">
+            <a:extLst>
+              <a:ext uri="{28A0092B-C50C-407E-A947-70E740481C1C}">
+                <a14:useLocalDpi xmlns:a14="http://schemas.microsoft.com/office/drawing/2010/main" val="0"/>
+              </a:ext>
+            </a:extLst>
+          </a:blip>
+          <a:stretch>
+            <a:fillRect/>
+          </a:stretch>
+        </p:blipFill>
+        <p:spPr>
+          <a:xfrm>
+            <a:off x="0" y="2803185"/>
+            <a:ext cx="9144000" cy="1251630"/>
+          </a:xfrm>
+          <a:prstGeom prst="rect">
+            <a:avLst/>
+          </a:prstGeom>
+        </p:spPr>
+      </p:pic>
+      <p:sp>
+        <p:nvSpPr>
+          <p:cNvPr id="13" name="ZoneTexte 12"/>
+          <p:cNvSpPr txBox="1"/>
+          <p:nvPr/>
+        </p:nvSpPr>
+        <p:spPr>
+          <a:xfrm>
+            <a:off x="427840" y="1769883"/>
+            <a:ext cx="4580627" cy="369332"/>
+          </a:xfrm>
+          <a:prstGeom prst="rect">
+            <a:avLst/>
+          </a:prstGeom>
+          <a:noFill/>
+        </p:spPr>
+        <p:txBody>
+          <a:bodyPr wrap="square" rtlCol="0">
+            <a:spAutoFit/>
+          </a:bodyPr>
+          <a:lstStyle/>
+          <a:p>
+            <a:r>
+              <a:rPr lang="fr-FR" dirty="0" err="1" smtClean="0">
+                <a:latin typeface="Courier New" pitchFamily="49" charset="0"/>
+                <a:cs typeface="Courier New" pitchFamily="49" charset="0"/>
+              </a:rPr>
+              <a:t>void</a:t>
+            </a:r>
+            <a:r>
+              <a:rPr lang="fr-FR" dirty="0" smtClean="0">
+                <a:latin typeface="Courier New" pitchFamily="49" charset="0"/>
+                <a:cs typeface="Courier New" pitchFamily="49" charset="0"/>
+              </a:rPr>
+              <a:t> </a:t>
+            </a:r>
+            <a:r>
+              <a:rPr lang="fr-FR" dirty="0" err="1" smtClean="0">
+                <a:latin typeface="Courier New" pitchFamily="49" charset="0"/>
+                <a:cs typeface="Courier New" pitchFamily="49" charset="0"/>
+              </a:rPr>
+              <a:t>kernel_memory_init</a:t>
+            </a:r>
+            <a:r>
+              <a:rPr lang="fr-FR" dirty="0" smtClean="0">
+                <a:latin typeface="Courier New" pitchFamily="49" charset="0"/>
+                <a:cs typeface="Courier New" pitchFamily="49" charset="0"/>
+              </a:rPr>
+              <a:t>();</a:t>
+            </a:r>
+            <a:endParaRPr lang="fr-FR" dirty="0">
+              <a:latin typeface="Courier New" pitchFamily="49" charset="0"/>
+              <a:cs typeface="Courier New" pitchFamily="49" charset="0"/>
+            </a:endParaRPr>
+          </a:p>
+        </p:txBody>
+      </p:sp>
+      <p:sp>
+        <p:nvSpPr>
+          <p:cNvPr id="15" name="ZoneTexte 14"/>
+          <p:cNvSpPr txBox="1"/>
+          <p:nvPr/>
+        </p:nvSpPr>
+        <p:spPr>
+          <a:xfrm>
+            <a:off x="427840" y="1769883"/>
+            <a:ext cx="4580627" cy="369332"/>
+          </a:xfrm>
+          <a:prstGeom prst="rect">
+            <a:avLst/>
+          </a:prstGeom>
+          <a:noFill/>
+        </p:spPr>
+        <p:txBody>
+          <a:bodyPr wrap="square" rtlCol="0">
+            <a:spAutoFit/>
+          </a:bodyPr>
+          <a:lstStyle/>
+          <a:p>
+            <a:r>
+              <a:rPr lang="fr-FR" dirty="0" err="1" smtClean="0">
+                <a:latin typeface="Courier New" pitchFamily="49" charset="0"/>
+                <a:cs typeface="Courier New" pitchFamily="49" charset="0"/>
+              </a:rPr>
+              <a:t>void</a:t>
+            </a:r>
+            <a:r>
+              <a:rPr lang="fr-FR" dirty="0" smtClean="0">
+                <a:latin typeface="Courier New" pitchFamily="49" charset="0"/>
+                <a:cs typeface="Courier New" pitchFamily="49" charset="0"/>
+              </a:rPr>
+              <a:t> * </a:t>
+            </a:r>
+            <a:r>
+              <a:rPr lang="fr-FR" dirty="0" err="1" smtClean="0">
+                <a:latin typeface="Courier New" pitchFamily="49" charset="0"/>
+                <a:cs typeface="Courier New" pitchFamily="49" charset="0"/>
+              </a:rPr>
+              <a:t>kernel_memory_allocate</a:t>
+            </a:r>
+            <a:r>
+              <a:rPr lang="fr-FR" dirty="0" smtClean="0">
+                <a:latin typeface="Courier New" pitchFamily="49" charset="0"/>
+                <a:cs typeface="Courier New" pitchFamily="49" charset="0"/>
+              </a:rPr>
+              <a:t>();</a:t>
+            </a:r>
+            <a:endParaRPr lang="fr-FR" dirty="0">
+              <a:latin typeface="Courier New" pitchFamily="49" charset="0"/>
+              <a:cs typeface="Courier New" pitchFamily="49" charset="0"/>
+            </a:endParaRPr>
+          </a:p>
+        </p:txBody>
+      </p:sp>
+      <p:sp>
+        <p:nvSpPr>
+          <p:cNvPr id="16" name="ZoneTexte 15"/>
+          <p:cNvSpPr txBox="1"/>
+          <p:nvPr/>
+        </p:nvSpPr>
+        <p:spPr>
+          <a:xfrm>
+            <a:off x="427840" y="1769883"/>
+            <a:ext cx="5328235" cy="369332"/>
+          </a:xfrm>
+          <a:prstGeom prst="rect">
+            <a:avLst/>
+          </a:prstGeom>
+          <a:noFill/>
+        </p:spPr>
+        <p:txBody>
+          <a:bodyPr wrap="square" rtlCol="0">
+            <a:spAutoFit/>
+          </a:bodyPr>
+          <a:lstStyle/>
+          <a:p>
+            <a:r>
+              <a:rPr lang="fr-FR" dirty="0" err="1" smtClean="0">
+                <a:latin typeface="Courier New" pitchFamily="49" charset="0"/>
+                <a:cs typeface="Courier New" pitchFamily="49" charset="0"/>
+              </a:rPr>
+              <a:t>void</a:t>
+            </a:r>
+            <a:r>
+              <a:rPr lang="fr-FR" dirty="0" smtClean="0">
+                <a:latin typeface="Courier New" pitchFamily="49" charset="0"/>
+                <a:cs typeface="Courier New" pitchFamily="49" charset="0"/>
+              </a:rPr>
+              <a:t> </a:t>
+            </a:r>
+            <a:r>
+              <a:rPr lang="fr-FR" dirty="0" err="1" smtClean="0">
+                <a:latin typeface="Courier New" pitchFamily="49" charset="0"/>
+                <a:cs typeface="Courier New" pitchFamily="49" charset="0"/>
+              </a:rPr>
+              <a:t>kernel_memory_deallocate</a:t>
+            </a:r>
+            <a:r>
+              <a:rPr lang="fr-FR" dirty="0" smtClean="0">
+                <a:latin typeface="Courier New" pitchFamily="49" charset="0"/>
+                <a:cs typeface="Courier New" pitchFamily="49" charset="0"/>
+              </a:rPr>
+              <a:t>();</a:t>
+            </a:r>
+            <a:endParaRPr lang="fr-FR" dirty="0">
+              <a:latin typeface="Courier New" pitchFamily="49" charset="0"/>
+              <a:cs typeface="Courier New" pitchFamily="49" charset="0"/>
+            </a:endParaRPr>
+          </a:p>
+        </p:txBody>
+      </p:sp>
+      <p:sp>
+        <p:nvSpPr>
+          <p:cNvPr id="17" name="ZoneTexte 16"/>
+          <p:cNvSpPr txBox="1"/>
+          <p:nvPr/>
+        </p:nvSpPr>
+        <p:spPr>
+          <a:xfrm>
+            <a:off x="427840" y="1769883"/>
+            <a:ext cx="6990876" cy="369332"/>
+          </a:xfrm>
+          <a:prstGeom prst="rect">
+            <a:avLst/>
+          </a:prstGeom>
+          <a:noFill/>
+        </p:spPr>
+        <p:txBody>
+          <a:bodyPr wrap="square" rtlCol="0">
+            <a:spAutoFit/>
+          </a:bodyPr>
+          <a:lstStyle/>
+          <a:p>
+            <a:r>
+              <a:rPr lang="fr-FR" dirty="0" err="1" smtClean="0">
+                <a:latin typeface="Courier New" pitchFamily="49" charset="0"/>
+                <a:cs typeface="Courier New" pitchFamily="49" charset="0"/>
+              </a:rPr>
+              <a:t>static</a:t>
+            </a:r>
+            <a:r>
+              <a:rPr lang="fr-FR" dirty="0" smtClean="0">
+                <a:latin typeface="Courier New" pitchFamily="49" charset="0"/>
+                <a:cs typeface="Courier New" pitchFamily="49" charset="0"/>
+              </a:rPr>
+              <a:t> char </a:t>
+            </a:r>
+            <a:r>
+              <a:rPr lang="fr-FR" dirty="0" err="1" smtClean="0">
+                <a:latin typeface="Courier New" pitchFamily="49" charset="0"/>
+                <a:cs typeface="Courier New" pitchFamily="49" charset="0"/>
+              </a:rPr>
+              <a:t>kernel_memory_heap</a:t>
+            </a:r>
+            <a:r>
+              <a:rPr lang="fr-FR" dirty="0" smtClean="0">
+                <a:latin typeface="Courier New" pitchFamily="49" charset="0"/>
+                <a:cs typeface="Courier New" pitchFamily="49" charset="0"/>
+              </a:rPr>
+              <a:t>[KERNEL_HEAP_SIZE];</a:t>
+            </a:r>
+            <a:endParaRPr lang="fr-FR" dirty="0">
+              <a:latin typeface="Courier New" pitchFamily="49" charset="0"/>
+              <a:cs typeface="Courier New" pitchFamily="49" charset="0"/>
+            </a:endParaRPr>
+          </a:p>
+        </p:txBody>
+      </p:sp>
+      <p:sp>
+        <p:nvSpPr>
+          <p:cNvPr id="19" name="ZoneTexte 18"/>
+          <p:cNvSpPr txBox="1"/>
+          <p:nvPr/>
+        </p:nvSpPr>
+        <p:spPr>
+          <a:xfrm>
+            <a:off x="2118200" y="4597876"/>
+            <a:ext cx="4907599" cy="1384995"/>
+          </a:xfrm>
+          <a:prstGeom prst="rect">
+            <a:avLst/>
+          </a:prstGeom>
+          <a:noFill/>
+        </p:spPr>
+        <p:txBody>
+          <a:bodyPr wrap="square" rtlCol="0">
+            <a:spAutoFit/>
+          </a:bodyPr>
+          <a:lstStyle/>
+          <a:p>
+            <a:r>
+              <a:rPr lang="fr-FR" sz="1400" dirty="0" err="1">
+                <a:latin typeface="Courier New" pitchFamily="49" charset="0"/>
+                <a:cs typeface="Courier New" pitchFamily="49" charset="0"/>
+              </a:rPr>
+              <a:t>t</a:t>
+            </a:r>
+            <a:r>
+              <a:rPr lang="fr-FR" sz="1400" dirty="0" err="1" smtClean="0">
+                <a:latin typeface="Courier New" pitchFamily="49" charset="0"/>
+                <a:cs typeface="Courier New" pitchFamily="49" charset="0"/>
+              </a:rPr>
+              <a:t>ypedef</a:t>
+            </a:r>
+            <a:r>
+              <a:rPr lang="fr-FR" sz="1400" dirty="0" smtClean="0">
+                <a:latin typeface="Courier New" pitchFamily="49" charset="0"/>
+                <a:cs typeface="Courier New" pitchFamily="49" charset="0"/>
+              </a:rPr>
+              <a:t> </a:t>
+            </a:r>
+            <a:r>
+              <a:rPr lang="fr-FR" sz="1400" dirty="0" err="1" smtClean="0">
+                <a:latin typeface="Courier New" pitchFamily="49" charset="0"/>
+                <a:cs typeface="Courier New" pitchFamily="49" charset="0"/>
+              </a:rPr>
+              <a:t>struct</a:t>
+            </a:r>
+            <a:r>
+              <a:rPr lang="fr-FR" sz="1400" dirty="0" smtClean="0">
+                <a:latin typeface="Courier New" pitchFamily="49" charset="0"/>
+                <a:cs typeface="Courier New" pitchFamily="49" charset="0"/>
+              </a:rPr>
+              <a:t> </a:t>
+            </a:r>
+            <a:r>
+              <a:rPr lang="fr-FR" sz="1400" dirty="0" err="1" smtClean="0">
+                <a:latin typeface="Courier New" pitchFamily="49" charset="0"/>
+                <a:cs typeface="Courier New" pitchFamily="49" charset="0"/>
+              </a:rPr>
+              <a:t>kernel_heap_part_s</a:t>
+            </a:r>
+            <a:endParaRPr lang="fr-FR" sz="1400" dirty="0" smtClean="0">
+              <a:latin typeface="Courier New" pitchFamily="49" charset="0"/>
+              <a:cs typeface="Courier New" pitchFamily="49" charset="0"/>
+            </a:endParaRPr>
+          </a:p>
+          <a:p>
+            <a:r>
+              <a:rPr lang="fr-FR" sz="1400" dirty="0" smtClean="0">
+                <a:latin typeface="Courier New" pitchFamily="49" charset="0"/>
+                <a:cs typeface="Courier New" pitchFamily="49" charset="0"/>
+              </a:rPr>
+              <a:t>{</a:t>
+            </a:r>
+          </a:p>
+          <a:p>
+            <a:r>
+              <a:rPr lang="fr-FR" sz="1400" dirty="0" smtClean="0">
+                <a:latin typeface="Courier New" pitchFamily="49" charset="0"/>
+                <a:cs typeface="Courier New" pitchFamily="49" charset="0"/>
+              </a:rPr>
+              <a:t>    </a:t>
+            </a:r>
+            <a:r>
+              <a:rPr lang="fr-FR" sz="1400" dirty="0" err="1" smtClean="0">
+                <a:latin typeface="Courier New" pitchFamily="49" charset="0"/>
+                <a:cs typeface="Courier New" pitchFamily="49" charset="0"/>
+              </a:rPr>
+              <a:t>struct</a:t>
+            </a:r>
+            <a:r>
+              <a:rPr lang="fr-FR" sz="1400" dirty="0" smtClean="0">
+                <a:latin typeface="Courier New" pitchFamily="49" charset="0"/>
+                <a:cs typeface="Courier New" pitchFamily="49" charset="0"/>
+              </a:rPr>
+              <a:t> </a:t>
+            </a:r>
+            <a:r>
+              <a:rPr lang="fr-FR" sz="1400" dirty="0" err="1" smtClean="0">
+                <a:latin typeface="Courier New" pitchFamily="49" charset="0"/>
+                <a:cs typeface="Courier New" pitchFamily="49" charset="0"/>
+              </a:rPr>
+              <a:t>kernel_heap_part_s</a:t>
+            </a:r>
+            <a:r>
+              <a:rPr lang="fr-FR" sz="1400" dirty="0" smtClean="0">
+                <a:latin typeface="Courier New" pitchFamily="49" charset="0"/>
+                <a:cs typeface="Courier New" pitchFamily="49" charset="0"/>
+              </a:rPr>
+              <a:t> * </a:t>
+            </a:r>
+            <a:r>
+              <a:rPr lang="fr-FR" sz="1400" dirty="0" err="1" smtClean="0">
+                <a:latin typeface="Courier New" pitchFamily="49" charset="0"/>
+                <a:cs typeface="Courier New" pitchFamily="49" charset="0"/>
+              </a:rPr>
+              <a:t>mpNext</a:t>
+            </a:r>
+            <a:r>
+              <a:rPr lang="fr-FR" sz="1400" dirty="0" smtClean="0">
+                <a:latin typeface="Courier New" pitchFamily="49" charset="0"/>
+                <a:cs typeface="Courier New" pitchFamily="49" charset="0"/>
+              </a:rPr>
+              <a:t>;</a:t>
+            </a:r>
+          </a:p>
+          <a:p>
+            <a:r>
+              <a:rPr lang="fr-FR" sz="1400" dirty="0">
+                <a:latin typeface="Courier New" pitchFamily="49" charset="0"/>
+                <a:cs typeface="Courier New" pitchFamily="49" charset="0"/>
+              </a:rPr>
+              <a:t> </a:t>
+            </a:r>
+            <a:r>
+              <a:rPr lang="fr-FR" sz="1400" dirty="0" smtClean="0">
+                <a:latin typeface="Courier New" pitchFamily="49" charset="0"/>
+                <a:cs typeface="Courier New" pitchFamily="49" charset="0"/>
+              </a:rPr>
+              <a:t>   </a:t>
+            </a:r>
+            <a:r>
+              <a:rPr lang="fr-FR" sz="1400" dirty="0" err="1" smtClean="0">
+                <a:latin typeface="Courier New" pitchFamily="49" charset="0"/>
+                <a:cs typeface="Courier New" pitchFamily="49" charset="0"/>
+              </a:rPr>
+              <a:t>struct</a:t>
+            </a:r>
+            <a:r>
+              <a:rPr lang="fr-FR" sz="1400" dirty="0" smtClean="0">
+                <a:latin typeface="Courier New" pitchFamily="49" charset="0"/>
+                <a:cs typeface="Courier New" pitchFamily="49" charset="0"/>
+              </a:rPr>
+              <a:t> </a:t>
+            </a:r>
+            <a:r>
+              <a:rPr lang="fr-FR" sz="1400" dirty="0" err="1" smtClean="0">
+                <a:latin typeface="Courier New" pitchFamily="49" charset="0"/>
+                <a:cs typeface="Courier New" pitchFamily="49" charset="0"/>
+              </a:rPr>
+              <a:t>kernel_heap_part_s</a:t>
+            </a:r>
+            <a:r>
+              <a:rPr lang="fr-FR" sz="1400" dirty="0" smtClean="0">
+                <a:latin typeface="Courier New" pitchFamily="49" charset="0"/>
+                <a:cs typeface="Courier New" pitchFamily="49" charset="0"/>
+              </a:rPr>
+              <a:t> * </a:t>
+            </a:r>
+            <a:r>
+              <a:rPr lang="fr-FR" sz="1400" dirty="0" err="1" smtClean="0">
+                <a:latin typeface="Courier New" pitchFamily="49" charset="0"/>
+                <a:cs typeface="Courier New" pitchFamily="49" charset="0"/>
+              </a:rPr>
+              <a:t>mpPrevious</a:t>
+            </a:r>
+            <a:r>
+              <a:rPr lang="fr-FR" sz="1400" dirty="0" smtClean="0">
+                <a:latin typeface="Courier New" pitchFamily="49" charset="0"/>
+                <a:cs typeface="Courier New" pitchFamily="49" charset="0"/>
+              </a:rPr>
+              <a:t>;</a:t>
+            </a:r>
+          </a:p>
+          <a:p>
+            <a:r>
+              <a:rPr lang="fr-FR" sz="1400" dirty="0">
+                <a:latin typeface="Courier New" pitchFamily="49" charset="0"/>
+                <a:cs typeface="Courier New" pitchFamily="49" charset="0"/>
+              </a:rPr>
+              <a:t> </a:t>
+            </a:r>
+            <a:r>
+              <a:rPr lang="fr-FR" sz="1400" dirty="0" smtClean="0">
+                <a:latin typeface="Courier New" pitchFamily="49" charset="0"/>
+                <a:cs typeface="Courier New" pitchFamily="49" charset="0"/>
+              </a:rPr>
+              <a:t>   uint32_t </a:t>
+            </a:r>
+            <a:r>
+              <a:rPr lang="fr-FR" sz="1400" dirty="0" err="1" smtClean="0">
+                <a:latin typeface="Courier New" pitchFamily="49" charset="0"/>
+                <a:cs typeface="Courier New" pitchFamily="49" charset="0"/>
+              </a:rPr>
+              <a:t>mSize</a:t>
+            </a:r>
+            <a:r>
+              <a:rPr lang="fr-FR" sz="1400" dirty="0" smtClean="0">
+                <a:latin typeface="Courier New" pitchFamily="49" charset="0"/>
+                <a:cs typeface="Courier New" pitchFamily="49" charset="0"/>
+              </a:rPr>
+              <a:t>;</a:t>
+            </a:r>
+          </a:p>
+          <a:p>
+            <a:r>
+              <a:rPr lang="fr-FR" sz="1400" dirty="0" smtClean="0">
+                <a:latin typeface="Courier New" pitchFamily="49" charset="0"/>
+                <a:cs typeface="Courier New" pitchFamily="49" charset="0"/>
+              </a:rPr>
+              <a:t>} </a:t>
+            </a:r>
+            <a:r>
+              <a:rPr lang="fr-FR" sz="1400" dirty="0" err="1" smtClean="0">
+                <a:latin typeface="Courier New" pitchFamily="49" charset="0"/>
+                <a:cs typeface="Courier New" pitchFamily="49" charset="0"/>
+              </a:rPr>
+              <a:t>kernel_heap_part_t</a:t>
+            </a:r>
+            <a:r>
+              <a:rPr lang="fr-FR" sz="1400" dirty="0" smtClean="0">
+                <a:latin typeface="Courier New" pitchFamily="49" charset="0"/>
+                <a:cs typeface="Courier New" pitchFamily="49" charset="0"/>
+              </a:rPr>
+              <a:t>;</a:t>
+            </a:r>
+            <a:endParaRPr lang="fr-FR" sz="1400" dirty="0">
+              <a:latin typeface="Courier New" pitchFamily="49" charset="0"/>
+              <a:cs typeface="Courier New" pitchFamily="49" charset="0"/>
+            </a:endParaRPr>
           </a:p>
         </p:txBody>
       </p:sp>
     </p:spTree>
     <p:extLst>
       <p:ext uri="{BB962C8B-B14F-4D97-AF65-F5344CB8AC3E}">
-        <p14:creationId xmlns:p14="http://schemas.microsoft.com/office/powerpoint/2010/main" val="2647578685"/>
+        <p14:creationId xmlns:p14="http://schemas.microsoft.com/office/powerpoint/2010/main" val="988041715"/>
       </p:ext>
     </p:extLst>
   </p:cSld>
@@ -7707,9 +8298,721 @@
   <p:timing>
     <p:tnLst>
       <p:par>
-        <p:cTn id="1" dur="indefinite" restart="never" nodeType="tmRoot"/>
+        <p:cTn id="1" dur="indefinite" restart="never" nodeType="tmRoot">
+          <p:childTnLst>
+            <p:seq concurrent="1" nextAc="seek">
+              <p:cTn id="2" dur="indefinite" nodeType="mainSeq">
+                <p:childTnLst>
+                  <p:par>
+                    <p:cTn id="3" fill="hold">
+                      <p:stCondLst>
+                        <p:cond delay="indefinite"/>
+                      </p:stCondLst>
+                      <p:childTnLst>
+                        <p:par>
+                          <p:cTn id="4" fill="hold">
+                            <p:stCondLst>
+                              <p:cond delay="0"/>
+                            </p:stCondLst>
+                            <p:childTnLst>
+                              <p:par>
+                                <p:cTn id="5" presetID="10" presetClass="entr" presetSubtype="0" fill="hold" nodeType="clickEffect">
+                                  <p:stCondLst>
+                                    <p:cond delay="0"/>
+                                  </p:stCondLst>
+                                  <p:childTnLst>
+                                    <p:set>
+                                      <p:cBhvr>
+                                        <p:cTn id="6" dur="1" fill="hold">
+                                          <p:stCondLst>
+                                            <p:cond delay="0"/>
+                                          </p:stCondLst>
+                                        </p:cTn>
+                                        <p:tgtEl>
+                                          <p:spTgt spid="4"/>
+                                        </p:tgtEl>
+                                        <p:attrNameLst>
+                                          <p:attrName>style.visibility</p:attrName>
+                                        </p:attrNameLst>
+                                      </p:cBhvr>
+                                      <p:to>
+                                        <p:strVal val="visible"/>
+                                      </p:to>
+                                    </p:set>
+                                    <p:animEffect transition="in" filter="fade">
+                                      <p:cBhvr>
+                                        <p:cTn id="7" dur="500"/>
+                                        <p:tgtEl>
+                                          <p:spTgt spid="4"/>
+                                        </p:tgtEl>
+                                      </p:cBhvr>
+                                    </p:animEffect>
+                                  </p:childTnLst>
+                                </p:cTn>
+                              </p:par>
+                              <p:par>
+                                <p:cTn id="8" presetID="16" presetClass="entr" presetSubtype="21" fill="hold" grpId="0" nodeType="withEffect">
+                                  <p:stCondLst>
+                                    <p:cond delay="0"/>
+                                  </p:stCondLst>
+                                  <p:childTnLst>
+                                    <p:set>
+                                      <p:cBhvr>
+                                        <p:cTn id="9" dur="1" fill="hold">
+                                          <p:stCondLst>
+                                            <p:cond delay="0"/>
+                                          </p:stCondLst>
+                                        </p:cTn>
+                                        <p:tgtEl>
+                                          <p:spTgt spid="17"/>
+                                        </p:tgtEl>
+                                        <p:attrNameLst>
+                                          <p:attrName>style.visibility</p:attrName>
+                                        </p:attrNameLst>
+                                      </p:cBhvr>
+                                      <p:to>
+                                        <p:strVal val="visible"/>
+                                      </p:to>
+                                    </p:set>
+                                    <p:animEffect transition="in" filter="barn(inVertical)">
+                                      <p:cBhvr>
+                                        <p:cTn id="10" dur="500"/>
+                                        <p:tgtEl>
+                                          <p:spTgt spid="17"/>
+                                        </p:tgtEl>
+                                      </p:cBhvr>
+                                    </p:animEffect>
+                                  </p:childTnLst>
+                                </p:cTn>
+                              </p:par>
+                            </p:childTnLst>
+                          </p:cTn>
+                        </p:par>
+                      </p:childTnLst>
+                    </p:cTn>
+                  </p:par>
+                  <p:par>
+                    <p:cTn id="11" fill="hold">
+                      <p:stCondLst>
+                        <p:cond delay="indefinite"/>
+                      </p:stCondLst>
+                      <p:childTnLst>
+                        <p:par>
+                          <p:cTn id="12" fill="hold">
+                            <p:stCondLst>
+                              <p:cond delay="0"/>
+                            </p:stCondLst>
+                            <p:childTnLst>
+                              <p:par>
+                                <p:cTn id="13" presetID="10" presetClass="exit" presetSubtype="0" fill="hold" nodeType="clickEffect">
+                                  <p:stCondLst>
+                                    <p:cond delay="0"/>
+                                  </p:stCondLst>
+                                  <p:childTnLst>
+                                    <p:animEffect transition="out" filter="fade">
+                                      <p:cBhvr>
+                                        <p:cTn id="14" dur="500"/>
+                                        <p:tgtEl>
+                                          <p:spTgt spid="4"/>
+                                        </p:tgtEl>
+                                      </p:cBhvr>
+                                    </p:animEffect>
+                                    <p:set>
+                                      <p:cBhvr>
+                                        <p:cTn id="15" dur="1" fill="hold">
+                                          <p:stCondLst>
+                                            <p:cond delay="499"/>
+                                          </p:stCondLst>
+                                        </p:cTn>
+                                        <p:tgtEl>
+                                          <p:spTgt spid="4"/>
+                                        </p:tgtEl>
+                                        <p:attrNameLst>
+                                          <p:attrName>style.visibility</p:attrName>
+                                        </p:attrNameLst>
+                                      </p:cBhvr>
+                                      <p:to>
+                                        <p:strVal val="hidden"/>
+                                      </p:to>
+                                    </p:set>
+                                  </p:childTnLst>
+                                </p:cTn>
+                              </p:par>
+                              <p:par>
+                                <p:cTn id="16" presetID="1" presetClass="exit" presetSubtype="0" fill="hold" grpId="1" nodeType="withEffect">
+                                  <p:stCondLst>
+                                    <p:cond delay="0"/>
+                                  </p:stCondLst>
+                                  <p:childTnLst>
+                                    <p:set>
+                                      <p:cBhvr>
+                                        <p:cTn id="17" dur="1" fill="hold">
+                                          <p:stCondLst>
+                                            <p:cond delay="0"/>
+                                          </p:stCondLst>
+                                        </p:cTn>
+                                        <p:tgtEl>
+                                          <p:spTgt spid="17"/>
+                                        </p:tgtEl>
+                                        <p:attrNameLst>
+                                          <p:attrName>style.visibility</p:attrName>
+                                        </p:attrNameLst>
+                                      </p:cBhvr>
+                                      <p:to>
+                                        <p:strVal val="hidden"/>
+                                      </p:to>
+                                    </p:set>
+                                  </p:childTnLst>
+                                </p:cTn>
+                              </p:par>
+                              <p:par>
+                                <p:cTn id="18" presetID="10" presetClass="entr" presetSubtype="0" fill="hold" nodeType="withEffect">
+                                  <p:stCondLst>
+                                    <p:cond delay="0"/>
+                                  </p:stCondLst>
+                                  <p:childTnLst>
+                                    <p:set>
+                                      <p:cBhvr>
+                                        <p:cTn id="19" dur="1" fill="hold">
+                                          <p:stCondLst>
+                                            <p:cond delay="0"/>
+                                          </p:stCondLst>
+                                        </p:cTn>
+                                        <p:tgtEl>
+                                          <p:spTgt spid="9"/>
+                                        </p:tgtEl>
+                                        <p:attrNameLst>
+                                          <p:attrName>style.visibility</p:attrName>
+                                        </p:attrNameLst>
+                                      </p:cBhvr>
+                                      <p:to>
+                                        <p:strVal val="visible"/>
+                                      </p:to>
+                                    </p:set>
+                                    <p:animEffect transition="in" filter="fade">
+                                      <p:cBhvr>
+                                        <p:cTn id="20" dur="500"/>
+                                        <p:tgtEl>
+                                          <p:spTgt spid="9"/>
+                                        </p:tgtEl>
+                                      </p:cBhvr>
+                                    </p:animEffect>
+                                  </p:childTnLst>
+                                </p:cTn>
+                              </p:par>
+                              <p:par>
+                                <p:cTn id="21" presetID="16" presetClass="entr" presetSubtype="21" fill="hold" grpId="0" nodeType="withEffect">
+                                  <p:stCondLst>
+                                    <p:cond delay="0"/>
+                                  </p:stCondLst>
+                                  <p:childTnLst>
+                                    <p:set>
+                                      <p:cBhvr>
+                                        <p:cTn id="22" dur="1" fill="hold">
+                                          <p:stCondLst>
+                                            <p:cond delay="0"/>
+                                          </p:stCondLst>
+                                        </p:cTn>
+                                        <p:tgtEl>
+                                          <p:spTgt spid="13"/>
+                                        </p:tgtEl>
+                                        <p:attrNameLst>
+                                          <p:attrName>style.visibility</p:attrName>
+                                        </p:attrNameLst>
+                                      </p:cBhvr>
+                                      <p:to>
+                                        <p:strVal val="visible"/>
+                                      </p:to>
+                                    </p:set>
+                                    <p:animEffect transition="in" filter="barn(inVertical)">
+                                      <p:cBhvr>
+                                        <p:cTn id="23" dur="500"/>
+                                        <p:tgtEl>
+                                          <p:spTgt spid="13"/>
+                                        </p:tgtEl>
+                                      </p:cBhvr>
+                                    </p:animEffect>
+                                  </p:childTnLst>
+                                </p:cTn>
+                              </p:par>
+                            </p:childTnLst>
+                          </p:cTn>
+                        </p:par>
+                      </p:childTnLst>
+                    </p:cTn>
+                  </p:par>
+                  <p:par>
+                    <p:cTn id="24" fill="hold">
+                      <p:stCondLst>
+                        <p:cond delay="indefinite"/>
+                      </p:stCondLst>
+                      <p:childTnLst>
+                        <p:par>
+                          <p:cTn id="25" fill="hold">
+                            <p:stCondLst>
+                              <p:cond delay="0"/>
+                            </p:stCondLst>
+                            <p:childTnLst>
+                              <p:par>
+                                <p:cTn id="26" presetID="16" presetClass="entr" presetSubtype="21" fill="hold" grpId="0" nodeType="clickEffect">
+                                  <p:stCondLst>
+                                    <p:cond delay="0"/>
+                                  </p:stCondLst>
+                                  <p:childTnLst>
+                                    <p:set>
+                                      <p:cBhvr>
+                                        <p:cTn id="27" dur="1" fill="hold">
+                                          <p:stCondLst>
+                                            <p:cond delay="0"/>
+                                          </p:stCondLst>
+                                        </p:cTn>
+                                        <p:tgtEl>
+                                          <p:spTgt spid="19"/>
+                                        </p:tgtEl>
+                                        <p:attrNameLst>
+                                          <p:attrName>style.visibility</p:attrName>
+                                        </p:attrNameLst>
+                                      </p:cBhvr>
+                                      <p:to>
+                                        <p:strVal val="visible"/>
+                                      </p:to>
+                                    </p:set>
+                                    <p:animEffect transition="in" filter="barn(inVertical)">
+                                      <p:cBhvr>
+                                        <p:cTn id="28" dur="500"/>
+                                        <p:tgtEl>
+                                          <p:spTgt spid="19"/>
+                                        </p:tgtEl>
+                                      </p:cBhvr>
+                                    </p:animEffect>
+                                  </p:childTnLst>
+                                </p:cTn>
+                              </p:par>
+                            </p:childTnLst>
+                          </p:cTn>
+                        </p:par>
+                      </p:childTnLst>
+                    </p:cTn>
+                  </p:par>
+                  <p:par>
+                    <p:cTn id="29" fill="hold">
+                      <p:stCondLst>
+                        <p:cond delay="indefinite"/>
+                      </p:stCondLst>
+                      <p:childTnLst>
+                        <p:par>
+                          <p:cTn id="30" fill="hold">
+                            <p:stCondLst>
+                              <p:cond delay="0"/>
+                            </p:stCondLst>
+                            <p:childTnLst>
+                              <p:par>
+                                <p:cTn id="31" presetID="10" presetClass="exit" presetSubtype="0" fill="hold" nodeType="clickEffect">
+                                  <p:stCondLst>
+                                    <p:cond delay="0"/>
+                                  </p:stCondLst>
+                                  <p:childTnLst>
+                                    <p:animEffect transition="out" filter="fade">
+                                      <p:cBhvr>
+                                        <p:cTn id="32" dur="500"/>
+                                        <p:tgtEl>
+                                          <p:spTgt spid="9"/>
+                                        </p:tgtEl>
+                                      </p:cBhvr>
+                                    </p:animEffect>
+                                    <p:set>
+                                      <p:cBhvr>
+                                        <p:cTn id="33" dur="1" fill="hold">
+                                          <p:stCondLst>
+                                            <p:cond delay="499"/>
+                                          </p:stCondLst>
+                                        </p:cTn>
+                                        <p:tgtEl>
+                                          <p:spTgt spid="9"/>
+                                        </p:tgtEl>
+                                        <p:attrNameLst>
+                                          <p:attrName>style.visibility</p:attrName>
+                                        </p:attrNameLst>
+                                      </p:cBhvr>
+                                      <p:to>
+                                        <p:strVal val="hidden"/>
+                                      </p:to>
+                                    </p:set>
+                                  </p:childTnLst>
+                                </p:cTn>
+                              </p:par>
+                              <p:par>
+                                <p:cTn id="34" presetID="1" presetClass="exit" presetSubtype="0" fill="hold" grpId="1" nodeType="withEffect">
+                                  <p:stCondLst>
+                                    <p:cond delay="0"/>
+                                  </p:stCondLst>
+                                  <p:childTnLst>
+                                    <p:set>
+                                      <p:cBhvr>
+                                        <p:cTn id="35" dur="1" fill="hold">
+                                          <p:stCondLst>
+                                            <p:cond delay="0"/>
+                                          </p:stCondLst>
+                                        </p:cTn>
+                                        <p:tgtEl>
+                                          <p:spTgt spid="13"/>
+                                        </p:tgtEl>
+                                        <p:attrNameLst>
+                                          <p:attrName>style.visibility</p:attrName>
+                                        </p:attrNameLst>
+                                      </p:cBhvr>
+                                      <p:to>
+                                        <p:strVal val="hidden"/>
+                                      </p:to>
+                                    </p:set>
+                                  </p:childTnLst>
+                                </p:cTn>
+                              </p:par>
+                              <p:par>
+                                <p:cTn id="36" presetID="10" presetClass="entr" presetSubtype="0" fill="hold" nodeType="withEffect">
+                                  <p:stCondLst>
+                                    <p:cond delay="0"/>
+                                  </p:stCondLst>
+                                  <p:childTnLst>
+                                    <p:set>
+                                      <p:cBhvr>
+                                        <p:cTn id="37" dur="1" fill="hold">
+                                          <p:stCondLst>
+                                            <p:cond delay="0"/>
+                                          </p:stCondLst>
+                                        </p:cTn>
+                                        <p:tgtEl>
+                                          <p:spTgt spid="10"/>
+                                        </p:tgtEl>
+                                        <p:attrNameLst>
+                                          <p:attrName>style.visibility</p:attrName>
+                                        </p:attrNameLst>
+                                      </p:cBhvr>
+                                      <p:to>
+                                        <p:strVal val="visible"/>
+                                      </p:to>
+                                    </p:set>
+                                    <p:animEffect transition="in" filter="fade">
+                                      <p:cBhvr>
+                                        <p:cTn id="38" dur="500"/>
+                                        <p:tgtEl>
+                                          <p:spTgt spid="10"/>
+                                        </p:tgtEl>
+                                      </p:cBhvr>
+                                    </p:animEffect>
+                                  </p:childTnLst>
+                                </p:cTn>
+                              </p:par>
+                              <p:par>
+                                <p:cTn id="39" presetID="16" presetClass="entr" presetSubtype="21" fill="hold" grpId="0" nodeType="withEffect">
+                                  <p:stCondLst>
+                                    <p:cond delay="0"/>
+                                  </p:stCondLst>
+                                  <p:childTnLst>
+                                    <p:set>
+                                      <p:cBhvr>
+                                        <p:cTn id="40" dur="1" fill="hold">
+                                          <p:stCondLst>
+                                            <p:cond delay="0"/>
+                                          </p:stCondLst>
+                                        </p:cTn>
+                                        <p:tgtEl>
+                                          <p:spTgt spid="15"/>
+                                        </p:tgtEl>
+                                        <p:attrNameLst>
+                                          <p:attrName>style.visibility</p:attrName>
+                                        </p:attrNameLst>
+                                      </p:cBhvr>
+                                      <p:to>
+                                        <p:strVal val="visible"/>
+                                      </p:to>
+                                    </p:set>
+                                    <p:animEffect transition="in" filter="barn(inVertical)">
+                                      <p:cBhvr>
+                                        <p:cTn id="41" dur="500"/>
+                                        <p:tgtEl>
+                                          <p:spTgt spid="15"/>
+                                        </p:tgtEl>
+                                      </p:cBhvr>
+                                    </p:animEffect>
+                                  </p:childTnLst>
+                                </p:cTn>
+                              </p:par>
+                            </p:childTnLst>
+                          </p:cTn>
+                        </p:par>
+                      </p:childTnLst>
+                    </p:cTn>
+                  </p:par>
+                  <p:par>
+                    <p:cTn id="42" fill="hold">
+                      <p:stCondLst>
+                        <p:cond delay="indefinite"/>
+                      </p:stCondLst>
+                      <p:childTnLst>
+                        <p:par>
+                          <p:cTn id="43" fill="hold">
+                            <p:stCondLst>
+                              <p:cond delay="0"/>
+                            </p:stCondLst>
+                            <p:childTnLst>
+                              <p:par>
+                                <p:cTn id="44" presetID="10" presetClass="exit" presetSubtype="0" fill="hold" nodeType="clickEffect">
+                                  <p:stCondLst>
+                                    <p:cond delay="0"/>
+                                  </p:stCondLst>
+                                  <p:childTnLst>
+                                    <p:animEffect transition="out" filter="fade">
+                                      <p:cBhvr>
+                                        <p:cTn id="45" dur="500"/>
+                                        <p:tgtEl>
+                                          <p:spTgt spid="10"/>
+                                        </p:tgtEl>
+                                      </p:cBhvr>
+                                    </p:animEffect>
+                                    <p:set>
+                                      <p:cBhvr>
+                                        <p:cTn id="46" dur="1" fill="hold">
+                                          <p:stCondLst>
+                                            <p:cond delay="499"/>
+                                          </p:stCondLst>
+                                        </p:cTn>
+                                        <p:tgtEl>
+                                          <p:spTgt spid="10"/>
+                                        </p:tgtEl>
+                                        <p:attrNameLst>
+                                          <p:attrName>style.visibility</p:attrName>
+                                        </p:attrNameLst>
+                                      </p:cBhvr>
+                                      <p:to>
+                                        <p:strVal val="hidden"/>
+                                      </p:to>
+                                    </p:set>
+                                  </p:childTnLst>
+                                </p:cTn>
+                              </p:par>
+                              <p:par>
+                                <p:cTn id="47" presetID="10" presetClass="entr" presetSubtype="0" fill="hold" nodeType="withEffect">
+                                  <p:stCondLst>
+                                    <p:cond delay="0"/>
+                                  </p:stCondLst>
+                                  <p:childTnLst>
+                                    <p:set>
+                                      <p:cBhvr>
+                                        <p:cTn id="48" dur="1" fill="hold">
+                                          <p:stCondLst>
+                                            <p:cond delay="0"/>
+                                          </p:stCondLst>
+                                        </p:cTn>
+                                        <p:tgtEl>
+                                          <p:spTgt spid="11"/>
+                                        </p:tgtEl>
+                                        <p:attrNameLst>
+                                          <p:attrName>style.visibility</p:attrName>
+                                        </p:attrNameLst>
+                                      </p:cBhvr>
+                                      <p:to>
+                                        <p:strVal val="visible"/>
+                                      </p:to>
+                                    </p:set>
+                                    <p:animEffect transition="in" filter="fade">
+                                      <p:cBhvr>
+                                        <p:cTn id="49" dur="500"/>
+                                        <p:tgtEl>
+                                          <p:spTgt spid="11"/>
+                                        </p:tgtEl>
+                                      </p:cBhvr>
+                                    </p:animEffect>
+                                  </p:childTnLst>
+                                </p:cTn>
+                              </p:par>
+                            </p:childTnLst>
+                          </p:cTn>
+                        </p:par>
+                      </p:childTnLst>
+                    </p:cTn>
+                  </p:par>
+                  <p:par>
+                    <p:cTn id="50" fill="hold">
+                      <p:stCondLst>
+                        <p:cond delay="indefinite"/>
+                      </p:stCondLst>
+                      <p:childTnLst>
+                        <p:par>
+                          <p:cTn id="51" fill="hold">
+                            <p:stCondLst>
+                              <p:cond delay="0"/>
+                            </p:stCondLst>
+                            <p:childTnLst>
+                              <p:par>
+                                <p:cTn id="52" presetID="10" presetClass="exit" presetSubtype="0" fill="hold" nodeType="clickEffect">
+                                  <p:stCondLst>
+                                    <p:cond delay="0"/>
+                                  </p:stCondLst>
+                                  <p:childTnLst>
+                                    <p:animEffect transition="out" filter="fade">
+                                      <p:cBhvr>
+                                        <p:cTn id="53" dur="500"/>
+                                        <p:tgtEl>
+                                          <p:spTgt spid="11"/>
+                                        </p:tgtEl>
+                                      </p:cBhvr>
+                                    </p:animEffect>
+                                    <p:set>
+                                      <p:cBhvr>
+                                        <p:cTn id="54" dur="1" fill="hold">
+                                          <p:stCondLst>
+                                            <p:cond delay="499"/>
+                                          </p:stCondLst>
+                                        </p:cTn>
+                                        <p:tgtEl>
+                                          <p:spTgt spid="11"/>
+                                        </p:tgtEl>
+                                        <p:attrNameLst>
+                                          <p:attrName>style.visibility</p:attrName>
+                                        </p:attrNameLst>
+                                      </p:cBhvr>
+                                      <p:to>
+                                        <p:strVal val="hidden"/>
+                                      </p:to>
+                                    </p:set>
+                                  </p:childTnLst>
+                                </p:cTn>
+                              </p:par>
+                              <p:par>
+                                <p:cTn id="55" presetID="1" presetClass="exit" presetSubtype="0" fill="hold" grpId="1" nodeType="withEffect">
+                                  <p:stCondLst>
+                                    <p:cond delay="0"/>
+                                  </p:stCondLst>
+                                  <p:childTnLst>
+                                    <p:set>
+                                      <p:cBhvr>
+                                        <p:cTn id="56" dur="1" fill="hold">
+                                          <p:stCondLst>
+                                            <p:cond delay="0"/>
+                                          </p:stCondLst>
+                                        </p:cTn>
+                                        <p:tgtEl>
+                                          <p:spTgt spid="15"/>
+                                        </p:tgtEl>
+                                        <p:attrNameLst>
+                                          <p:attrName>style.visibility</p:attrName>
+                                        </p:attrNameLst>
+                                      </p:cBhvr>
+                                      <p:to>
+                                        <p:strVal val="hidden"/>
+                                      </p:to>
+                                    </p:set>
+                                  </p:childTnLst>
+                                </p:cTn>
+                              </p:par>
+                              <p:par>
+                                <p:cTn id="57" presetID="10" presetClass="entr" presetSubtype="0" fill="hold" nodeType="withEffect">
+                                  <p:stCondLst>
+                                    <p:cond delay="0"/>
+                                  </p:stCondLst>
+                                  <p:childTnLst>
+                                    <p:set>
+                                      <p:cBhvr>
+                                        <p:cTn id="58" dur="1" fill="hold">
+                                          <p:stCondLst>
+                                            <p:cond delay="0"/>
+                                          </p:stCondLst>
+                                        </p:cTn>
+                                        <p:tgtEl>
+                                          <p:spTgt spid="12"/>
+                                        </p:tgtEl>
+                                        <p:attrNameLst>
+                                          <p:attrName>style.visibility</p:attrName>
+                                        </p:attrNameLst>
+                                      </p:cBhvr>
+                                      <p:to>
+                                        <p:strVal val="visible"/>
+                                      </p:to>
+                                    </p:set>
+                                    <p:animEffect transition="in" filter="fade">
+                                      <p:cBhvr>
+                                        <p:cTn id="59" dur="500"/>
+                                        <p:tgtEl>
+                                          <p:spTgt spid="12"/>
+                                        </p:tgtEl>
+                                      </p:cBhvr>
+                                    </p:animEffect>
+                                  </p:childTnLst>
+                                </p:cTn>
+                              </p:par>
+                              <p:par>
+                                <p:cTn id="60" presetID="16" presetClass="entr" presetSubtype="21" fill="hold" grpId="0" nodeType="withEffect">
+                                  <p:stCondLst>
+                                    <p:cond delay="0"/>
+                                  </p:stCondLst>
+                                  <p:childTnLst>
+                                    <p:set>
+                                      <p:cBhvr>
+                                        <p:cTn id="61" dur="1" fill="hold">
+                                          <p:stCondLst>
+                                            <p:cond delay="0"/>
+                                          </p:stCondLst>
+                                        </p:cTn>
+                                        <p:tgtEl>
+                                          <p:spTgt spid="16"/>
+                                        </p:tgtEl>
+                                        <p:attrNameLst>
+                                          <p:attrName>style.visibility</p:attrName>
+                                        </p:attrNameLst>
+                                      </p:cBhvr>
+                                      <p:to>
+                                        <p:strVal val="visible"/>
+                                      </p:to>
+                                    </p:set>
+                                    <p:animEffect transition="in" filter="barn(inVertical)">
+                                      <p:cBhvr>
+                                        <p:cTn id="62" dur="500"/>
+                                        <p:tgtEl>
+                                          <p:spTgt spid="16"/>
+                                        </p:tgtEl>
+                                      </p:cBhvr>
+                                    </p:animEffect>
+                                  </p:childTnLst>
+                                </p:cTn>
+                              </p:par>
+                            </p:childTnLst>
+                          </p:cTn>
+                        </p:par>
+                      </p:childTnLst>
+                    </p:cTn>
+                  </p:par>
+                </p:childTnLst>
+              </p:cTn>
+              <p:prevCondLst>
+                <p:cond evt="onPrev" delay="0">
+                  <p:tgtEl>
+                    <p:sldTgt/>
+                  </p:tgtEl>
+                </p:cond>
+              </p:prevCondLst>
+              <p:nextCondLst>
+                <p:cond evt="onNext" delay="0">
+                  <p:tgtEl>
+                    <p:sldTgt/>
+                  </p:tgtEl>
+                </p:cond>
+              </p:nextCondLst>
+            </p:seq>
+          </p:childTnLst>
+        </p:cTn>
       </p:par>
     </p:tnLst>
+    <p:bldLst>
+      <p:bldP spid="13" grpId="0"/>
+      <p:bldP spid="13" grpId="1"/>
+      <p:bldP spid="15" grpId="0"/>
+      <p:bldP spid="15" grpId="1"/>
+      <p:bldP spid="16" grpId="0"/>
+      <p:bldP spid="17" grpId="0"/>
+      <p:bldP spid="17" grpId="1"/>
+      <p:bldP spid="19" grpId="0"/>
+    </p:bldLst>
   </p:timing>
 </p:sld>
 </file>

</xml_diff>

<commit_message>
PPT changes : deadlocks
</commit_message>
<xml_diff>
--- a/ppt/presentation.pptx
+++ b/ppt/presentation.pptx
@@ -17,6 +17,7 @@
     <p:sldId id="268" r:id="rId11"/>
     <p:sldId id="258" r:id="rId12"/>
     <p:sldId id="259" r:id="rId13"/>
+    <p:sldId id="270" r:id="rId14"/>
   </p:sldIdLst>
   <p:sldSz cx="9144000" cy="6858000" type="screen4x3"/>
   <p:notesSz cx="6858000" cy="9144000"/>
@@ -3587,50 +3588,43 @@
           <a:bodyPr/>
           <a:lstStyle/>
           <a:p>
-            <a:r>
-              <a:rPr lang="fr-FR" dirty="0" smtClean="0"/>
-              <a:t>Sémaphores, différents ordonnanceurs</a:t>
-            </a:r>
-          </a:p>
-          <a:p>
-            <a:r>
-              <a:rPr lang="fr-FR" dirty="0" smtClean="0"/>
-              <a:t>API du </a:t>
-            </a:r>
-            <a:r>
-              <a:rPr lang="fr-FR" dirty="0" err="1" smtClean="0"/>
-              <a:t>kernel</a:t>
-            </a:r>
-            <a:endParaRPr lang="fr-FR" dirty="0" smtClean="0"/>
-          </a:p>
-          <a:p>
             <a:pPr marL="0" indent="0">
               <a:buNone/>
             </a:pPr>
             <a:endParaRPr lang="fr-FR" dirty="0" smtClean="0"/>
           </a:p>
           <a:p>
-            <a:pPr marL="0" indent="0">
-              <a:buNone/>
+            <a:pPr>
+              <a:lnSpc>
+                <a:spcPct val="250000"/>
+              </a:lnSpc>
             </a:pPr>
-            <a:endParaRPr lang="fr-FR" dirty="0" smtClean="0"/>
-          </a:p>
-          <a:p>
             <a:r>
               <a:rPr lang="fr-FR" dirty="0" smtClean="0"/>
               <a:t>Philosophes</a:t>
             </a:r>
-          </a:p>
-          <a:p>
+            <a:endParaRPr lang="fr-FR" dirty="0" smtClean="0"/>
+          </a:p>
+          <a:p>
+            <a:pPr>
+              <a:lnSpc>
+                <a:spcPct val="250000"/>
+              </a:lnSpc>
+            </a:pPr>
             <a:r>
               <a:rPr lang="fr-FR" dirty="0" smtClean="0"/>
               <a:t>LED</a:t>
             </a:r>
           </a:p>
           <a:p>
+            <a:pPr>
+              <a:lnSpc>
+                <a:spcPct val="250000"/>
+              </a:lnSpc>
+            </a:pPr>
             <a:r>
               <a:rPr lang="fr-FR" dirty="0" smtClean="0"/>
-              <a:t>Musique</a:t>
+              <a:t>Lecteur multimédia</a:t>
             </a:r>
             <a:endParaRPr lang="fr-FR" dirty="0"/>
           </a:p>
@@ -3715,22 +3709,37 @@
           <a:p>
             <a:r>
               <a:rPr lang="fr-FR" dirty="0" smtClean="0"/>
-              <a:t>N philosophes</a:t>
-            </a:r>
-          </a:p>
-          <a:p>
+              <a:t>N </a:t>
+            </a:r>
             <a:r>
               <a:rPr lang="fr-FR" dirty="0" smtClean="0"/>
-              <a:t>N fourchettes</a:t>
-            </a:r>
-          </a:p>
-          <a:p>
-            <a:pPr marL="0" indent="0">
-              <a:buNone/>
-            </a:pPr>
+              <a:t>philosophes : processus</a:t>
+            </a:r>
+            <a:endParaRPr lang="fr-FR" dirty="0" smtClean="0"/>
+          </a:p>
+          <a:p>
             <a:r>
               <a:rPr lang="fr-FR" dirty="0" smtClean="0"/>
-              <a:t>Philosopher :</a:t>
+              <a:t>N </a:t>
+            </a:r>
+            <a:r>
+              <a:rPr lang="fr-FR" dirty="0" smtClean="0"/>
+              <a:t>fourchettes : </a:t>
+            </a:r>
+            <a:r>
+              <a:rPr lang="fr-FR" dirty="0" err="1" smtClean="0"/>
+              <a:t>mutex</a:t>
+            </a:r>
+            <a:endParaRPr lang="fr-FR" dirty="0"/>
+          </a:p>
+          <a:p>
+            <a:r>
+              <a:rPr lang="fr-FR" dirty="0" smtClean="0"/>
+              <a:t>Philosopher </a:t>
+            </a:r>
+            <a:r>
+              <a:rPr lang="fr-FR" dirty="0" smtClean="0"/>
+              <a:t>:</a:t>
             </a:r>
           </a:p>
           <a:p>
@@ -4407,7 +4416,7 @@
         </p:nvSpPr>
         <p:spPr>
           <a:xfrm>
-            <a:off x="4250476" y="5599209"/>
+            <a:off x="4205651" y="5572314"/>
             <a:ext cx="599521" cy="400110"/>
           </a:xfrm>
           <a:prstGeom prst="rect">
@@ -4423,7 +4432,7 @@
           <a:p>
             <a:r>
               <a:rPr lang="fr-FR" sz="2000" dirty="0"/>
-              <a:t>F</a:t>
+              <a:t>m</a:t>
             </a:r>
             <a:r>
               <a:rPr lang="fr-FR" sz="2000" dirty="0" smtClean="0"/>
@@ -4441,8 +4450,8 @@
         </p:nvSpPr>
         <p:spPr>
           <a:xfrm>
-            <a:off x="2091068" y="4013981"/>
-            <a:ext cx="490768" cy="400110"/>
+            <a:off x="2017061" y="3978121"/>
+            <a:ext cx="618565" cy="400110"/>
           </a:xfrm>
           <a:prstGeom prst="rect">
             <a:avLst/>
@@ -4457,12 +4466,13 @@
           <a:p>
             <a:r>
               <a:rPr lang="fr-FR" sz="2000" dirty="0" smtClean="0"/>
-              <a:t>F</a:t>
-            </a:r>
-            <a:r>
-              <a:rPr lang="fr-FR" sz="2000" dirty="0"/>
+              <a:t>m</a:t>
+            </a:r>
+            <a:r>
+              <a:rPr lang="fr-FR" sz="2000" dirty="0" smtClean="0"/>
               <a:t>2</a:t>
             </a:r>
+            <a:endParaRPr lang="fr-FR" sz="2000" dirty="0"/>
           </a:p>
         </p:txBody>
       </p:sp>
@@ -4474,8 +4484,8 @@
         </p:nvSpPr>
         <p:spPr>
           <a:xfrm>
-            <a:off x="2878039" y="1521791"/>
-            <a:ext cx="490768" cy="400110"/>
+            <a:off x="2814920" y="1521791"/>
+            <a:ext cx="616641" cy="400110"/>
           </a:xfrm>
           <a:prstGeom prst="rect">
             <a:avLst/>
@@ -4490,7 +4500,11 @@
           <a:p>
             <a:r>
               <a:rPr lang="fr-FR" sz="2000" dirty="0" smtClean="0"/>
-              <a:t>F3</a:t>
+              <a:t>m</a:t>
+            </a:r>
+            <a:r>
+              <a:rPr lang="fr-FR" sz="2000" dirty="0" smtClean="0"/>
+              <a:t>3</a:t>
             </a:r>
             <a:endParaRPr lang="fr-FR" sz="2000" dirty="0"/>
           </a:p>
@@ -4504,8 +4518,8 @@
         </p:nvSpPr>
         <p:spPr>
           <a:xfrm>
-            <a:off x="5553257" y="1461441"/>
-            <a:ext cx="490768" cy="400110"/>
+            <a:off x="5486400" y="1461441"/>
+            <a:ext cx="557625" cy="400110"/>
           </a:xfrm>
           <a:prstGeom prst="rect">
             <a:avLst/>
@@ -4519,8 +4533,12 @@
           <a:lstStyle/>
           <a:p>
             <a:r>
+              <a:rPr lang="fr-FR" sz="2000" dirty="0"/>
+              <a:t>m</a:t>
+            </a:r>
+            <a:r>
               <a:rPr lang="fr-FR" sz="2000" dirty="0" smtClean="0"/>
-              <a:t>F4</a:t>
+              <a:t>4</a:t>
             </a:r>
             <a:endParaRPr lang="fr-FR" sz="2000" dirty="0"/>
           </a:p>
@@ -4534,8 +4552,8 @@
         </p:nvSpPr>
         <p:spPr>
           <a:xfrm>
-            <a:off x="6368784" y="3996675"/>
-            <a:ext cx="490768" cy="400110"/>
+            <a:off x="6322177" y="4014605"/>
+            <a:ext cx="573235" cy="400110"/>
           </a:xfrm>
           <a:prstGeom prst="rect">
             <a:avLst/>
@@ -4549,10 +4567,244 @@
           <a:lstStyle/>
           <a:p>
             <a:r>
+              <a:rPr lang="fr-FR" sz="2000" dirty="0"/>
+              <a:t>m</a:t>
+            </a:r>
+            <a:r>
               <a:rPr lang="fr-FR" sz="2000" dirty="0" smtClean="0"/>
-              <a:t>F5</a:t>
+              <a:t>5</a:t>
             </a:r>
             <a:endParaRPr lang="fr-FR" sz="2000" dirty="0"/>
+          </a:p>
+        </p:txBody>
+      </p:sp>
+      <p:sp>
+        <p:nvSpPr>
+          <p:cNvPr id="23" name="Ellipse 22"/>
+          <p:cNvSpPr/>
+          <p:nvPr/>
+        </p:nvSpPr>
+        <p:spPr>
+          <a:xfrm rot="1579794">
+            <a:off x="4252683" y="5553142"/>
+            <a:ext cx="422608" cy="438453"/>
+          </a:xfrm>
+          <a:prstGeom prst="ellipse">
+            <a:avLst/>
+          </a:prstGeom>
+          <a:noFill/>
+          <a:ln>
+            <a:solidFill>
+              <a:srgbClr val="C00000"/>
+            </a:solidFill>
+          </a:ln>
+        </p:spPr>
+        <p:style>
+          <a:lnRef idx="2">
+            <a:schemeClr val="accent1">
+              <a:shade val="50000"/>
+            </a:schemeClr>
+          </a:lnRef>
+          <a:fillRef idx="1">
+            <a:schemeClr val="accent1"/>
+          </a:fillRef>
+          <a:effectRef idx="0">
+            <a:schemeClr val="accent1"/>
+          </a:effectRef>
+          <a:fontRef idx="minor">
+            <a:schemeClr val="lt1"/>
+          </a:fontRef>
+        </p:style>
+        <p:txBody>
+          <a:bodyPr rtlCol="0" anchor="ctr"/>
+          <a:lstStyle/>
+          <a:p>
+            <a:pPr algn="ctr"/>
+            <a:endParaRPr lang="fr-FR"/>
+          </a:p>
+        </p:txBody>
+      </p:sp>
+      <p:sp>
+        <p:nvSpPr>
+          <p:cNvPr id="24" name="Ellipse 23"/>
+          <p:cNvSpPr/>
+          <p:nvPr/>
+        </p:nvSpPr>
+        <p:spPr>
+          <a:xfrm rot="1579794">
+            <a:off x="2083411" y="3980401"/>
+            <a:ext cx="422608" cy="438453"/>
+          </a:xfrm>
+          <a:prstGeom prst="ellipse">
+            <a:avLst/>
+          </a:prstGeom>
+          <a:noFill/>
+          <a:ln>
+            <a:solidFill>
+              <a:srgbClr val="C00000"/>
+            </a:solidFill>
+          </a:ln>
+        </p:spPr>
+        <p:style>
+          <a:lnRef idx="2">
+            <a:schemeClr val="accent1">
+              <a:shade val="50000"/>
+            </a:schemeClr>
+          </a:lnRef>
+          <a:fillRef idx="1">
+            <a:schemeClr val="accent1"/>
+          </a:fillRef>
+          <a:effectRef idx="0">
+            <a:schemeClr val="accent1"/>
+          </a:effectRef>
+          <a:fontRef idx="minor">
+            <a:schemeClr val="lt1"/>
+          </a:fontRef>
+        </p:style>
+        <p:txBody>
+          <a:bodyPr rtlCol="0" anchor="ctr"/>
+          <a:lstStyle/>
+          <a:p>
+            <a:pPr algn="ctr"/>
+            <a:endParaRPr lang="fr-FR"/>
+          </a:p>
+        </p:txBody>
+      </p:sp>
+      <p:sp>
+        <p:nvSpPr>
+          <p:cNvPr id="25" name="Ellipse 24"/>
+          <p:cNvSpPr/>
+          <p:nvPr/>
+        </p:nvSpPr>
+        <p:spPr>
+          <a:xfrm rot="1579794">
+            <a:off x="2874110" y="1502619"/>
+            <a:ext cx="422608" cy="438453"/>
+          </a:xfrm>
+          <a:prstGeom prst="ellipse">
+            <a:avLst/>
+          </a:prstGeom>
+          <a:noFill/>
+          <a:ln>
+            <a:solidFill>
+              <a:srgbClr val="C00000"/>
+            </a:solidFill>
+          </a:ln>
+        </p:spPr>
+        <p:style>
+          <a:lnRef idx="2">
+            <a:schemeClr val="accent1">
+              <a:shade val="50000"/>
+            </a:schemeClr>
+          </a:lnRef>
+          <a:fillRef idx="1">
+            <a:schemeClr val="accent1"/>
+          </a:fillRef>
+          <a:effectRef idx="0">
+            <a:schemeClr val="accent1"/>
+          </a:effectRef>
+          <a:fontRef idx="minor">
+            <a:schemeClr val="lt1"/>
+          </a:fontRef>
+        </p:style>
+        <p:txBody>
+          <a:bodyPr rtlCol="0" anchor="ctr"/>
+          <a:lstStyle/>
+          <a:p>
+            <a:pPr algn="ctr"/>
+            <a:endParaRPr lang="fr-FR"/>
+          </a:p>
+        </p:txBody>
+      </p:sp>
+      <p:sp>
+        <p:nvSpPr>
+          <p:cNvPr id="26" name="Ellipse 25"/>
+          <p:cNvSpPr/>
+          <p:nvPr/>
+        </p:nvSpPr>
+        <p:spPr>
+          <a:xfrm rot="1579794">
+            <a:off x="5544944" y="1446846"/>
+            <a:ext cx="422608" cy="438453"/>
+          </a:xfrm>
+          <a:prstGeom prst="ellipse">
+            <a:avLst/>
+          </a:prstGeom>
+          <a:noFill/>
+          <a:ln>
+            <a:solidFill>
+              <a:srgbClr val="C00000"/>
+            </a:solidFill>
+          </a:ln>
+        </p:spPr>
+        <p:style>
+          <a:lnRef idx="2">
+            <a:schemeClr val="accent1">
+              <a:shade val="50000"/>
+            </a:schemeClr>
+          </a:lnRef>
+          <a:fillRef idx="1">
+            <a:schemeClr val="accent1"/>
+          </a:fillRef>
+          <a:effectRef idx="0">
+            <a:schemeClr val="accent1"/>
+          </a:effectRef>
+          <a:fontRef idx="minor">
+            <a:schemeClr val="lt1"/>
+          </a:fontRef>
+        </p:style>
+        <p:txBody>
+          <a:bodyPr rtlCol="0" anchor="ctr"/>
+          <a:lstStyle/>
+          <a:p>
+            <a:pPr algn="ctr"/>
+            <a:endParaRPr lang="fr-FR"/>
+          </a:p>
+        </p:txBody>
+      </p:sp>
+      <p:sp>
+        <p:nvSpPr>
+          <p:cNvPr id="27" name="Ellipse 26"/>
+          <p:cNvSpPr/>
+          <p:nvPr/>
+        </p:nvSpPr>
+        <p:spPr>
+          <a:xfrm rot="1579794">
+            <a:off x="6345856" y="3935272"/>
+            <a:ext cx="534657" cy="547418"/>
+          </a:xfrm>
+          <a:prstGeom prst="ellipse">
+            <a:avLst/>
+          </a:prstGeom>
+          <a:noFill/>
+          <a:ln>
+            <a:solidFill>
+              <a:srgbClr val="C00000"/>
+            </a:solidFill>
+          </a:ln>
+        </p:spPr>
+        <p:style>
+          <a:lnRef idx="2">
+            <a:schemeClr val="accent1">
+              <a:shade val="50000"/>
+            </a:schemeClr>
+          </a:lnRef>
+          <a:fillRef idx="1">
+            <a:schemeClr val="accent1"/>
+          </a:fillRef>
+          <a:effectRef idx="0">
+            <a:schemeClr val="accent1"/>
+          </a:effectRef>
+          <a:fontRef idx="minor">
+            <a:schemeClr val="lt1"/>
+          </a:fontRef>
+        </p:style>
+        <p:txBody>
+          <a:bodyPr rtlCol="0" anchor="ctr"/>
+          <a:lstStyle/>
+          <a:p>
+            <a:pPr algn="ctr"/>
+            <a:endParaRPr lang="fr-FR"/>
           </a:p>
         </p:txBody>
       </p:sp>
@@ -4844,6 +5096,1774 @@
                             </p:childTnLst>
                           </p:cTn>
                         </p:par>
+                        <p:par>
+                          <p:cTn id="28" fill="hold">
+                            <p:stCondLst>
+                              <p:cond delay="8000"/>
+                            </p:stCondLst>
+                            <p:childTnLst>
+                              <p:par>
+                                <p:cTn id="29" presetID="10" presetClass="entr" presetSubtype="0" fill="hold" grpId="0" nodeType="afterEffect">
+                                  <p:stCondLst>
+                                    <p:cond delay="1000"/>
+                                  </p:stCondLst>
+                                  <p:childTnLst>
+                                    <p:set>
+                                      <p:cBhvr>
+                                        <p:cTn id="30" dur="1" fill="hold">
+                                          <p:stCondLst>
+                                            <p:cond delay="0"/>
+                                          </p:stCondLst>
+                                        </p:cTn>
+                                        <p:tgtEl>
+                                          <p:spTgt spid="23"/>
+                                        </p:tgtEl>
+                                        <p:attrNameLst>
+                                          <p:attrName>style.visibility</p:attrName>
+                                        </p:attrNameLst>
+                                      </p:cBhvr>
+                                      <p:to>
+                                        <p:strVal val="visible"/>
+                                      </p:to>
+                                    </p:set>
+                                    <p:animEffect transition="in" filter="fade">
+                                      <p:cBhvr>
+                                        <p:cTn id="31" dur="500"/>
+                                        <p:tgtEl>
+                                          <p:spTgt spid="23"/>
+                                        </p:tgtEl>
+                                      </p:cBhvr>
+                                    </p:animEffect>
+                                  </p:childTnLst>
+                                </p:cTn>
+                              </p:par>
+                            </p:childTnLst>
+                          </p:cTn>
+                        </p:par>
+                        <p:par>
+                          <p:cTn id="32" fill="hold">
+                            <p:stCondLst>
+                              <p:cond delay="9500"/>
+                            </p:stCondLst>
+                            <p:childTnLst>
+                              <p:par>
+                                <p:cTn id="33" presetID="10" presetClass="entr" presetSubtype="0" fill="hold" grpId="0" nodeType="afterEffect">
+                                  <p:stCondLst>
+                                    <p:cond delay="1000"/>
+                                  </p:stCondLst>
+                                  <p:childTnLst>
+                                    <p:set>
+                                      <p:cBhvr>
+                                        <p:cTn id="34" dur="1" fill="hold">
+                                          <p:stCondLst>
+                                            <p:cond delay="0"/>
+                                          </p:stCondLst>
+                                        </p:cTn>
+                                        <p:tgtEl>
+                                          <p:spTgt spid="24"/>
+                                        </p:tgtEl>
+                                        <p:attrNameLst>
+                                          <p:attrName>style.visibility</p:attrName>
+                                        </p:attrNameLst>
+                                      </p:cBhvr>
+                                      <p:to>
+                                        <p:strVal val="visible"/>
+                                      </p:to>
+                                    </p:set>
+                                    <p:animEffect transition="in" filter="fade">
+                                      <p:cBhvr>
+                                        <p:cTn id="35" dur="500"/>
+                                        <p:tgtEl>
+                                          <p:spTgt spid="24"/>
+                                        </p:tgtEl>
+                                      </p:cBhvr>
+                                    </p:animEffect>
+                                  </p:childTnLst>
+                                </p:cTn>
+                              </p:par>
+                            </p:childTnLst>
+                          </p:cTn>
+                        </p:par>
+                        <p:par>
+                          <p:cTn id="36" fill="hold">
+                            <p:stCondLst>
+                              <p:cond delay="11000"/>
+                            </p:stCondLst>
+                            <p:childTnLst>
+                              <p:par>
+                                <p:cTn id="37" presetID="10" presetClass="entr" presetSubtype="0" fill="hold" grpId="0" nodeType="afterEffect">
+                                  <p:stCondLst>
+                                    <p:cond delay="1000"/>
+                                  </p:stCondLst>
+                                  <p:childTnLst>
+                                    <p:set>
+                                      <p:cBhvr>
+                                        <p:cTn id="38" dur="1" fill="hold">
+                                          <p:stCondLst>
+                                            <p:cond delay="0"/>
+                                          </p:stCondLst>
+                                        </p:cTn>
+                                        <p:tgtEl>
+                                          <p:spTgt spid="25"/>
+                                        </p:tgtEl>
+                                        <p:attrNameLst>
+                                          <p:attrName>style.visibility</p:attrName>
+                                        </p:attrNameLst>
+                                      </p:cBhvr>
+                                      <p:to>
+                                        <p:strVal val="visible"/>
+                                      </p:to>
+                                    </p:set>
+                                    <p:animEffect transition="in" filter="fade">
+                                      <p:cBhvr>
+                                        <p:cTn id="39" dur="500"/>
+                                        <p:tgtEl>
+                                          <p:spTgt spid="25"/>
+                                        </p:tgtEl>
+                                      </p:cBhvr>
+                                    </p:animEffect>
+                                  </p:childTnLst>
+                                </p:cTn>
+                              </p:par>
+                            </p:childTnLst>
+                          </p:cTn>
+                        </p:par>
+                        <p:par>
+                          <p:cTn id="40" fill="hold">
+                            <p:stCondLst>
+                              <p:cond delay="12500"/>
+                            </p:stCondLst>
+                            <p:childTnLst>
+                              <p:par>
+                                <p:cTn id="41" presetID="10" presetClass="entr" presetSubtype="0" fill="hold" grpId="0" nodeType="afterEffect">
+                                  <p:stCondLst>
+                                    <p:cond delay="1000"/>
+                                  </p:stCondLst>
+                                  <p:childTnLst>
+                                    <p:set>
+                                      <p:cBhvr>
+                                        <p:cTn id="42" dur="1" fill="hold">
+                                          <p:stCondLst>
+                                            <p:cond delay="0"/>
+                                          </p:stCondLst>
+                                        </p:cTn>
+                                        <p:tgtEl>
+                                          <p:spTgt spid="26"/>
+                                        </p:tgtEl>
+                                        <p:attrNameLst>
+                                          <p:attrName>style.visibility</p:attrName>
+                                        </p:attrNameLst>
+                                      </p:cBhvr>
+                                      <p:to>
+                                        <p:strVal val="visible"/>
+                                      </p:to>
+                                    </p:set>
+                                    <p:animEffect transition="in" filter="fade">
+                                      <p:cBhvr>
+                                        <p:cTn id="43" dur="500"/>
+                                        <p:tgtEl>
+                                          <p:spTgt spid="26"/>
+                                        </p:tgtEl>
+                                      </p:cBhvr>
+                                    </p:animEffect>
+                                  </p:childTnLst>
+                                </p:cTn>
+                              </p:par>
+                            </p:childTnLst>
+                          </p:cTn>
+                        </p:par>
+                        <p:par>
+                          <p:cTn id="44" fill="hold">
+                            <p:stCondLst>
+                              <p:cond delay="14000"/>
+                            </p:stCondLst>
+                            <p:childTnLst>
+                              <p:par>
+                                <p:cTn id="45" presetID="10" presetClass="entr" presetSubtype="0" fill="hold" grpId="0" nodeType="afterEffect">
+                                  <p:stCondLst>
+                                    <p:cond delay="1000"/>
+                                  </p:stCondLst>
+                                  <p:childTnLst>
+                                    <p:set>
+                                      <p:cBhvr>
+                                        <p:cTn id="46" dur="1" fill="hold">
+                                          <p:stCondLst>
+                                            <p:cond delay="0"/>
+                                          </p:stCondLst>
+                                        </p:cTn>
+                                        <p:tgtEl>
+                                          <p:spTgt spid="27"/>
+                                        </p:tgtEl>
+                                        <p:attrNameLst>
+                                          <p:attrName>style.visibility</p:attrName>
+                                        </p:attrNameLst>
+                                      </p:cBhvr>
+                                      <p:to>
+                                        <p:strVal val="visible"/>
+                                      </p:to>
+                                    </p:set>
+                                    <p:animEffect transition="in" filter="fade">
+                                      <p:cBhvr>
+                                        <p:cTn id="47" dur="500"/>
+                                        <p:tgtEl>
+                                          <p:spTgt spid="27"/>
+                                        </p:tgtEl>
+                                      </p:cBhvr>
+                                    </p:animEffect>
+                                  </p:childTnLst>
+                                </p:cTn>
+                              </p:par>
+                            </p:childTnLst>
+                          </p:cTn>
+                        </p:par>
+                      </p:childTnLst>
+                    </p:cTn>
+                  </p:par>
+                </p:childTnLst>
+              </p:cTn>
+              <p:prevCondLst>
+                <p:cond evt="onPrev" delay="0">
+                  <p:tgtEl>
+                    <p:sldTgt/>
+                  </p:tgtEl>
+                </p:cond>
+              </p:prevCondLst>
+              <p:nextCondLst>
+                <p:cond evt="onNext" delay="0">
+                  <p:tgtEl>
+                    <p:sldTgt/>
+                  </p:tgtEl>
+                </p:cond>
+              </p:nextCondLst>
+            </p:seq>
+          </p:childTnLst>
+        </p:cTn>
+      </p:par>
+    </p:tnLst>
+    <p:bldLst>
+      <p:bldP spid="6" grpId="0" animBg="1"/>
+      <p:bldP spid="23" grpId="0" animBg="1"/>
+      <p:bldP spid="24" grpId="0" animBg="1"/>
+      <p:bldP spid="25" grpId="0" animBg="1"/>
+      <p:bldP spid="26" grpId="0" animBg="1"/>
+      <p:bldP spid="27" grpId="0" animBg="1"/>
+    </p:bldLst>
+  </p:timing>
+</p:sld>
+</file>
+
+<file path=ppt/slides/slide13.xml><?xml version="1.0" encoding="utf-8"?>
+<p:sld xmlns:a="http://schemas.openxmlformats.org/drawingml/2006/main" xmlns:r="http://schemas.openxmlformats.org/officeDocument/2006/relationships" xmlns:p="http://schemas.openxmlformats.org/presentationml/2006/main">
+  <p:cSld>
+    <p:spTree>
+      <p:nvGrpSpPr>
+        <p:cNvPr id="1" name=""/>
+        <p:cNvGrpSpPr/>
+        <p:nvPr/>
+      </p:nvGrpSpPr>
+      <p:grpSpPr>
+        <a:xfrm>
+          <a:off x="0" y="0"/>
+          <a:ext cx="0" cy="0"/>
+          <a:chOff x="0" y="0"/>
+          <a:chExt cx="0" cy="0"/>
+        </a:xfrm>
+      </p:grpSpPr>
+      <p:sp>
+        <p:nvSpPr>
+          <p:cNvPr id="2" name="Titre 1"/>
+          <p:cNvSpPr>
+            <a:spLocks noGrp="1"/>
+          </p:cNvSpPr>
+          <p:nvPr>
+            <p:ph type="title"/>
+          </p:nvPr>
+        </p:nvSpPr>
+        <p:spPr/>
+        <p:txBody>
+          <a:bodyPr/>
+          <a:lstStyle/>
+          <a:p>
+            <a:r>
+              <a:rPr lang="fr-FR" dirty="0" smtClean="0"/>
+              <a:t>Gestion des </a:t>
+            </a:r>
+            <a:r>
+              <a:rPr lang="fr-FR" dirty="0" err="1" smtClean="0"/>
+              <a:t>interblocages</a:t>
+            </a:r>
+            <a:endParaRPr lang="fr-FR" dirty="0"/>
+          </a:p>
+        </p:txBody>
+      </p:sp>
+      <p:sp>
+        <p:nvSpPr>
+          <p:cNvPr id="3" name="Espace réservé du contenu 2"/>
+          <p:cNvSpPr>
+            <a:spLocks noGrp="1"/>
+          </p:cNvSpPr>
+          <p:nvPr>
+            <p:ph idx="1"/>
+          </p:nvPr>
+        </p:nvSpPr>
+        <p:spPr>
+          <a:xfrm>
+            <a:off x="457200" y="1600200"/>
+            <a:ext cx="6015318" cy="5024718"/>
+          </a:xfrm>
+        </p:spPr>
+        <p:txBody>
+          <a:bodyPr>
+            <a:normAutofit fontScale="92500" lnSpcReduction="20000"/>
+          </a:bodyPr>
+          <a:lstStyle/>
+          <a:p>
+            <a:pPr marL="0" indent="0">
+              <a:lnSpc>
+                <a:spcPct val="150000"/>
+              </a:lnSpc>
+              <a:buNone/>
+            </a:pPr>
+            <a:r>
+              <a:rPr lang="fr-FR" sz="2000" b="1" dirty="0" err="1" smtClean="0">
+                <a:latin typeface="Consolas" panose="020B0609020204030204" pitchFamily="49" charset="0"/>
+                <a:cs typeface="Consolas" panose="020B0609020204030204" pitchFamily="49" charset="0"/>
+              </a:rPr>
+              <a:t>int</a:t>
+            </a:r>
+            <a:r>
+              <a:rPr lang="fr-FR" sz="2000" b="1" dirty="0" smtClean="0">
+                <a:latin typeface="Consolas" panose="020B0609020204030204" pitchFamily="49" charset="0"/>
+                <a:cs typeface="Consolas" panose="020B0609020204030204" pitchFamily="49" charset="0"/>
+              </a:rPr>
+              <a:t> </a:t>
+            </a:r>
+            <a:r>
+              <a:rPr lang="fr-FR" sz="2000" b="1" dirty="0" err="1" smtClean="0">
+                <a:latin typeface="Consolas" panose="020B0609020204030204" pitchFamily="49" charset="0"/>
+                <a:cs typeface="Consolas" panose="020B0609020204030204" pitchFamily="49" charset="0"/>
+              </a:rPr>
+              <a:t>deadlock_check</a:t>
+            </a:r>
+            <a:r>
+              <a:rPr lang="fr-FR" sz="2000" b="1" dirty="0" smtClean="0">
+                <a:latin typeface="Consolas" panose="020B0609020204030204" pitchFamily="49" charset="0"/>
+                <a:cs typeface="Consolas" panose="020B0609020204030204" pitchFamily="49" charset="0"/>
+              </a:rPr>
+              <a:t>(</a:t>
+            </a:r>
+            <a:r>
+              <a:rPr lang="fr-FR" sz="2000" b="1" dirty="0" err="1" smtClean="0">
+                <a:latin typeface="Consolas" panose="020B0609020204030204" pitchFamily="49" charset="0"/>
+                <a:cs typeface="Consolas" panose="020B0609020204030204" pitchFamily="49" charset="0"/>
+              </a:rPr>
+              <a:t>mutex</a:t>
+            </a:r>
+            <a:r>
+              <a:rPr lang="fr-FR" sz="2000" b="1" dirty="0" smtClean="0">
+                <a:latin typeface="Consolas" panose="020B0609020204030204" pitchFamily="49" charset="0"/>
+                <a:cs typeface="Consolas" panose="020B0609020204030204" pitchFamily="49" charset="0"/>
+              </a:rPr>
+              <a:t> m1, </a:t>
+            </a:r>
+            <a:r>
+              <a:rPr lang="fr-FR" sz="2000" b="1" dirty="0" err="1" smtClean="0">
+                <a:latin typeface="Consolas" panose="020B0609020204030204" pitchFamily="49" charset="0"/>
+                <a:cs typeface="Consolas" panose="020B0609020204030204" pitchFamily="49" charset="0"/>
+              </a:rPr>
+              <a:t>process</a:t>
+            </a:r>
+            <a:r>
+              <a:rPr lang="fr-FR" sz="2000" b="1" dirty="0" smtClean="0">
+                <a:latin typeface="Consolas" panose="020B0609020204030204" pitchFamily="49" charset="0"/>
+                <a:cs typeface="Consolas" panose="020B0609020204030204" pitchFamily="49" charset="0"/>
+              </a:rPr>
+              <a:t> p1)</a:t>
+            </a:r>
+          </a:p>
+          <a:p>
+            <a:pPr marL="0" indent="0">
+              <a:lnSpc>
+                <a:spcPct val="150000"/>
+              </a:lnSpc>
+              <a:buNone/>
+            </a:pPr>
+            <a:r>
+              <a:rPr lang="fr-FR" sz="2000" dirty="0" smtClean="0">
+                <a:latin typeface="Consolas" panose="020B0609020204030204" pitchFamily="49" charset="0"/>
+                <a:cs typeface="Consolas" panose="020B0609020204030204" pitchFamily="49" charset="0"/>
+              </a:rPr>
+              <a:t>{m1.locked ∩</a:t>
+            </a:r>
+            <a:r>
+              <a:rPr lang="fr-FR" sz="2000" b="1" dirty="0" smtClean="0"/>
+              <a:t> </a:t>
+            </a:r>
+            <a:r>
+              <a:rPr lang="fr-FR" sz="2000" dirty="0" smtClean="0">
+                <a:latin typeface="Consolas" panose="020B0609020204030204" pitchFamily="49" charset="0"/>
+                <a:cs typeface="Consolas" panose="020B0609020204030204" pitchFamily="49" charset="0"/>
+              </a:rPr>
+              <a:t>p1.mutexPossessed.size </a:t>
+            </a:r>
+            <a:r>
+              <a:rPr lang="fr-FR" sz="2000" dirty="0">
+                <a:latin typeface="Consolas" panose="020B0609020204030204" pitchFamily="49" charset="0"/>
+                <a:cs typeface="Consolas" panose="020B0609020204030204" pitchFamily="49" charset="0"/>
+              </a:rPr>
+              <a:t>&gt; </a:t>
+            </a:r>
+            <a:r>
+              <a:rPr lang="fr-FR" sz="2000" dirty="0" smtClean="0">
+                <a:latin typeface="Consolas" panose="020B0609020204030204" pitchFamily="49" charset="0"/>
+                <a:cs typeface="Consolas" panose="020B0609020204030204" pitchFamily="49" charset="0"/>
+              </a:rPr>
+              <a:t>0}</a:t>
+            </a:r>
+          </a:p>
+          <a:p>
+            <a:pPr marL="0" indent="0">
+              <a:lnSpc>
+                <a:spcPct val="150000"/>
+              </a:lnSpc>
+              <a:buNone/>
+            </a:pPr>
+            <a:r>
+              <a:rPr lang="fr-FR" sz="2000" u="sng" dirty="0">
+                <a:latin typeface="Consolas" panose="020B0609020204030204" pitchFamily="49" charset="0"/>
+                <a:cs typeface="Consolas" panose="020B0609020204030204" pitchFamily="49" charset="0"/>
+              </a:rPr>
+              <a:t>For</a:t>
+            </a:r>
+            <a:r>
+              <a:rPr lang="fr-FR" sz="2000" dirty="0">
+                <a:latin typeface="Consolas" panose="020B0609020204030204" pitchFamily="49" charset="0"/>
+                <a:cs typeface="Consolas" panose="020B0609020204030204" pitchFamily="49" charset="0"/>
+              </a:rPr>
+              <a:t>(</a:t>
+            </a:r>
+            <a:r>
+              <a:rPr lang="fr-FR" sz="2000" dirty="0" err="1">
+                <a:latin typeface="Consolas" panose="020B0609020204030204" pitchFamily="49" charset="0"/>
+                <a:cs typeface="Consolas" panose="020B0609020204030204" pitchFamily="49" charset="0"/>
+              </a:rPr>
+              <a:t>mutex</a:t>
+            </a:r>
+            <a:r>
+              <a:rPr lang="fr-FR" sz="2000" dirty="0">
+                <a:latin typeface="Consolas" panose="020B0609020204030204" pitchFamily="49" charset="0"/>
+                <a:cs typeface="Consolas" panose="020B0609020204030204" pitchFamily="49" charset="0"/>
+              </a:rPr>
+              <a:t> </a:t>
+            </a:r>
+            <a:r>
+              <a:rPr lang="fr-FR" sz="2000" dirty="0" smtClean="0">
+                <a:latin typeface="Consolas" panose="020B0609020204030204" pitchFamily="49" charset="0"/>
+                <a:cs typeface="Consolas" panose="020B0609020204030204" pitchFamily="49" charset="0"/>
+              </a:rPr>
+              <a:t>m2 </a:t>
+            </a:r>
+            <a:r>
+              <a:rPr lang="fr-FR" sz="2000" dirty="0">
+                <a:latin typeface="Consolas" panose="020B0609020204030204" pitchFamily="49" charset="0"/>
+                <a:cs typeface="Consolas" panose="020B0609020204030204" pitchFamily="49" charset="0"/>
+              </a:rPr>
+              <a:t>: </a:t>
+            </a:r>
+            <a:r>
+              <a:rPr lang="fr-FR" sz="2000" dirty="0" smtClean="0">
+                <a:latin typeface="Consolas" panose="020B0609020204030204" pitchFamily="49" charset="0"/>
+                <a:cs typeface="Consolas" panose="020B0609020204030204" pitchFamily="49" charset="0"/>
+              </a:rPr>
+              <a:t>p1.mutexPossessed)</a:t>
+            </a:r>
+          </a:p>
+          <a:p>
+            <a:pPr marL="0" indent="0">
+              <a:lnSpc>
+                <a:spcPct val="150000"/>
+              </a:lnSpc>
+              <a:buNone/>
+            </a:pPr>
+            <a:r>
+              <a:rPr lang="fr-FR" sz="2000" dirty="0" smtClean="0">
+                <a:latin typeface="Consolas" panose="020B0609020204030204" pitchFamily="49" charset="0"/>
+                <a:cs typeface="Consolas" panose="020B0609020204030204" pitchFamily="49" charset="0"/>
+              </a:rPr>
+              <a:t>    m2 == m1 ? </a:t>
+            </a:r>
+            <a:r>
+              <a:rPr lang="fr-FR" sz="2000" dirty="0">
+                <a:latin typeface="Consolas" panose="020B0609020204030204" pitchFamily="49" charset="0"/>
+                <a:cs typeface="Consolas" panose="020B0609020204030204" pitchFamily="49" charset="0"/>
+              </a:rPr>
+              <a:t>r</a:t>
+            </a:r>
+            <a:r>
+              <a:rPr lang="fr-FR" sz="2000" dirty="0" smtClean="0">
+                <a:latin typeface="Consolas" panose="020B0609020204030204" pitchFamily="49" charset="0"/>
+                <a:cs typeface="Consolas" panose="020B0609020204030204" pitchFamily="49" charset="0"/>
+              </a:rPr>
+              <a:t>eturn -1</a:t>
+            </a:r>
+            <a:endParaRPr lang="fr-FR" sz="2000" dirty="0" smtClean="0">
+              <a:latin typeface="Consolas" panose="020B0609020204030204" pitchFamily="49" charset="0"/>
+              <a:cs typeface="Consolas" panose="020B0609020204030204" pitchFamily="49" charset="0"/>
+            </a:endParaRPr>
+          </a:p>
+          <a:p>
+            <a:pPr marL="0" indent="0">
+              <a:lnSpc>
+                <a:spcPct val="150000"/>
+              </a:lnSpc>
+              <a:buNone/>
+            </a:pPr>
+            <a:r>
+              <a:rPr lang="fr-FR" sz="2000" dirty="0">
+                <a:latin typeface="Consolas" panose="020B0609020204030204" pitchFamily="49" charset="0"/>
+                <a:cs typeface="Consolas" panose="020B0609020204030204" pitchFamily="49" charset="0"/>
+              </a:rPr>
+              <a:t> </a:t>
+            </a:r>
+            <a:r>
+              <a:rPr lang="fr-FR" sz="2000" dirty="0" smtClean="0">
+                <a:latin typeface="Consolas" panose="020B0609020204030204" pitchFamily="49" charset="0"/>
+                <a:cs typeface="Consolas" panose="020B0609020204030204" pitchFamily="49" charset="0"/>
+              </a:rPr>
+              <a:t>   </a:t>
+            </a:r>
+            <a:r>
+              <a:rPr lang="fr-FR" sz="2000" u="sng" dirty="0" smtClean="0">
+                <a:latin typeface="Consolas" panose="020B0609020204030204" pitchFamily="49" charset="0"/>
+                <a:cs typeface="Consolas" panose="020B0609020204030204" pitchFamily="49" charset="0"/>
+              </a:rPr>
+              <a:t>For</a:t>
+            </a:r>
+            <a:r>
+              <a:rPr lang="fr-FR" sz="2000" dirty="0" smtClean="0">
+                <a:latin typeface="Consolas" panose="020B0609020204030204" pitchFamily="49" charset="0"/>
+                <a:cs typeface="Consolas" panose="020B0609020204030204" pitchFamily="49" charset="0"/>
+              </a:rPr>
+              <a:t>(</a:t>
+            </a:r>
+            <a:r>
+              <a:rPr lang="fr-FR" sz="2000" dirty="0" err="1" smtClean="0">
+                <a:latin typeface="Consolas" panose="020B0609020204030204" pitchFamily="49" charset="0"/>
+                <a:cs typeface="Consolas" panose="020B0609020204030204" pitchFamily="49" charset="0"/>
+              </a:rPr>
+              <a:t>process</a:t>
+            </a:r>
+            <a:r>
+              <a:rPr lang="fr-FR" sz="2000" dirty="0" smtClean="0">
+                <a:latin typeface="Consolas" panose="020B0609020204030204" pitchFamily="49" charset="0"/>
+                <a:cs typeface="Consolas" panose="020B0609020204030204" pitchFamily="49" charset="0"/>
+              </a:rPr>
+              <a:t> p2 : m2.waitingProcesses)</a:t>
+            </a:r>
+          </a:p>
+          <a:p>
+            <a:pPr marL="0" indent="0">
+              <a:lnSpc>
+                <a:spcPct val="150000"/>
+              </a:lnSpc>
+              <a:buNone/>
+            </a:pPr>
+            <a:r>
+              <a:rPr lang="fr-FR" sz="2000" dirty="0" smtClean="0">
+                <a:latin typeface="Consolas" panose="020B0609020204030204" pitchFamily="49" charset="0"/>
+                <a:cs typeface="Consolas" panose="020B0609020204030204" pitchFamily="49" charset="0"/>
+              </a:rPr>
+              <a:t>        </a:t>
+            </a:r>
+            <a:r>
+              <a:rPr lang="fr-FR" sz="2000" dirty="0" err="1" smtClean="0">
+                <a:latin typeface="Consolas" panose="020B0609020204030204" pitchFamily="49" charset="0"/>
+                <a:cs typeface="Consolas" panose="020B0609020204030204" pitchFamily="49" charset="0"/>
+              </a:rPr>
+              <a:t>deadlock_check</a:t>
+            </a:r>
+            <a:r>
+              <a:rPr lang="fr-FR" sz="2000" dirty="0" smtClean="0">
+                <a:latin typeface="Consolas" panose="020B0609020204030204" pitchFamily="49" charset="0"/>
+                <a:cs typeface="Consolas" panose="020B0609020204030204" pitchFamily="49" charset="0"/>
+              </a:rPr>
+              <a:t>(m1, p2) == -1 ?</a:t>
+            </a:r>
+            <a:r>
+              <a:rPr lang="fr-FR" sz="2000" dirty="0">
+                <a:latin typeface="Consolas" panose="020B0609020204030204" pitchFamily="49" charset="0"/>
+                <a:cs typeface="Consolas" panose="020B0609020204030204" pitchFamily="49" charset="0"/>
+              </a:rPr>
+              <a:t> </a:t>
+            </a:r>
+            <a:endParaRPr lang="fr-FR" sz="2000" dirty="0" smtClean="0">
+              <a:latin typeface="Consolas" panose="020B0609020204030204" pitchFamily="49" charset="0"/>
+              <a:cs typeface="Consolas" panose="020B0609020204030204" pitchFamily="49" charset="0"/>
+            </a:endParaRPr>
+          </a:p>
+          <a:p>
+            <a:pPr marL="0" indent="0">
+              <a:lnSpc>
+                <a:spcPct val="150000"/>
+              </a:lnSpc>
+              <a:buNone/>
+            </a:pPr>
+            <a:r>
+              <a:rPr lang="fr-FR" sz="2000" dirty="0" smtClean="0">
+                <a:latin typeface="Consolas" panose="020B0609020204030204" pitchFamily="49" charset="0"/>
+                <a:cs typeface="Consolas" panose="020B0609020204030204" pitchFamily="49" charset="0"/>
+              </a:rPr>
+              <a:t>            return -1</a:t>
+            </a:r>
+          </a:p>
+          <a:p>
+            <a:pPr marL="0" indent="0">
+              <a:lnSpc>
+                <a:spcPct val="150000"/>
+              </a:lnSpc>
+              <a:buNone/>
+            </a:pPr>
+            <a:r>
+              <a:rPr lang="fr-FR" sz="2000" dirty="0" smtClean="0">
+                <a:latin typeface="Consolas" panose="020B0609020204030204" pitchFamily="49" charset="0"/>
+                <a:cs typeface="Consolas" panose="020B0609020204030204" pitchFamily="49" charset="0"/>
+              </a:rPr>
+              <a:t>        </a:t>
+            </a:r>
+            <a:r>
+              <a:rPr lang="fr-FR" sz="2000" u="sng" dirty="0" err="1" smtClean="0">
+                <a:latin typeface="Consolas" panose="020B0609020204030204" pitchFamily="49" charset="0"/>
+                <a:cs typeface="Consolas" panose="020B0609020204030204" pitchFamily="49" charset="0"/>
+              </a:rPr>
+              <a:t>EndIf</a:t>
+            </a:r>
+            <a:endParaRPr lang="fr-FR" sz="2000" u="sng" dirty="0" smtClean="0">
+              <a:latin typeface="Consolas" panose="020B0609020204030204" pitchFamily="49" charset="0"/>
+              <a:cs typeface="Consolas" panose="020B0609020204030204" pitchFamily="49" charset="0"/>
+            </a:endParaRPr>
+          </a:p>
+          <a:p>
+            <a:pPr marL="0" indent="0">
+              <a:lnSpc>
+                <a:spcPct val="150000"/>
+              </a:lnSpc>
+              <a:buNone/>
+            </a:pPr>
+            <a:r>
+              <a:rPr lang="fr-FR" sz="2000" dirty="0" smtClean="0">
+                <a:latin typeface="Consolas" panose="020B0609020204030204" pitchFamily="49" charset="0"/>
+                <a:cs typeface="Consolas" panose="020B0609020204030204" pitchFamily="49" charset="0"/>
+              </a:rPr>
+              <a:t>    </a:t>
+            </a:r>
+            <a:r>
+              <a:rPr lang="fr-FR" sz="2000" u="sng" dirty="0" err="1" smtClean="0">
+                <a:latin typeface="Consolas" panose="020B0609020204030204" pitchFamily="49" charset="0"/>
+                <a:cs typeface="Consolas" panose="020B0609020204030204" pitchFamily="49" charset="0"/>
+              </a:rPr>
+              <a:t>EndFor</a:t>
+            </a:r>
+            <a:endParaRPr lang="fr-FR" sz="2000" u="sng" dirty="0" smtClean="0">
+              <a:latin typeface="Consolas" panose="020B0609020204030204" pitchFamily="49" charset="0"/>
+              <a:cs typeface="Consolas" panose="020B0609020204030204" pitchFamily="49" charset="0"/>
+            </a:endParaRPr>
+          </a:p>
+          <a:p>
+            <a:pPr marL="0" indent="0">
+              <a:lnSpc>
+                <a:spcPct val="150000"/>
+              </a:lnSpc>
+              <a:buNone/>
+            </a:pPr>
+            <a:r>
+              <a:rPr lang="fr-FR" sz="2000" u="sng" dirty="0" err="1" smtClean="0">
+                <a:latin typeface="Consolas" panose="020B0609020204030204" pitchFamily="49" charset="0"/>
+                <a:cs typeface="Consolas" panose="020B0609020204030204" pitchFamily="49" charset="0"/>
+              </a:rPr>
+              <a:t>EndFor</a:t>
+            </a:r>
+            <a:endParaRPr lang="fr-FR" sz="2000" u="sng" dirty="0" smtClean="0">
+              <a:latin typeface="Consolas" panose="020B0609020204030204" pitchFamily="49" charset="0"/>
+              <a:cs typeface="Consolas" panose="020B0609020204030204" pitchFamily="49" charset="0"/>
+            </a:endParaRPr>
+          </a:p>
+          <a:p>
+            <a:pPr marL="0" indent="0">
+              <a:lnSpc>
+                <a:spcPct val="150000"/>
+              </a:lnSpc>
+              <a:buNone/>
+            </a:pPr>
+            <a:r>
+              <a:rPr lang="fr-FR" sz="2000" dirty="0">
+                <a:latin typeface="Consolas" panose="020B0609020204030204" pitchFamily="49" charset="0"/>
+                <a:cs typeface="Consolas" panose="020B0609020204030204" pitchFamily="49" charset="0"/>
+              </a:rPr>
+              <a:t>r</a:t>
+            </a:r>
+            <a:r>
+              <a:rPr lang="fr-FR" sz="2000" dirty="0" smtClean="0">
+                <a:latin typeface="Consolas" panose="020B0609020204030204" pitchFamily="49" charset="0"/>
+                <a:cs typeface="Consolas" panose="020B0609020204030204" pitchFamily="49" charset="0"/>
+              </a:rPr>
+              <a:t>eturn 0 </a:t>
+            </a:r>
+            <a:endParaRPr lang="fr-FR" sz="2000" dirty="0">
+              <a:latin typeface="Consolas" panose="020B0609020204030204" pitchFamily="49" charset="0"/>
+              <a:cs typeface="Consolas" panose="020B0609020204030204" pitchFamily="49" charset="0"/>
+            </a:endParaRPr>
+          </a:p>
+        </p:txBody>
+      </p:sp>
+      <p:sp>
+        <p:nvSpPr>
+          <p:cNvPr id="4" name="ZoneTexte 3"/>
+          <p:cNvSpPr txBox="1"/>
+          <p:nvPr/>
+        </p:nvSpPr>
+        <p:spPr>
+          <a:xfrm>
+            <a:off x="6526309" y="1787556"/>
+            <a:ext cx="2608730" cy="3416320"/>
+          </a:xfrm>
+          <a:prstGeom prst="rect">
+            <a:avLst/>
+          </a:prstGeom>
+          <a:noFill/>
+        </p:spPr>
+        <p:txBody>
+          <a:bodyPr wrap="square" rtlCol="0">
+            <a:spAutoFit/>
+          </a:bodyPr>
+          <a:lstStyle/>
+          <a:p>
+            <a:pPr algn="ctr">
+              <a:lnSpc>
+                <a:spcPct val="200000"/>
+              </a:lnSpc>
+            </a:pPr>
+            <a:r>
+              <a:rPr lang="fr-FR" dirty="0" err="1" smtClean="0"/>
+              <a:t>Process</a:t>
+            </a:r>
+            <a:r>
+              <a:rPr lang="fr-FR" dirty="0" smtClean="0"/>
+              <a:t>    </a:t>
+            </a:r>
+            <a:r>
+              <a:rPr lang="fr-FR" dirty="0" err="1" smtClean="0"/>
+              <a:t>Mutex</a:t>
+            </a:r>
+            <a:endParaRPr lang="fr-FR" dirty="0" smtClean="0"/>
+          </a:p>
+          <a:p>
+            <a:pPr algn="ctr">
+              <a:lnSpc>
+                <a:spcPct val="200000"/>
+              </a:lnSpc>
+            </a:pPr>
+            <a:r>
+              <a:rPr lang="fr-FR" dirty="0" smtClean="0"/>
+              <a:t>P1	m1, </a:t>
+            </a:r>
+            <a:r>
+              <a:rPr lang="fr-FR" b="1" i="1" dirty="0" smtClean="0"/>
+              <a:t>m2</a:t>
+            </a:r>
+          </a:p>
+          <a:p>
+            <a:pPr algn="ctr">
+              <a:lnSpc>
+                <a:spcPct val="200000"/>
+              </a:lnSpc>
+            </a:pPr>
+            <a:r>
+              <a:rPr lang="fr-FR" dirty="0" smtClean="0"/>
+              <a:t>P2</a:t>
+            </a:r>
+            <a:r>
+              <a:rPr lang="fr-FR" dirty="0"/>
+              <a:t>	</a:t>
+            </a:r>
+            <a:r>
+              <a:rPr lang="fr-FR" dirty="0" smtClean="0"/>
+              <a:t>m2, </a:t>
+            </a:r>
+            <a:r>
+              <a:rPr lang="fr-FR" b="1" i="1" dirty="0" smtClean="0"/>
+              <a:t>m3</a:t>
+            </a:r>
+          </a:p>
+          <a:p>
+            <a:pPr algn="ctr">
+              <a:lnSpc>
+                <a:spcPct val="200000"/>
+              </a:lnSpc>
+            </a:pPr>
+            <a:r>
+              <a:rPr lang="fr-FR" dirty="0" smtClean="0"/>
+              <a:t>P3</a:t>
+            </a:r>
+            <a:r>
+              <a:rPr lang="fr-FR" dirty="0"/>
+              <a:t>	</a:t>
+            </a:r>
+            <a:r>
+              <a:rPr lang="fr-FR" dirty="0" smtClean="0"/>
+              <a:t>m3, </a:t>
+            </a:r>
+            <a:r>
+              <a:rPr lang="fr-FR" b="1" i="1" dirty="0" smtClean="0"/>
+              <a:t>m4</a:t>
+            </a:r>
+          </a:p>
+          <a:p>
+            <a:pPr algn="ctr">
+              <a:lnSpc>
+                <a:spcPct val="200000"/>
+              </a:lnSpc>
+            </a:pPr>
+            <a:r>
+              <a:rPr lang="fr-FR" dirty="0" smtClean="0"/>
+              <a:t>P4</a:t>
+            </a:r>
+            <a:r>
+              <a:rPr lang="fr-FR" dirty="0"/>
+              <a:t>	</a:t>
+            </a:r>
+            <a:r>
+              <a:rPr lang="fr-FR" dirty="0" smtClean="0"/>
+              <a:t>m4, </a:t>
+            </a:r>
+            <a:r>
+              <a:rPr lang="fr-FR" b="1" i="1" dirty="0" smtClean="0"/>
+              <a:t>m5</a:t>
+            </a:r>
+          </a:p>
+          <a:p>
+            <a:pPr algn="ctr">
+              <a:lnSpc>
+                <a:spcPct val="200000"/>
+              </a:lnSpc>
+            </a:pPr>
+            <a:r>
+              <a:rPr lang="fr-FR" dirty="0" smtClean="0"/>
+              <a:t>P5</a:t>
+            </a:r>
+            <a:r>
+              <a:rPr lang="fr-FR" dirty="0"/>
+              <a:t>	</a:t>
+            </a:r>
+            <a:r>
+              <a:rPr lang="fr-FR" dirty="0" smtClean="0"/>
+              <a:t>m5, </a:t>
+            </a:r>
+            <a:r>
+              <a:rPr lang="fr-FR" b="1" dirty="0" smtClean="0"/>
+              <a:t>m1</a:t>
+            </a:r>
+          </a:p>
+        </p:txBody>
+      </p:sp>
+      <p:sp>
+        <p:nvSpPr>
+          <p:cNvPr id="5" name="Ellipse 4"/>
+          <p:cNvSpPr/>
+          <p:nvPr/>
+        </p:nvSpPr>
+        <p:spPr>
+          <a:xfrm>
+            <a:off x="8289044" y="4676623"/>
+            <a:ext cx="422608" cy="438453"/>
+          </a:xfrm>
+          <a:prstGeom prst="ellipse">
+            <a:avLst/>
+          </a:prstGeom>
+          <a:noFill/>
+          <a:ln>
+            <a:solidFill>
+              <a:srgbClr val="C00000"/>
+            </a:solidFill>
+          </a:ln>
+        </p:spPr>
+        <p:style>
+          <a:lnRef idx="2">
+            <a:schemeClr val="accent1">
+              <a:shade val="50000"/>
+            </a:schemeClr>
+          </a:lnRef>
+          <a:fillRef idx="1">
+            <a:schemeClr val="accent1"/>
+          </a:fillRef>
+          <a:effectRef idx="0">
+            <a:schemeClr val="accent1"/>
+          </a:effectRef>
+          <a:fontRef idx="minor">
+            <a:schemeClr val="lt1"/>
+          </a:fontRef>
+        </p:style>
+        <p:txBody>
+          <a:bodyPr rtlCol="0" anchor="ctr"/>
+          <a:lstStyle/>
+          <a:p>
+            <a:pPr algn="ctr"/>
+            <a:endParaRPr lang="fr-FR"/>
+          </a:p>
+        </p:txBody>
+      </p:sp>
+      <p:sp>
+        <p:nvSpPr>
+          <p:cNvPr id="6" name="Ellipse 5"/>
+          <p:cNvSpPr/>
+          <p:nvPr/>
+        </p:nvSpPr>
+        <p:spPr>
+          <a:xfrm>
+            <a:off x="7839541" y="2489235"/>
+            <a:ext cx="422608" cy="438453"/>
+          </a:xfrm>
+          <a:prstGeom prst="ellipse">
+            <a:avLst/>
+          </a:prstGeom>
+          <a:noFill/>
+          <a:ln>
+            <a:solidFill>
+              <a:srgbClr val="C00000"/>
+            </a:solidFill>
+          </a:ln>
+        </p:spPr>
+        <p:style>
+          <a:lnRef idx="2">
+            <a:schemeClr val="accent1">
+              <a:shade val="50000"/>
+            </a:schemeClr>
+          </a:lnRef>
+          <a:fillRef idx="1">
+            <a:schemeClr val="accent1"/>
+          </a:fillRef>
+          <a:effectRef idx="0">
+            <a:schemeClr val="accent1"/>
+          </a:effectRef>
+          <a:fontRef idx="minor">
+            <a:schemeClr val="lt1"/>
+          </a:fontRef>
+        </p:style>
+        <p:txBody>
+          <a:bodyPr rtlCol="0" anchor="ctr"/>
+          <a:lstStyle/>
+          <a:p>
+            <a:pPr algn="ctr"/>
+            <a:endParaRPr lang="fr-FR"/>
+          </a:p>
+        </p:txBody>
+      </p:sp>
+      <p:cxnSp>
+        <p:nvCxnSpPr>
+          <p:cNvPr id="8" name="Connecteur droit avec flèche 7"/>
+          <p:cNvCxnSpPr/>
+          <p:nvPr/>
+        </p:nvCxnSpPr>
+        <p:spPr>
+          <a:xfrm flipH="1" flipV="1">
+            <a:off x="7297271" y="4446494"/>
+            <a:ext cx="569165" cy="403415"/>
+          </a:xfrm>
+          <a:prstGeom prst="straightConnector1">
+            <a:avLst/>
+          </a:prstGeom>
+          <a:ln w="19050">
+            <a:solidFill>
+              <a:srgbClr val="FF0000"/>
+            </a:solidFill>
+            <a:tailEnd type="arrow"/>
+          </a:ln>
+        </p:spPr>
+        <p:style>
+          <a:lnRef idx="1">
+            <a:schemeClr val="accent1"/>
+          </a:lnRef>
+          <a:fillRef idx="0">
+            <a:schemeClr val="accent1"/>
+          </a:fillRef>
+          <a:effectRef idx="0">
+            <a:schemeClr val="accent1"/>
+          </a:effectRef>
+          <a:fontRef idx="minor">
+            <a:schemeClr val="tx1"/>
+          </a:fontRef>
+        </p:style>
+      </p:cxnSp>
+      <p:cxnSp>
+        <p:nvCxnSpPr>
+          <p:cNvPr id="12" name="Connecteur droit avec flèche 11"/>
+          <p:cNvCxnSpPr/>
+          <p:nvPr/>
+        </p:nvCxnSpPr>
+        <p:spPr>
+          <a:xfrm flipV="1">
+            <a:off x="7297272" y="4374774"/>
+            <a:ext cx="569164" cy="1"/>
+          </a:xfrm>
+          <a:prstGeom prst="straightConnector1">
+            <a:avLst/>
+          </a:prstGeom>
+          <a:ln w="19050">
+            <a:solidFill>
+              <a:srgbClr val="FF0000"/>
+            </a:solidFill>
+            <a:tailEnd type="arrow"/>
+          </a:ln>
+        </p:spPr>
+        <p:style>
+          <a:lnRef idx="1">
+            <a:schemeClr val="accent1"/>
+          </a:lnRef>
+          <a:fillRef idx="0">
+            <a:schemeClr val="accent1"/>
+          </a:fillRef>
+          <a:effectRef idx="0">
+            <a:schemeClr val="accent1"/>
+          </a:effectRef>
+          <a:fontRef idx="minor">
+            <a:schemeClr val="tx1"/>
+          </a:fontRef>
+        </p:style>
+      </p:cxnSp>
+      <p:cxnSp>
+        <p:nvCxnSpPr>
+          <p:cNvPr id="13" name="Connecteur droit avec flèche 12"/>
+          <p:cNvCxnSpPr/>
+          <p:nvPr/>
+        </p:nvCxnSpPr>
+        <p:spPr>
+          <a:xfrm flipH="1" flipV="1">
+            <a:off x="7281628" y="3365728"/>
+            <a:ext cx="569165" cy="403415"/>
+          </a:xfrm>
+          <a:prstGeom prst="straightConnector1">
+            <a:avLst/>
+          </a:prstGeom>
+          <a:ln w="19050">
+            <a:solidFill>
+              <a:srgbClr val="FF0000"/>
+            </a:solidFill>
+            <a:tailEnd type="arrow"/>
+          </a:ln>
+        </p:spPr>
+        <p:style>
+          <a:lnRef idx="1">
+            <a:schemeClr val="accent1"/>
+          </a:lnRef>
+          <a:fillRef idx="0">
+            <a:schemeClr val="accent1"/>
+          </a:fillRef>
+          <a:effectRef idx="0">
+            <a:schemeClr val="accent1"/>
+          </a:effectRef>
+          <a:fontRef idx="minor">
+            <a:schemeClr val="tx1"/>
+          </a:fontRef>
+        </p:style>
+      </p:cxnSp>
+      <p:cxnSp>
+        <p:nvCxnSpPr>
+          <p:cNvPr id="14" name="Connecteur droit avec flèche 13"/>
+          <p:cNvCxnSpPr/>
+          <p:nvPr/>
+        </p:nvCxnSpPr>
+        <p:spPr>
+          <a:xfrm flipH="1" flipV="1">
+            <a:off x="7284996" y="3899647"/>
+            <a:ext cx="569165" cy="403415"/>
+          </a:xfrm>
+          <a:prstGeom prst="straightConnector1">
+            <a:avLst/>
+          </a:prstGeom>
+          <a:ln w="19050">
+            <a:solidFill>
+              <a:srgbClr val="FF0000"/>
+            </a:solidFill>
+            <a:tailEnd type="arrow"/>
+          </a:ln>
+        </p:spPr>
+        <p:style>
+          <a:lnRef idx="1">
+            <a:schemeClr val="accent1"/>
+          </a:lnRef>
+          <a:fillRef idx="0">
+            <a:schemeClr val="accent1"/>
+          </a:fillRef>
+          <a:effectRef idx="0">
+            <a:schemeClr val="accent1"/>
+          </a:effectRef>
+          <a:fontRef idx="minor">
+            <a:schemeClr val="tx1"/>
+          </a:fontRef>
+        </p:style>
+      </p:cxnSp>
+      <p:cxnSp>
+        <p:nvCxnSpPr>
+          <p:cNvPr id="15" name="Connecteur droit avec flèche 14"/>
+          <p:cNvCxnSpPr/>
+          <p:nvPr/>
+        </p:nvCxnSpPr>
+        <p:spPr>
+          <a:xfrm flipH="1" flipV="1">
+            <a:off x="7284996" y="2796988"/>
+            <a:ext cx="569165" cy="403415"/>
+          </a:xfrm>
+          <a:prstGeom prst="straightConnector1">
+            <a:avLst/>
+          </a:prstGeom>
+          <a:ln w="19050">
+            <a:solidFill>
+              <a:srgbClr val="FF0000"/>
+            </a:solidFill>
+            <a:tailEnd type="arrow"/>
+          </a:ln>
+        </p:spPr>
+        <p:style>
+          <a:lnRef idx="1">
+            <a:schemeClr val="accent1"/>
+          </a:lnRef>
+          <a:fillRef idx="0">
+            <a:schemeClr val="accent1"/>
+          </a:fillRef>
+          <a:effectRef idx="0">
+            <a:schemeClr val="accent1"/>
+          </a:effectRef>
+          <a:fontRef idx="minor">
+            <a:schemeClr val="tx1"/>
+          </a:fontRef>
+        </p:style>
+      </p:cxnSp>
+      <p:cxnSp>
+        <p:nvCxnSpPr>
+          <p:cNvPr id="18" name="Connecteur droit avec flèche 17"/>
+          <p:cNvCxnSpPr/>
+          <p:nvPr/>
+        </p:nvCxnSpPr>
+        <p:spPr>
+          <a:xfrm flipV="1">
+            <a:off x="7279342" y="2726388"/>
+            <a:ext cx="569164" cy="1"/>
+          </a:xfrm>
+          <a:prstGeom prst="straightConnector1">
+            <a:avLst/>
+          </a:prstGeom>
+          <a:ln w="19050">
+            <a:solidFill>
+              <a:srgbClr val="FF0000"/>
+            </a:solidFill>
+            <a:tailEnd type="arrow"/>
+          </a:ln>
+        </p:spPr>
+        <p:style>
+          <a:lnRef idx="1">
+            <a:schemeClr val="accent1"/>
+          </a:lnRef>
+          <a:fillRef idx="0">
+            <a:schemeClr val="accent1"/>
+          </a:fillRef>
+          <a:effectRef idx="0">
+            <a:schemeClr val="accent1"/>
+          </a:effectRef>
+          <a:fontRef idx="minor">
+            <a:schemeClr val="tx1"/>
+          </a:fontRef>
+        </p:style>
+      </p:cxnSp>
+      <p:cxnSp>
+        <p:nvCxnSpPr>
+          <p:cNvPr id="19" name="Connecteur droit avec flèche 18"/>
+          <p:cNvCxnSpPr/>
+          <p:nvPr/>
+        </p:nvCxnSpPr>
+        <p:spPr>
+          <a:xfrm flipV="1">
+            <a:off x="7297272" y="3272123"/>
+            <a:ext cx="569164" cy="1"/>
+          </a:xfrm>
+          <a:prstGeom prst="straightConnector1">
+            <a:avLst/>
+          </a:prstGeom>
+          <a:ln w="19050">
+            <a:solidFill>
+              <a:srgbClr val="FF0000"/>
+            </a:solidFill>
+            <a:tailEnd type="arrow"/>
+          </a:ln>
+        </p:spPr>
+        <p:style>
+          <a:lnRef idx="1">
+            <a:schemeClr val="accent1"/>
+          </a:lnRef>
+          <a:fillRef idx="0">
+            <a:schemeClr val="accent1"/>
+          </a:fillRef>
+          <a:effectRef idx="0">
+            <a:schemeClr val="accent1"/>
+          </a:effectRef>
+          <a:fontRef idx="minor">
+            <a:schemeClr val="tx1"/>
+          </a:fontRef>
+        </p:style>
+      </p:cxnSp>
+      <p:cxnSp>
+        <p:nvCxnSpPr>
+          <p:cNvPr id="20" name="Connecteur droit avec flèche 19"/>
+          <p:cNvCxnSpPr/>
+          <p:nvPr/>
+        </p:nvCxnSpPr>
+        <p:spPr>
+          <a:xfrm flipV="1">
+            <a:off x="7302927" y="3840863"/>
+            <a:ext cx="569164" cy="1"/>
+          </a:xfrm>
+          <a:prstGeom prst="straightConnector1">
+            <a:avLst/>
+          </a:prstGeom>
+          <a:ln w="19050">
+            <a:solidFill>
+              <a:srgbClr val="FF0000"/>
+            </a:solidFill>
+            <a:tailEnd type="arrow"/>
+          </a:ln>
+        </p:spPr>
+        <p:style>
+          <a:lnRef idx="1">
+            <a:schemeClr val="accent1"/>
+          </a:lnRef>
+          <a:fillRef idx="0">
+            <a:schemeClr val="accent1"/>
+          </a:fillRef>
+          <a:effectRef idx="0">
+            <a:schemeClr val="accent1"/>
+          </a:effectRef>
+          <a:fontRef idx="minor">
+            <a:schemeClr val="tx1"/>
+          </a:fontRef>
+        </p:style>
+      </p:cxnSp>
+      <p:cxnSp>
+        <p:nvCxnSpPr>
+          <p:cNvPr id="21" name="Connecteur droit 20"/>
+          <p:cNvCxnSpPr/>
+          <p:nvPr/>
+        </p:nvCxnSpPr>
+        <p:spPr>
+          <a:xfrm>
+            <a:off x="6432665" y="1703869"/>
+            <a:ext cx="16711" cy="4746078"/>
+          </a:xfrm>
+          <a:prstGeom prst="line">
+            <a:avLst/>
+          </a:prstGeom>
+          <a:ln>
+            <a:solidFill>
+              <a:schemeClr val="accent2"/>
+            </a:solidFill>
+            <a:prstDash val="dash"/>
+          </a:ln>
+        </p:spPr>
+        <p:style>
+          <a:lnRef idx="2">
+            <a:schemeClr val="accent1"/>
+          </a:lnRef>
+          <a:fillRef idx="0">
+            <a:schemeClr val="accent1"/>
+          </a:fillRef>
+          <a:effectRef idx="1">
+            <a:schemeClr val="accent1"/>
+          </a:effectRef>
+          <a:fontRef idx="minor">
+            <a:schemeClr val="tx1"/>
+          </a:fontRef>
+        </p:style>
+      </p:cxnSp>
+    </p:spTree>
+    <p:extLst>
+      <p:ext uri="{BB962C8B-B14F-4D97-AF65-F5344CB8AC3E}">
+        <p14:creationId xmlns:p14="http://schemas.microsoft.com/office/powerpoint/2010/main" val="3407220762"/>
+      </p:ext>
+    </p:extLst>
+  </p:cSld>
+  <p:clrMapOvr>
+    <a:masterClrMapping/>
+  </p:clrMapOvr>
+  <p:timing>
+    <p:tnLst>
+      <p:par>
+        <p:cTn id="1" dur="indefinite" restart="never" nodeType="tmRoot">
+          <p:childTnLst>
+            <p:seq concurrent="1" nextAc="seek">
+              <p:cTn id="2" dur="indefinite" nodeType="mainSeq">
+                <p:childTnLst>
+                  <p:par>
+                    <p:cTn id="3" fill="hold">
+                      <p:stCondLst>
+                        <p:cond delay="indefinite"/>
+                      </p:stCondLst>
+                      <p:childTnLst>
+                        <p:par>
+                          <p:cTn id="4" fill="hold">
+                            <p:stCondLst>
+                              <p:cond delay="0"/>
+                            </p:stCondLst>
+                            <p:childTnLst>
+                              <p:par>
+                                <p:cTn id="5" presetID="10" presetClass="entr" presetSubtype="0" fill="hold" nodeType="clickEffect">
+                                  <p:stCondLst>
+                                    <p:cond delay="0"/>
+                                  </p:stCondLst>
+                                  <p:childTnLst>
+                                    <p:set>
+                                      <p:cBhvr>
+                                        <p:cTn id="6" dur="1" fill="hold">
+                                          <p:stCondLst>
+                                            <p:cond delay="0"/>
+                                          </p:stCondLst>
+                                        </p:cTn>
+                                        <p:tgtEl>
+                                          <p:spTgt spid="8"/>
+                                        </p:tgtEl>
+                                        <p:attrNameLst>
+                                          <p:attrName>style.visibility</p:attrName>
+                                        </p:attrNameLst>
+                                      </p:cBhvr>
+                                      <p:to>
+                                        <p:strVal val="visible"/>
+                                      </p:to>
+                                    </p:set>
+                                    <p:animEffect transition="in" filter="fade">
+                                      <p:cBhvr>
+                                        <p:cTn id="7" dur="500"/>
+                                        <p:tgtEl>
+                                          <p:spTgt spid="8"/>
+                                        </p:tgtEl>
+                                      </p:cBhvr>
+                                    </p:animEffect>
+                                  </p:childTnLst>
+                                </p:cTn>
+                              </p:par>
+                            </p:childTnLst>
+                          </p:cTn>
+                        </p:par>
+                      </p:childTnLst>
+                    </p:cTn>
+                  </p:par>
+                  <p:par>
+                    <p:cTn id="8" fill="hold">
+                      <p:stCondLst>
+                        <p:cond delay="indefinite"/>
+                      </p:stCondLst>
+                      <p:childTnLst>
+                        <p:par>
+                          <p:cTn id="9" fill="hold">
+                            <p:stCondLst>
+                              <p:cond delay="0"/>
+                            </p:stCondLst>
+                            <p:childTnLst>
+                              <p:par>
+                                <p:cTn id="10" presetID="10" presetClass="entr" presetSubtype="0" fill="hold" nodeType="clickEffect">
+                                  <p:stCondLst>
+                                    <p:cond delay="0"/>
+                                  </p:stCondLst>
+                                  <p:childTnLst>
+                                    <p:set>
+                                      <p:cBhvr>
+                                        <p:cTn id="11" dur="1" fill="hold">
+                                          <p:stCondLst>
+                                            <p:cond delay="0"/>
+                                          </p:stCondLst>
+                                        </p:cTn>
+                                        <p:tgtEl>
+                                          <p:spTgt spid="12"/>
+                                        </p:tgtEl>
+                                        <p:attrNameLst>
+                                          <p:attrName>style.visibility</p:attrName>
+                                        </p:attrNameLst>
+                                      </p:cBhvr>
+                                      <p:to>
+                                        <p:strVal val="visible"/>
+                                      </p:to>
+                                    </p:set>
+                                    <p:animEffect transition="in" filter="fade">
+                                      <p:cBhvr>
+                                        <p:cTn id="12" dur="500"/>
+                                        <p:tgtEl>
+                                          <p:spTgt spid="12"/>
+                                        </p:tgtEl>
+                                      </p:cBhvr>
+                                    </p:animEffect>
+                                  </p:childTnLst>
+                                </p:cTn>
+                              </p:par>
+                            </p:childTnLst>
+                          </p:cTn>
+                        </p:par>
+                      </p:childTnLst>
+                    </p:cTn>
+                  </p:par>
+                  <p:par>
+                    <p:cTn id="13" fill="hold">
+                      <p:stCondLst>
+                        <p:cond delay="indefinite"/>
+                      </p:stCondLst>
+                      <p:childTnLst>
+                        <p:par>
+                          <p:cTn id="14" fill="hold">
+                            <p:stCondLst>
+                              <p:cond delay="0"/>
+                            </p:stCondLst>
+                            <p:childTnLst>
+                              <p:par>
+                                <p:cTn id="15" presetID="10" presetClass="entr" presetSubtype="0" fill="hold" nodeType="clickEffect">
+                                  <p:stCondLst>
+                                    <p:cond delay="0"/>
+                                  </p:stCondLst>
+                                  <p:childTnLst>
+                                    <p:set>
+                                      <p:cBhvr>
+                                        <p:cTn id="16" dur="1" fill="hold">
+                                          <p:stCondLst>
+                                            <p:cond delay="0"/>
+                                          </p:stCondLst>
+                                        </p:cTn>
+                                        <p:tgtEl>
+                                          <p:spTgt spid="14"/>
+                                        </p:tgtEl>
+                                        <p:attrNameLst>
+                                          <p:attrName>style.visibility</p:attrName>
+                                        </p:attrNameLst>
+                                      </p:cBhvr>
+                                      <p:to>
+                                        <p:strVal val="visible"/>
+                                      </p:to>
+                                    </p:set>
+                                    <p:animEffect transition="in" filter="fade">
+                                      <p:cBhvr>
+                                        <p:cTn id="17" dur="500"/>
+                                        <p:tgtEl>
+                                          <p:spTgt spid="14"/>
+                                        </p:tgtEl>
+                                      </p:cBhvr>
+                                    </p:animEffect>
+                                  </p:childTnLst>
+                                </p:cTn>
+                              </p:par>
+                            </p:childTnLst>
+                          </p:cTn>
+                        </p:par>
+                      </p:childTnLst>
+                    </p:cTn>
+                  </p:par>
+                  <p:par>
+                    <p:cTn id="18" fill="hold">
+                      <p:stCondLst>
+                        <p:cond delay="indefinite"/>
+                      </p:stCondLst>
+                      <p:childTnLst>
+                        <p:par>
+                          <p:cTn id="19" fill="hold">
+                            <p:stCondLst>
+                              <p:cond delay="0"/>
+                            </p:stCondLst>
+                            <p:childTnLst>
+                              <p:par>
+                                <p:cTn id="20" presetID="10" presetClass="entr" presetSubtype="0" fill="hold" nodeType="clickEffect">
+                                  <p:stCondLst>
+                                    <p:cond delay="0"/>
+                                  </p:stCondLst>
+                                  <p:childTnLst>
+                                    <p:set>
+                                      <p:cBhvr>
+                                        <p:cTn id="21" dur="1" fill="hold">
+                                          <p:stCondLst>
+                                            <p:cond delay="0"/>
+                                          </p:stCondLst>
+                                        </p:cTn>
+                                        <p:tgtEl>
+                                          <p:spTgt spid="20"/>
+                                        </p:tgtEl>
+                                        <p:attrNameLst>
+                                          <p:attrName>style.visibility</p:attrName>
+                                        </p:attrNameLst>
+                                      </p:cBhvr>
+                                      <p:to>
+                                        <p:strVal val="visible"/>
+                                      </p:to>
+                                    </p:set>
+                                    <p:animEffect transition="in" filter="fade">
+                                      <p:cBhvr>
+                                        <p:cTn id="22" dur="500"/>
+                                        <p:tgtEl>
+                                          <p:spTgt spid="20"/>
+                                        </p:tgtEl>
+                                      </p:cBhvr>
+                                    </p:animEffect>
+                                  </p:childTnLst>
+                                </p:cTn>
+                              </p:par>
+                            </p:childTnLst>
+                          </p:cTn>
+                        </p:par>
+                      </p:childTnLst>
+                    </p:cTn>
+                  </p:par>
+                  <p:par>
+                    <p:cTn id="23" fill="hold">
+                      <p:stCondLst>
+                        <p:cond delay="indefinite"/>
+                      </p:stCondLst>
+                      <p:childTnLst>
+                        <p:par>
+                          <p:cTn id="24" fill="hold">
+                            <p:stCondLst>
+                              <p:cond delay="0"/>
+                            </p:stCondLst>
+                            <p:childTnLst>
+                              <p:par>
+                                <p:cTn id="25" presetID="10" presetClass="entr" presetSubtype="0" fill="hold" nodeType="clickEffect">
+                                  <p:stCondLst>
+                                    <p:cond delay="0"/>
+                                  </p:stCondLst>
+                                  <p:childTnLst>
+                                    <p:set>
+                                      <p:cBhvr>
+                                        <p:cTn id="26" dur="1" fill="hold">
+                                          <p:stCondLst>
+                                            <p:cond delay="0"/>
+                                          </p:stCondLst>
+                                        </p:cTn>
+                                        <p:tgtEl>
+                                          <p:spTgt spid="13"/>
+                                        </p:tgtEl>
+                                        <p:attrNameLst>
+                                          <p:attrName>style.visibility</p:attrName>
+                                        </p:attrNameLst>
+                                      </p:cBhvr>
+                                      <p:to>
+                                        <p:strVal val="visible"/>
+                                      </p:to>
+                                    </p:set>
+                                    <p:animEffect transition="in" filter="fade">
+                                      <p:cBhvr>
+                                        <p:cTn id="27" dur="500"/>
+                                        <p:tgtEl>
+                                          <p:spTgt spid="13"/>
+                                        </p:tgtEl>
+                                      </p:cBhvr>
+                                    </p:animEffect>
+                                  </p:childTnLst>
+                                </p:cTn>
+                              </p:par>
+                            </p:childTnLst>
+                          </p:cTn>
+                        </p:par>
+                      </p:childTnLst>
+                    </p:cTn>
+                  </p:par>
+                  <p:par>
+                    <p:cTn id="28" fill="hold">
+                      <p:stCondLst>
+                        <p:cond delay="indefinite"/>
+                      </p:stCondLst>
+                      <p:childTnLst>
+                        <p:par>
+                          <p:cTn id="29" fill="hold">
+                            <p:stCondLst>
+                              <p:cond delay="0"/>
+                            </p:stCondLst>
+                            <p:childTnLst>
+                              <p:par>
+                                <p:cTn id="30" presetID="10" presetClass="entr" presetSubtype="0" fill="hold" nodeType="clickEffect">
+                                  <p:stCondLst>
+                                    <p:cond delay="0"/>
+                                  </p:stCondLst>
+                                  <p:childTnLst>
+                                    <p:set>
+                                      <p:cBhvr>
+                                        <p:cTn id="31" dur="1" fill="hold">
+                                          <p:stCondLst>
+                                            <p:cond delay="0"/>
+                                          </p:stCondLst>
+                                        </p:cTn>
+                                        <p:tgtEl>
+                                          <p:spTgt spid="19"/>
+                                        </p:tgtEl>
+                                        <p:attrNameLst>
+                                          <p:attrName>style.visibility</p:attrName>
+                                        </p:attrNameLst>
+                                      </p:cBhvr>
+                                      <p:to>
+                                        <p:strVal val="visible"/>
+                                      </p:to>
+                                    </p:set>
+                                    <p:animEffect transition="in" filter="fade">
+                                      <p:cBhvr>
+                                        <p:cTn id="32" dur="500"/>
+                                        <p:tgtEl>
+                                          <p:spTgt spid="19"/>
+                                        </p:tgtEl>
+                                      </p:cBhvr>
+                                    </p:animEffect>
+                                  </p:childTnLst>
+                                </p:cTn>
+                              </p:par>
+                            </p:childTnLst>
+                          </p:cTn>
+                        </p:par>
+                      </p:childTnLst>
+                    </p:cTn>
+                  </p:par>
+                  <p:par>
+                    <p:cTn id="33" fill="hold">
+                      <p:stCondLst>
+                        <p:cond delay="indefinite"/>
+                      </p:stCondLst>
+                      <p:childTnLst>
+                        <p:par>
+                          <p:cTn id="34" fill="hold">
+                            <p:stCondLst>
+                              <p:cond delay="0"/>
+                            </p:stCondLst>
+                            <p:childTnLst>
+                              <p:par>
+                                <p:cTn id="35" presetID="10" presetClass="entr" presetSubtype="0" fill="hold" nodeType="clickEffect">
+                                  <p:stCondLst>
+                                    <p:cond delay="0"/>
+                                  </p:stCondLst>
+                                  <p:childTnLst>
+                                    <p:set>
+                                      <p:cBhvr>
+                                        <p:cTn id="36" dur="1" fill="hold">
+                                          <p:stCondLst>
+                                            <p:cond delay="0"/>
+                                          </p:stCondLst>
+                                        </p:cTn>
+                                        <p:tgtEl>
+                                          <p:spTgt spid="15"/>
+                                        </p:tgtEl>
+                                        <p:attrNameLst>
+                                          <p:attrName>style.visibility</p:attrName>
+                                        </p:attrNameLst>
+                                      </p:cBhvr>
+                                      <p:to>
+                                        <p:strVal val="visible"/>
+                                      </p:to>
+                                    </p:set>
+                                    <p:animEffect transition="in" filter="fade">
+                                      <p:cBhvr>
+                                        <p:cTn id="37" dur="500"/>
+                                        <p:tgtEl>
+                                          <p:spTgt spid="15"/>
+                                        </p:tgtEl>
+                                      </p:cBhvr>
+                                    </p:animEffect>
+                                  </p:childTnLst>
+                                </p:cTn>
+                              </p:par>
+                            </p:childTnLst>
+                          </p:cTn>
+                        </p:par>
+                      </p:childTnLst>
+                    </p:cTn>
+                  </p:par>
+                  <p:par>
+                    <p:cTn id="38" fill="hold">
+                      <p:stCondLst>
+                        <p:cond delay="indefinite"/>
+                      </p:stCondLst>
+                      <p:childTnLst>
+                        <p:par>
+                          <p:cTn id="39" fill="hold">
+                            <p:stCondLst>
+                              <p:cond delay="0"/>
+                            </p:stCondLst>
+                            <p:childTnLst>
+                              <p:par>
+                                <p:cTn id="40" presetID="10" presetClass="entr" presetSubtype="0" fill="hold" nodeType="clickEffect">
+                                  <p:stCondLst>
+                                    <p:cond delay="0"/>
+                                  </p:stCondLst>
+                                  <p:childTnLst>
+                                    <p:set>
+                                      <p:cBhvr>
+                                        <p:cTn id="41" dur="1" fill="hold">
+                                          <p:stCondLst>
+                                            <p:cond delay="0"/>
+                                          </p:stCondLst>
+                                        </p:cTn>
+                                        <p:tgtEl>
+                                          <p:spTgt spid="18"/>
+                                        </p:tgtEl>
+                                        <p:attrNameLst>
+                                          <p:attrName>style.visibility</p:attrName>
+                                        </p:attrNameLst>
+                                      </p:cBhvr>
+                                      <p:to>
+                                        <p:strVal val="visible"/>
+                                      </p:to>
+                                    </p:set>
+                                    <p:animEffect transition="in" filter="fade">
+                                      <p:cBhvr>
+                                        <p:cTn id="42" dur="500"/>
+                                        <p:tgtEl>
+                                          <p:spTgt spid="18"/>
+                                        </p:tgtEl>
+                                      </p:cBhvr>
+                                    </p:animEffect>
+                                  </p:childTnLst>
+                                </p:cTn>
+                              </p:par>
+                            </p:childTnLst>
+                          </p:cTn>
+                        </p:par>
+                        <p:par>
+                          <p:cTn id="43" fill="hold">
+                            <p:stCondLst>
+                              <p:cond delay="500"/>
+                            </p:stCondLst>
+                            <p:childTnLst>
+                              <p:par>
+                                <p:cTn id="44" presetID="10" presetClass="entr" presetSubtype="0" fill="hold" grpId="0" nodeType="afterEffect">
+                                  <p:stCondLst>
+                                    <p:cond delay="0"/>
+                                  </p:stCondLst>
+                                  <p:childTnLst>
+                                    <p:set>
+                                      <p:cBhvr>
+                                        <p:cTn id="45" dur="1" fill="hold">
+                                          <p:stCondLst>
+                                            <p:cond delay="0"/>
+                                          </p:stCondLst>
+                                        </p:cTn>
+                                        <p:tgtEl>
+                                          <p:spTgt spid="6"/>
+                                        </p:tgtEl>
+                                        <p:attrNameLst>
+                                          <p:attrName>style.visibility</p:attrName>
+                                        </p:attrNameLst>
+                                      </p:cBhvr>
+                                      <p:to>
+                                        <p:strVal val="visible"/>
+                                      </p:to>
+                                    </p:set>
+                                    <p:animEffect transition="in" filter="fade">
+                                      <p:cBhvr>
+                                        <p:cTn id="46" dur="500"/>
+                                        <p:tgtEl>
+                                          <p:spTgt spid="6"/>
+                                        </p:tgtEl>
+                                      </p:cBhvr>
+                                    </p:animEffect>
+                                  </p:childTnLst>
+                                </p:cTn>
+                              </p:par>
+                            </p:childTnLst>
+                          </p:cTn>
+                        </p:par>
                       </p:childTnLst>
                     </p:cTn>
                   </p:par>
@@ -6404,81 +8424,149 @@
         </p:nvSpPr>
         <p:spPr/>
         <p:txBody>
-          <a:bodyPr/>
-          <a:lstStyle/>
-          <a:p>
+          <a:bodyPr>
+            <a:normAutofit/>
+          </a:bodyPr>
+          <a:lstStyle/>
+          <a:p>
+            <a:r>
+              <a:rPr lang="fr-FR" dirty="0">
+                <a:solidFill>
+                  <a:srgbClr val="FF0000"/>
+                </a:solidFill>
+              </a:rPr>
+              <a:t>Du </a:t>
+            </a:r>
+            <a:r>
+              <a:rPr lang="fr-FR" dirty="0" err="1">
+                <a:solidFill>
+                  <a:srgbClr val="FF0000"/>
+                </a:solidFill>
+              </a:rPr>
+              <a:t>bla</a:t>
+            </a:r>
+            <a:r>
+              <a:rPr lang="fr-FR" dirty="0">
+                <a:solidFill>
+                  <a:srgbClr val="FF0000"/>
+                </a:solidFill>
+              </a:rPr>
+              <a:t> </a:t>
+            </a:r>
+            <a:r>
+              <a:rPr lang="fr-FR" dirty="0" err="1">
+                <a:solidFill>
+                  <a:srgbClr val="FF0000"/>
+                </a:solidFill>
+              </a:rPr>
+              <a:t>bla</a:t>
+            </a:r>
+            <a:r>
+              <a:rPr lang="fr-FR" dirty="0">
+                <a:solidFill>
+                  <a:srgbClr val="FF0000"/>
+                </a:solidFill>
+              </a:rPr>
+              <a:t> </a:t>
+            </a:r>
             <a:r>
               <a:rPr lang="fr-FR" dirty="0" smtClean="0">
                 <a:solidFill>
                   <a:srgbClr val="FF0000"/>
                 </a:solidFill>
               </a:rPr>
-              <a:t>Du </a:t>
-            </a:r>
-            <a:r>
-              <a:rPr lang="fr-FR" dirty="0" err="1" smtClean="0">
-                <a:solidFill>
-                  <a:srgbClr val="FF0000"/>
-                </a:solidFill>
-              </a:rPr>
-              <a:t>bla</a:t>
-            </a:r>
-            <a:r>
-              <a:rPr lang="fr-FR" dirty="0" smtClean="0">
-                <a:solidFill>
-                  <a:srgbClr val="FF0000"/>
-                </a:solidFill>
-              </a:rPr>
-              <a:t> </a:t>
-            </a:r>
-            <a:r>
-              <a:rPr lang="fr-FR" dirty="0" err="1" smtClean="0">
-                <a:solidFill>
-                  <a:srgbClr val="FF0000"/>
-                </a:solidFill>
-              </a:rPr>
-              <a:t>bla</a:t>
-            </a:r>
-            <a:r>
-              <a:rPr lang="fr-FR" dirty="0" smtClean="0">
-                <a:solidFill>
-                  <a:srgbClr val="FF0000"/>
-                </a:solidFill>
-              </a:rPr>
-              <a:t> général</a:t>
-            </a:r>
-          </a:p>
-          <a:p>
-            <a:endParaRPr lang="fr-FR" dirty="0"/>
-          </a:p>
-          <a:p>
+              <a:t>général</a:t>
+            </a:r>
+          </a:p>
+          <a:p>
+            <a:pPr marL="0" indent="0">
+              <a:lnSpc>
+                <a:spcPct val="150000"/>
+              </a:lnSpc>
+              <a:buNone/>
+            </a:pPr>
             <a:endParaRPr lang="fr-FR" dirty="0" smtClean="0"/>
           </a:p>
           <a:p>
-            <a:endParaRPr lang="fr-FR" dirty="0"/>
-          </a:p>
-          <a:p>
-            <a:endParaRPr lang="fr-FR" dirty="0" smtClean="0"/>
-          </a:p>
-          <a:p>
+            <a:pPr>
+              <a:lnSpc>
+                <a:spcPct val="150000"/>
+              </a:lnSpc>
+            </a:pPr>
             <a:r>
               <a:rPr lang="fr-FR" dirty="0" smtClean="0"/>
               <a:t>Architecture</a:t>
             </a:r>
-          </a:p>
-          <a:p>
+            <a:endParaRPr lang="fr-FR" dirty="0" smtClean="0"/>
+          </a:p>
+          <a:p>
+            <a:pPr>
+              <a:lnSpc>
+                <a:spcPct val="150000"/>
+              </a:lnSpc>
+            </a:pPr>
+            <a:r>
+              <a:rPr lang="fr-FR" dirty="0" err="1" smtClean="0"/>
+              <a:t>Process</a:t>
+            </a:r>
             <a:r>
               <a:rPr lang="fr-FR" dirty="0" smtClean="0"/>
-              <a:t>PCB</a:t>
-            </a:r>
-          </a:p>
-          <a:p>
+              <a:t> Control Block</a:t>
+            </a:r>
+          </a:p>
+          <a:p>
+            <a:pPr>
+              <a:lnSpc>
+                <a:spcPct val="150000"/>
+              </a:lnSpc>
+            </a:pPr>
             <a:r>
               <a:rPr lang="fr-FR" dirty="0" smtClean="0"/>
-              <a:t>Allocation mémoire</a:t>
-            </a:r>
-          </a:p>
-          <a:p>
+              <a:t>Ordonnanceurs</a:t>
+            </a:r>
+            <a:endParaRPr lang="fr-FR" dirty="0" smtClean="0"/>
+          </a:p>
+          <a:p>
+            <a:pPr>
+              <a:lnSpc>
+                <a:spcPct val="150000"/>
+              </a:lnSpc>
+            </a:pPr>
+            <a:r>
+              <a:rPr lang="fr-FR" dirty="0" smtClean="0"/>
+              <a:t>Allocateur </a:t>
+            </a:r>
+            <a:r>
+              <a:rPr lang="fr-FR" dirty="0" smtClean="0"/>
+              <a:t>mémoire</a:t>
+            </a:r>
+          </a:p>
+          <a:p>
+            <a:pPr>
+              <a:lnSpc>
+                <a:spcPct val="150000"/>
+              </a:lnSpc>
+            </a:pPr>
+            <a:r>
+              <a:rPr lang="fr-FR" dirty="0" smtClean="0"/>
+              <a:t>Sémaphores et </a:t>
+            </a:r>
+            <a:r>
+              <a:rPr lang="fr-FR" dirty="0" err="1" smtClean="0"/>
+              <a:t>mutex</a:t>
+            </a:r>
+            <a:endParaRPr lang="fr-FR" dirty="0"/>
+          </a:p>
+          <a:p>
+            <a:pPr>
+              <a:lnSpc>
+                <a:spcPct val="150000"/>
+              </a:lnSpc>
+            </a:pPr>
+            <a:r>
+              <a:rPr lang="fr-FR" dirty="0" smtClean="0"/>
+              <a:t>APIs</a:t>
+            </a:r>
             <a:endParaRPr lang="fr-FR" dirty="0"/>
           </a:p>
         </p:txBody>
@@ -6922,8 +9010,8 @@
         </p:nvSpPr>
         <p:spPr>
           <a:xfrm>
-            <a:off x="1612956" y="2283124"/>
-            <a:ext cx="1378052" cy="369332"/>
+            <a:off x="1202965" y="2283124"/>
+            <a:ext cx="2198038" cy="369332"/>
           </a:xfrm>
           <a:prstGeom prst="rect">
             <a:avLst/>
@@ -6943,7 +9031,15 @@
                   <a:schemeClr val="bg1"/>
                 </a:solidFill>
               </a:rPr>
-              <a:t>Sémaphore</a:t>
+              <a:t>Sémaphore / </a:t>
+            </a:r>
+            <a:r>
+              <a:rPr lang="fr-FR" dirty="0" err="1" smtClean="0">
+                <a:solidFill>
+                  <a:schemeClr val="bg1"/>
+                </a:solidFill>
+              </a:rPr>
+              <a:t>Mutex</a:t>
             </a:r>
             <a:endParaRPr lang="fr-FR" dirty="0">
               <a:solidFill>
@@ -6997,8 +9093,8 @@
         </p:nvSpPr>
         <p:spPr>
           <a:xfrm>
-            <a:off x="3506841" y="5999444"/>
-            <a:ext cx="890576" cy="369332"/>
+            <a:off x="3161181" y="5999444"/>
+            <a:ext cx="1236236" cy="369332"/>
           </a:xfrm>
           <a:prstGeom prst="rect">
             <a:avLst/>
@@ -7014,7 +9110,7 @@
             <a:pPr algn="r"/>
             <a:r>
               <a:rPr lang="fr-FR" dirty="0" smtClean="0"/>
-              <a:t>attente</a:t>
+              <a:t>En attente</a:t>
             </a:r>
             <a:endParaRPr lang="fr-FR" dirty="0"/>
           </a:p>
@@ -7029,7 +9125,7 @@
         <p:spPr>
           <a:xfrm>
             <a:off x="4819722" y="6001440"/>
-            <a:ext cx="1762021" cy="369332"/>
+            <a:ext cx="2916183" cy="369332"/>
           </a:xfrm>
           <a:prstGeom prst="rect">
             <a:avLst/>
@@ -7043,10 +9139,9 @@
           <a:lstStyle/>
           <a:p>
             <a:r>
-              <a:rPr lang="fr-FR" dirty="0" smtClean="0"/>
-              <a:t>prêt / exécution</a:t>
-            </a:r>
-            <a:endParaRPr lang="fr-FR" dirty="0"/>
+              <a:rPr lang="fr-FR" dirty="0"/>
+              <a:t>Prêt / en cours d’exécution</a:t>
+            </a:r>
           </a:p>
         </p:txBody>
       </p:sp>
@@ -7178,12 +9273,12 @@
               <a:t>Un </a:t>
             </a:r>
             <a:r>
-              <a:rPr lang="fr-FR" dirty="0" err="1" smtClean="0"/>
-              <a:t>process</a:t>
-            </a:r>
-            <a:r>
               <a:rPr lang="fr-FR" dirty="0" smtClean="0"/>
-              <a:t> ID unique</a:t>
+              <a:t>PID </a:t>
+            </a:r>
+            <a:r>
+              <a:rPr lang="fr-FR" dirty="0" smtClean="0"/>
+              <a:t>unique</a:t>
             </a:r>
           </a:p>
           <a:p>
@@ -7390,8 +9485,8 @@
         </p:nvSpPr>
         <p:spPr>
           <a:xfrm>
-            <a:off x="1727230" y="3225328"/>
-            <a:ext cx="1938465" cy="1219943"/>
+            <a:off x="1727230" y="3092824"/>
+            <a:ext cx="1938465" cy="1490131"/>
           </a:xfrm>
           <a:prstGeom prst="rect">
             <a:avLst/>
@@ -7438,6 +9533,18 @@
               <a:rPr lang="fr-FR" dirty="0" smtClean="0"/>
               <a:t>état = attente</a:t>
             </a:r>
+          </a:p>
+          <a:p>
+            <a:pPr algn="ctr"/>
+            <a:r>
+              <a:rPr lang="fr-FR" dirty="0" err="1"/>
+              <a:t>m</a:t>
+            </a:r>
+            <a:r>
+              <a:rPr lang="fr-FR" dirty="0" err="1" smtClean="0"/>
+              <a:t>utex_list</a:t>
+            </a:r>
+            <a:endParaRPr lang="fr-FR" dirty="0" smtClean="0"/>
           </a:p>
         </p:txBody>
       </p:sp>

</xml_diff>

<commit_message>
Adds a slide about the FAT file system
</commit_message>
<xml_diff>
--- a/ppt/presentation.pptx
+++ b/ppt/presentation.pptx
@@ -18,6 +18,8 @@
     <p:sldId id="258" r:id="rId12"/>
     <p:sldId id="259" r:id="rId13"/>
     <p:sldId id="270" r:id="rId14"/>
+    <p:sldId id="272" r:id="rId15"/>
+    <p:sldId id="271" r:id="rId16"/>
   </p:sldIdLst>
   <p:sldSz cx="9144000" cy="6858000" type="screen4x3"/>
   <p:notesSz cx="6858000" cy="9144000"/>
@@ -307,7 +309,7 @@
           <a:p>
             <a:fld id="{02B29D59-80A7-42AB-BA98-B46C05CBCD2D}" type="datetimeFigureOut">
               <a:rPr lang="fr-FR" smtClean="0"/>
-              <a:t>18/11/2013</a:t>
+              <a:t>19/11/13</a:t>
             </a:fld>
             <a:endParaRPr lang="fr-FR"/>
           </a:p>
@@ -349,7 +351,7 @@
           <a:p>
             <a:fld id="{F02C3570-90AD-431D-9871-FE88EA036DFC}" type="slidenum">
               <a:rPr lang="fr-FR" smtClean="0"/>
-              <a:t>‹N°›</a:t>
+              <a:t>‹#›</a:t>
             </a:fld>
             <a:endParaRPr lang="fr-FR"/>
           </a:p>
@@ -507,7 +509,7 @@
           <a:p>
             <a:fld id="{02B29D59-80A7-42AB-BA98-B46C05CBCD2D}" type="datetimeFigureOut">
               <a:rPr lang="fr-FR" smtClean="0"/>
-              <a:t>18/11/2013</a:t>
+              <a:t>19/11/13</a:t>
             </a:fld>
             <a:endParaRPr lang="fr-FR"/>
           </a:p>
@@ -549,7 +551,7 @@
           <a:p>
             <a:fld id="{F02C3570-90AD-431D-9871-FE88EA036DFC}" type="slidenum">
               <a:rPr lang="fr-FR" smtClean="0"/>
-              <a:t>‹N°›</a:t>
+              <a:t>‹#›</a:t>
             </a:fld>
             <a:endParaRPr lang="fr-FR"/>
           </a:p>
@@ -682,7 +684,7 @@
           <a:p>
             <a:fld id="{02B29D59-80A7-42AB-BA98-B46C05CBCD2D}" type="datetimeFigureOut">
               <a:rPr lang="fr-FR" smtClean="0"/>
-              <a:t>18/11/2013</a:t>
+              <a:t>19/11/13</a:t>
             </a:fld>
             <a:endParaRPr lang="fr-FR"/>
           </a:p>
@@ -724,7 +726,7 @@
           <a:p>
             <a:fld id="{F02C3570-90AD-431D-9871-FE88EA036DFC}" type="slidenum">
               <a:rPr lang="fr-FR" smtClean="0"/>
-              <a:t>‹N°›</a:t>
+              <a:t>‹#›</a:t>
             </a:fld>
             <a:endParaRPr lang="fr-FR"/>
           </a:p>
@@ -847,7 +849,7 @@
           <a:p>
             <a:fld id="{02B29D59-80A7-42AB-BA98-B46C05CBCD2D}" type="datetimeFigureOut">
               <a:rPr lang="fr-FR" smtClean="0"/>
-              <a:t>18/11/2013</a:t>
+              <a:t>19/11/13</a:t>
             </a:fld>
             <a:endParaRPr lang="fr-FR"/>
           </a:p>
@@ -889,7 +891,7 @@
           <a:p>
             <a:fld id="{F02C3570-90AD-431D-9871-FE88EA036DFC}" type="slidenum">
               <a:rPr lang="fr-FR" smtClean="0"/>
-              <a:t>‹N°›</a:t>
+              <a:t>‹#›</a:t>
             </a:fld>
             <a:endParaRPr lang="fr-FR"/>
           </a:p>
@@ -1095,7 +1097,7 @@
           <a:p>
             <a:fld id="{02B29D59-80A7-42AB-BA98-B46C05CBCD2D}" type="datetimeFigureOut">
               <a:rPr lang="fr-FR" smtClean="0"/>
-              <a:t>18/11/2013</a:t>
+              <a:t>19/11/13</a:t>
             </a:fld>
             <a:endParaRPr lang="fr-FR"/>
           </a:p>
@@ -1137,7 +1139,7 @@
           <a:p>
             <a:fld id="{F02C3570-90AD-431D-9871-FE88EA036DFC}" type="slidenum">
               <a:rPr lang="fr-FR" smtClean="0"/>
-              <a:t>‹N°›</a:t>
+              <a:t>‹#›</a:t>
             </a:fld>
             <a:endParaRPr lang="fr-FR"/>
           </a:p>
@@ -1413,7 +1415,7 @@
           <a:p>
             <a:fld id="{02B29D59-80A7-42AB-BA98-B46C05CBCD2D}" type="datetimeFigureOut">
               <a:rPr lang="fr-FR" smtClean="0"/>
-              <a:t>18/11/2013</a:t>
+              <a:t>19/11/13</a:t>
             </a:fld>
             <a:endParaRPr lang="fr-FR"/>
           </a:p>
@@ -1455,7 +1457,7 @@
           <a:p>
             <a:fld id="{F02C3570-90AD-431D-9871-FE88EA036DFC}" type="slidenum">
               <a:rPr lang="fr-FR" smtClean="0"/>
-              <a:t>‹N°›</a:t>
+              <a:t>‹#›</a:t>
             </a:fld>
             <a:endParaRPr lang="fr-FR"/>
           </a:p>
@@ -1879,7 +1881,7 @@
           <a:p>
             <a:fld id="{02B29D59-80A7-42AB-BA98-B46C05CBCD2D}" type="datetimeFigureOut">
               <a:rPr lang="fr-FR" smtClean="0"/>
-              <a:t>18/11/2013</a:t>
+              <a:t>19/11/13</a:t>
             </a:fld>
             <a:endParaRPr lang="fr-FR"/>
           </a:p>
@@ -1921,7 +1923,7 @@
           <a:p>
             <a:fld id="{F02C3570-90AD-431D-9871-FE88EA036DFC}" type="slidenum">
               <a:rPr lang="fr-FR" smtClean="0"/>
-              <a:t>‹N°›</a:t>
+              <a:t>‹#›</a:t>
             </a:fld>
             <a:endParaRPr lang="fr-FR"/>
           </a:p>
@@ -2027,7 +2029,7 @@
           <a:p>
             <a:fld id="{02B29D59-80A7-42AB-BA98-B46C05CBCD2D}" type="datetimeFigureOut">
               <a:rPr lang="fr-FR" smtClean="0"/>
-              <a:t>18/11/2013</a:t>
+              <a:t>19/11/13</a:t>
             </a:fld>
             <a:endParaRPr lang="fr-FR"/>
           </a:p>
@@ -2069,7 +2071,7 @@
           <a:p>
             <a:fld id="{F02C3570-90AD-431D-9871-FE88EA036DFC}" type="slidenum">
               <a:rPr lang="fr-FR" smtClean="0"/>
-              <a:t>‹N°›</a:t>
+              <a:t>‹#›</a:t>
             </a:fld>
             <a:endParaRPr lang="fr-FR"/>
           </a:p>
@@ -2117,7 +2119,7 @@
           <a:p>
             <a:fld id="{02B29D59-80A7-42AB-BA98-B46C05CBCD2D}" type="datetimeFigureOut">
               <a:rPr lang="fr-FR" smtClean="0"/>
-              <a:t>18/11/2013</a:t>
+              <a:t>19/11/13</a:t>
             </a:fld>
             <a:endParaRPr lang="fr-FR"/>
           </a:p>
@@ -2159,7 +2161,7 @@
           <a:p>
             <a:fld id="{F02C3570-90AD-431D-9871-FE88EA036DFC}" type="slidenum">
               <a:rPr lang="fr-FR" smtClean="0"/>
-              <a:t>‹N°›</a:t>
+              <a:t>‹#›</a:t>
             </a:fld>
             <a:endParaRPr lang="fr-FR"/>
           </a:p>
@@ -2391,7 +2393,7 @@
           <a:p>
             <a:fld id="{02B29D59-80A7-42AB-BA98-B46C05CBCD2D}" type="datetimeFigureOut">
               <a:rPr lang="fr-FR" smtClean="0"/>
-              <a:t>18/11/2013</a:t>
+              <a:t>19/11/13</a:t>
             </a:fld>
             <a:endParaRPr lang="fr-FR"/>
           </a:p>
@@ -2433,7 +2435,7 @@
           <a:p>
             <a:fld id="{F02C3570-90AD-431D-9871-FE88EA036DFC}" type="slidenum">
               <a:rPr lang="fr-FR" smtClean="0"/>
-              <a:t>‹N°›</a:t>
+              <a:t>‹#›</a:t>
             </a:fld>
             <a:endParaRPr lang="fr-FR"/>
           </a:p>
@@ -2696,7 +2698,7 @@
           <a:p>
             <a:fld id="{02B29D59-80A7-42AB-BA98-B46C05CBCD2D}" type="datetimeFigureOut">
               <a:rPr lang="fr-FR" smtClean="0"/>
-              <a:t>18/11/2013</a:t>
+              <a:t>19/11/13</a:t>
             </a:fld>
             <a:endParaRPr lang="fr-FR"/>
           </a:p>
@@ -2738,7 +2740,7 @@
           <a:p>
             <a:fld id="{F02C3570-90AD-431D-9871-FE88EA036DFC}" type="slidenum">
               <a:rPr lang="fr-FR" smtClean="0"/>
-              <a:t>‹N°›</a:t>
+              <a:t>‹#›</a:t>
             </a:fld>
             <a:endParaRPr lang="fr-FR"/>
           </a:p>
@@ -2994,7 +2996,7 @@
           <a:p>
             <a:fld id="{02B29D59-80A7-42AB-BA98-B46C05CBCD2D}" type="datetimeFigureOut">
               <a:rPr lang="fr-FR" smtClean="0"/>
-              <a:t>18/11/2013</a:t>
+              <a:t>19/11/13</a:t>
             </a:fld>
             <a:endParaRPr lang="fr-FR"/>
           </a:p>
@@ -3068,7 +3070,7 @@
           <a:p>
             <a:fld id="{F02C3570-90AD-431D-9871-FE88EA036DFC}" type="slidenum">
               <a:rPr lang="fr-FR" smtClean="0"/>
-              <a:t>‹N°›</a:t>
+              <a:t>‹#›</a:t>
             </a:fld>
             <a:endParaRPr lang="fr-FR"/>
           </a:p>
@@ -3526,7 +3528,7 @@
   <p:timing>
     <p:tnLst>
       <p:par>
-        <p:cTn id="1" dur="indefinite" restart="never" nodeType="tmRoot"/>
+        <p:cTn xmlns:p14="http://schemas.microsoft.com/office/powerpoint/2010/main" id="1" dur="indefinite" restart="never" nodeType="tmRoot"/>
       </p:par>
     </p:tnLst>
   </p:timing>
@@ -3603,7 +3605,6 @@
               <a:rPr lang="fr-FR" dirty="0" smtClean="0"/>
               <a:t>Philosophes</a:t>
             </a:r>
-            <a:endParaRPr lang="fr-FR" dirty="0" smtClean="0"/>
           </a:p>
           <a:p>
             <a:pPr>
@@ -3643,7 +3644,7 @@
   <p:timing>
     <p:tnLst>
       <p:par>
-        <p:cTn id="1" dur="indefinite" restart="never" nodeType="tmRoot"/>
+        <p:cTn xmlns:p14="http://schemas.microsoft.com/office/powerpoint/2010/main" id="1" dur="indefinite" restart="never" nodeType="tmRoot"/>
       </p:par>
     </p:tnLst>
   </p:timing>
@@ -3709,22 +3710,13 @@
           <a:p>
             <a:r>
               <a:rPr lang="fr-FR" dirty="0" smtClean="0"/>
-              <a:t>N </a:t>
-            </a:r>
+              <a:t>N philosophes : processus</a:t>
+            </a:r>
+          </a:p>
+          <a:p>
             <a:r>
               <a:rPr lang="fr-FR" dirty="0" smtClean="0"/>
-              <a:t>philosophes : processus</a:t>
-            </a:r>
-            <a:endParaRPr lang="fr-FR" dirty="0" smtClean="0"/>
-          </a:p>
-          <a:p>
-            <a:r>
-              <a:rPr lang="fr-FR" dirty="0" smtClean="0"/>
-              <a:t>N </a:t>
-            </a:r>
-            <a:r>
-              <a:rPr lang="fr-FR" dirty="0" smtClean="0"/>
-              <a:t>fourchettes : </a:t>
+              <a:t>N fourchettes : </a:t>
             </a:r>
             <a:r>
               <a:rPr lang="fr-FR" dirty="0" err="1" smtClean="0"/>
@@ -3735,11 +3727,7 @@
           <a:p>
             <a:r>
               <a:rPr lang="fr-FR" dirty="0" smtClean="0"/>
-              <a:t>Philosopher </a:t>
-            </a:r>
-            <a:r>
-              <a:rPr lang="fr-FR" dirty="0" smtClean="0"/>
-              <a:t>:</a:t>
+              <a:t>Philosopher :</a:t>
             </a:r>
           </a:p>
           <a:p>
@@ -3942,7 +3930,7 @@
   <p:timing>
     <p:tnLst>
       <p:par>
-        <p:cTn id="1" dur="indefinite" restart="never" nodeType="tmRoot"/>
+        <p:cTn xmlns:p14="http://schemas.microsoft.com/office/powerpoint/2010/main" id="1" dur="indefinite" restart="never" nodeType="tmRoot"/>
       </p:par>
     </p:tnLst>
   </p:timing>
@@ -3997,7 +3985,7 @@
           </a:prstGeom>
           <a:noFill/>
           <a:extLst>
-            <a:ext uri="{909E8E84-426E-40DD-AFC4-6F175D3DCCD1}">
+            <a:ext uri="{909E8E84-426E-40dd-AFC4-6F175D3DCCD1}">
               <a14:hiddenFill xmlns:a14="http://schemas.microsoft.com/office/drawing/2010/main">
                 <a:solidFill>
                   <a:srgbClr val="FFFFFF"/>
@@ -4084,7 +4072,7 @@
           </a:prstGeom>
           <a:noFill/>
           <a:extLst>
-            <a:ext uri="{909E8E84-426E-40DD-AFC4-6F175D3DCCD1}">
+            <a:ext uri="{909E8E84-426E-40dd-AFC4-6F175D3DCCD1}">
               <a14:hiddenFill xmlns:a14="http://schemas.microsoft.com/office/drawing/2010/main">
                 <a:solidFill>
                   <a:srgbClr val="FFFFFF"/>
@@ -4125,7 +4113,7 @@
           </a:prstGeom>
           <a:noFill/>
           <a:extLst>
-            <a:ext uri="{909E8E84-426E-40DD-AFC4-6F175D3DCCD1}">
+            <a:ext uri="{909E8E84-426E-40dd-AFC4-6F175D3DCCD1}">
               <a14:hiddenFill xmlns:a14="http://schemas.microsoft.com/office/drawing/2010/main">
                 <a:solidFill>
                   <a:srgbClr val="FFFFFF"/>
@@ -4166,7 +4154,7 @@
           </a:prstGeom>
           <a:noFill/>
           <a:extLst>
-            <a:ext uri="{909E8E84-426E-40DD-AFC4-6F175D3DCCD1}">
+            <a:ext uri="{909E8E84-426E-40dd-AFC4-6F175D3DCCD1}">
               <a14:hiddenFill xmlns:a14="http://schemas.microsoft.com/office/drawing/2010/main">
                 <a:solidFill>
                   <a:srgbClr val="FFFFFF"/>
@@ -4207,7 +4195,7 @@
           </a:prstGeom>
           <a:noFill/>
           <a:extLst>
-            <a:ext uri="{909E8E84-426E-40DD-AFC4-6F175D3DCCD1}">
+            <a:ext uri="{909E8E84-426E-40dd-AFC4-6F175D3DCCD1}">
               <a14:hiddenFill xmlns:a14="http://schemas.microsoft.com/office/drawing/2010/main">
                 <a:solidFill>
                   <a:srgbClr val="FFFFFF"/>
@@ -4248,7 +4236,7 @@
           </a:prstGeom>
           <a:noFill/>
           <a:extLst>
-            <a:ext uri="{909E8E84-426E-40DD-AFC4-6F175D3DCCD1}">
+            <a:ext uri="{909E8E84-426E-40dd-AFC4-6F175D3DCCD1}">
               <a14:hiddenFill xmlns:a14="http://schemas.microsoft.com/office/drawing/2010/main">
                 <a:solidFill>
                   <a:srgbClr val="FFFFFF"/>
@@ -4466,11 +4454,7 @@
           <a:p>
             <a:r>
               <a:rPr lang="fr-FR" sz="2000" dirty="0" smtClean="0"/>
-              <a:t>m</a:t>
-            </a:r>
-            <a:r>
-              <a:rPr lang="fr-FR" sz="2000" dirty="0" smtClean="0"/>
-              <a:t>2</a:t>
+              <a:t>m2</a:t>
             </a:r>
             <a:endParaRPr lang="fr-FR" sz="2000" dirty="0"/>
           </a:p>
@@ -4500,11 +4484,7 @@
           <a:p>
             <a:r>
               <a:rPr lang="fr-FR" sz="2000" dirty="0" smtClean="0"/>
-              <a:t>m</a:t>
-            </a:r>
-            <a:r>
-              <a:rPr lang="fr-FR" sz="2000" dirty="0" smtClean="0"/>
-              <a:t>3</a:t>
+              <a:t>m3</a:t>
             </a:r>
             <a:endParaRPr lang="fr-FR" sz="2000" dirty="0"/>
           </a:p>
@@ -4821,7 +4801,7 @@
   <p:timing>
     <p:tnLst>
       <p:par>
-        <p:cTn id="1" dur="indefinite" restart="never" nodeType="tmRoot">
+        <p:cTn xmlns:p14="http://schemas.microsoft.com/office/powerpoint/2010/main" id="1" dur="indefinite" restart="never" nodeType="tmRoot">
           <p:childTnLst>
             <p:seq concurrent="1" nextAc="seek">
               <p:cTn id="2" dur="indefinite" nodeType="mainSeq">
@@ -5606,10 +5586,6 @@
               </a:rPr>
               <a:t>eturn -1</a:t>
             </a:r>
-            <a:endParaRPr lang="fr-FR" sz="2000" dirty="0" smtClean="0">
-              <a:latin typeface="Consolas" panose="020B0609020204030204" pitchFamily="49" charset="0"/>
-              <a:cs typeface="Consolas" panose="020B0609020204030204" pitchFamily="49" charset="0"/>
-            </a:endParaRPr>
           </a:p>
           <a:p>
             <a:pPr marL="0" indent="0">
@@ -6394,7 +6370,7 @@
   <p:timing>
     <p:tnLst>
       <p:par>
-        <p:cTn id="1" dur="indefinite" restart="never" nodeType="tmRoot">
+        <p:cTn xmlns:p14="http://schemas.microsoft.com/office/powerpoint/2010/main" id="1" dur="indefinite" restart="never" nodeType="tmRoot">
           <p:childTnLst>
             <p:seq concurrent="1" nextAc="seek">
               <p:cTn id="2" dur="indefinite" nodeType="mainSeq">
@@ -6895,6 +6871,497 @@
 </p:sld>
 </file>
 
+<file path=ppt/slides/slide14.xml><?xml version="1.0" encoding="utf-8"?>
+<p:sld xmlns:a="http://schemas.openxmlformats.org/drawingml/2006/main" xmlns:r="http://schemas.openxmlformats.org/officeDocument/2006/relationships" xmlns:p="http://schemas.openxmlformats.org/presentationml/2006/main">
+  <p:cSld>
+    <p:spTree>
+      <p:nvGrpSpPr>
+        <p:cNvPr id="1" name=""/>
+        <p:cNvGrpSpPr/>
+        <p:nvPr/>
+      </p:nvGrpSpPr>
+      <p:grpSpPr>
+        <a:xfrm>
+          <a:off x="0" y="0"/>
+          <a:ext cx="0" cy="0"/>
+          <a:chOff x="0" y="0"/>
+          <a:chExt cx="0" cy="0"/>
+        </a:xfrm>
+      </p:grpSpPr>
+      <p:sp>
+        <p:nvSpPr>
+          <p:cNvPr id="2" name="Titre 1"/>
+          <p:cNvSpPr>
+            <a:spLocks noGrp="1"/>
+          </p:cNvSpPr>
+          <p:nvPr>
+            <p:ph type="title"/>
+          </p:nvPr>
+        </p:nvSpPr>
+        <p:spPr>
+          <a:xfrm>
+            <a:off x="457200" y="2446924"/>
+            <a:ext cx="8229600" cy="990600"/>
+          </a:xfrm>
+        </p:spPr>
+        <p:txBody>
+          <a:bodyPr/>
+          <a:lstStyle/>
+          <a:p>
+            <a:pPr algn="ctr"/>
+            <a:r>
+              <a:rPr lang="fr-FR" dirty="0" smtClean="0"/>
+              <a:t>Surprise </a:t>
+            </a:r>
+            <a:r>
+              <a:rPr lang="fr-FR" dirty="0" smtClean="0"/>
+              <a:t>…</a:t>
+            </a:r>
+            <a:endParaRPr lang="fr-FR" dirty="0"/>
+          </a:p>
+        </p:txBody>
+      </p:sp>
+    </p:spTree>
+    <p:extLst>
+      <p:ext uri="{BB962C8B-B14F-4D97-AF65-F5344CB8AC3E}">
+        <p14:creationId xmlns:p14="http://schemas.microsoft.com/office/powerpoint/2010/main" val="1694068925"/>
+      </p:ext>
+    </p:extLst>
+  </p:cSld>
+  <p:clrMapOvr>
+    <a:masterClrMapping/>
+  </p:clrMapOvr>
+  <p:timing>
+    <p:tnLst>
+      <p:par>
+        <p:cTn xmlns:p14="http://schemas.microsoft.com/office/powerpoint/2010/main" id="1" dur="indefinite" restart="never" nodeType="tmRoot"/>
+      </p:par>
+    </p:tnLst>
+  </p:timing>
+</p:sld>
+</file>
+
+<file path=ppt/slides/slide15.xml><?xml version="1.0" encoding="utf-8"?>
+<p:sld xmlns:a="http://schemas.openxmlformats.org/drawingml/2006/main" xmlns:r="http://schemas.openxmlformats.org/officeDocument/2006/relationships" xmlns:p="http://schemas.openxmlformats.org/presentationml/2006/main">
+  <p:cSld>
+    <p:spTree>
+      <p:nvGrpSpPr>
+        <p:cNvPr id="1" name=""/>
+        <p:cNvGrpSpPr/>
+        <p:nvPr/>
+      </p:nvGrpSpPr>
+      <p:grpSpPr>
+        <a:xfrm>
+          <a:off x="0" y="0"/>
+          <a:ext cx="0" cy="0"/>
+          <a:chOff x="0" y="0"/>
+          <a:chExt cx="0" cy="0"/>
+        </a:xfrm>
+      </p:grpSpPr>
+      <p:sp>
+        <p:nvSpPr>
+          <p:cNvPr id="2" name="Titre 1"/>
+          <p:cNvSpPr>
+            <a:spLocks noGrp="1"/>
+          </p:cNvSpPr>
+          <p:nvPr>
+            <p:ph type="title"/>
+          </p:nvPr>
+        </p:nvSpPr>
+        <p:spPr/>
+        <p:txBody>
+          <a:bodyPr/>
+          <a:lstStyle/>
+          <a:p>
+            <a:r>
+              <a:rPr lang="fr-FR" dirty="0" smtClean="0"/>
+              <a:t>Driver File Allocation Table</a:t>
+            </a:r>
+            <a:endParaRPr lang="fr-FR" dirty="0"/>
+          </a:p>
+        </p:txBody>
+      </p:sp>
+      <p:sp>
+        <p:nvSpPr>
+          <p:cNvPr id="3" name="Espace réservé du contenu 2"/>
+          <p:cNvSpPr>
+            <a:spLocks noGrp="1"/>
+          </p:cNvSpPr>
+          <p:nvPr>
+            <p:ph idx="1"/>
+          </p:nvPr>
+        </p:nvSpPr>
+        <p:spPr>
+          <a:xfrm>
+            <a:off x="457200" y="1600199"/>
+            <a:ext cx="8229600" cy="3338062"/>
+          </a:xfrm>
+        </p:spPr>
+        <p:txBody>
+          <a:bodyPr>
+            <a:normAutofit/>
+          </a:bodyPr>
+          <a:lstStyle/>
+          <a:p>
+            <a:r>
+              <a:rPr lang="fr-FR" sz="2800" dirty="0" smtClean="0"/>
+              <a:t>Support de FAT12 et FAT16</a:t>
+            </a:r>
+          </a:p>
+          <a:p>
+            <a:r>
+              <a:rPr lang="fr-FR" sz="2800" dirty="0" smtClean="0">
+                <a:latin typeface="Consolas" panose="020B0609020204030204" pitchFamily="49" charset="0"/>
+                <a:cs typeface="Consolas" panose="020B0609020204030204" pitchFamily="49" charset="0"/>
+              </a:rPr>
+              <a:t>1 dossier = 1 fichier</a:t>
+            </a:r>
+          </a:p>
+          <a:p>
+            <a:r>
+              <a:rPr lang="fr-FR" sz="2800" dirty="0" smtClean="0">
+                <a:latin typeface="Consolas" panose="020B0609020204030204" pitchFamily="49" charset="0"/>
+                <a:cs typeface="Consolas" panose="020B0609020204030204" pitchFamily="49" charset="0"/>
+              </a:rPr>
+              <a:t>FAT = tableau d’un secteur</a:t>
+            </a:r>
+          </a:p>
+          <a:p>
+            <a:pPr lvl="1"/>
+            <a:r>
+              <a:rPr lang="fr-FR" dirty="0" smtClean="0">
+                <a:latin typeface="Consolas" panose="020B0609020204030204" pitchFamily="49" charset="0"/>
+                <a:cs typeface="Consolas" panose="020B0609020204030204" pitchFamily="49" charset="0"/>
+              </a:rPr>
+              <a:t>Indique le secteur suivant</a:t>
+            </a:r>
+          </a:p>
+          <a:p>
+            <a:r>
+              <a:rPr lang="fr-FR" sz="2800" dirty="0" smtClean="0">
+                <a:latin typeface="Consolas" panose="020B0609020204030204" pitchFamily="49" charset="0"/>
+                <a:cs typeface="Consolas" panose="020B0609020204030204" pitchFamily="49" charset="0"/>
+              </a:rPr>
+              <a:t>Fichier = liste chain</a:t>
+            </a:r>
+            <a:r>
+              <a:rPr lang="fr-FR" sz="2800" dirty="0">
+                <a:latin typeface="Consolas" panose="020B0609020204030204" pitchFamily="49" charset="0"/>
+                <a:cs typeface="Consolas" panose="020B0609020204030204" pitchFamily="49" charset="0"/>
+              </a:rPr>
+              <a:t>é</a:t>
+            </a:r>
+            <a:r>
+              <a:rPr lang="fr-FR" sz="2800" dirty="0" smtClean="0">
+                <a:latin typeface="Consolas" panose="020B0609020204030204" pitchFamily="49" charset="0"/>
+                <a:cs typeface="Consolas" panose="020B0609020204030204" pitchFamily="49" charset="0"/>
+              </a:rPr>
+              <a:t>e de secteurs</a:t>
+            </a:r>
+          </a:p>
+          <a:p>
+            <a:r>
+              <a:rPr lang="fr-FR" sz="2800" dirty="0" smtClean="0">
+                <a:latin typeface="Consolas" panose="020B0609020204030204" pitchFamily="49" charset="0"/>
+                <a:cs typeface="Consolas" panose="020B0609020204030204" pitchFamily="49" charset="0"/>
+              </a:rPr>
+              <a:t>Partition incluse a la compilation</a:t>
+            </a:r>
+            <a:endParaRPr lang="fr-FR" sz="2800" dirty="0">
+              <a:latin typeface="Consolas" panose="020B0609020204030204" pitchFamily="49" charset="0"/>
+              <a:cs typeface="Consolas" panose="020B0609020204030204" pitchFamily="49" charset="0"/>
+            </a:endParaRPr>
+          </a:p>
+        </p:txBody>
+      </p:sp>
+      <p:sp>
+        <p:nvSpPr>
+          <p:cNvPr id="5" name="Rectangle 4"/>
+          <p:cNvSpPr/>
+          <p:nvPr/>
+        </p:nvSpPr>
+        <p:spPr>
+          <a:xfrm>
+            <a:off x="367639" y="5138824"/>
+            <a:ext cx="1428783" cy="735308"/>
+          </a:xfrm>
+          <a:prstGeom prst="rect">
+            <a:avLst/>
+          </a:prstGeom>
+        </p:spPr>
+        <p:style>
+          <a:lnRef idx="1">
+            <a:schemeClr val="accent5"/>
+          </a:lnRef>
+          <a:fillRef idx="3">
+            <a:schemeClr val="accent5"/>
+          </a:fillRef>
+          <a:effectRef idx="2">
+            <a:schemeClr val="accent5"/>
+          </a:effectRef>
+          <a:fontRef idx="minor">
+            <a:schemeClr val="lt1"/>
+          </a:fontRef>
+        </p:style>
+        <p:txBody>
+          <a:bodyPr rtlCol="0" anchor="ctr"/>
+          <a:lstStyle/>
+          <a:p>
+            <a:pPr algn="ctr"/>
+            <a:r>
+              <a:rPr lang="fr-FR" dirty="0" smtClean="0"/>
+              <a:t>Boot</a:t>
+            </a:r>
+            <a:endParaRPr lang="fr-FR" dirty="0"/>
+          </a:p>
+        </p:txBody>
+      </p:sp>
+      <p:sp>
+        <p:nvSpPr>
+          <p:cNvPr id="6" name="Rectangle 5"/>
+          <p:cNvSpPr/>
+          <p:nvPr/>
+        </p:nvSpPr>
+        <p:spPr>
+          <a:xfrm>
+            <a:off x="1831845" y="5140820"/>
+            <a:ext cx="1428783" cy="735308"/>
+          </a:xfrm>
+          <a:prstGeom prst="rect">
+            <a:avLst/>
+          </a:prstGeom>
+        </p:spPr>
+        <p:style>
+          <a:lnRef idx="1">
+            <a:schemeClr val="accent6"/>
+          </a:lnRef>
+          <a:fillRef idx="3">
+            <a:schemeClr val="accent6"/>
+          </a:fillRef>
+          <a:effectRef idx="2">
+            <a:schemeClr val="accent6"/>
+          </a:effectRef>
+          <a:fontRef idx="minor">
+            <a:schemeClr val="lt1"/>
+          </a:fontRef>
+        </p:style>
+        <p:txBody>
+          <a:bodyPr rtlCol="0" anchor="ctr"/>
+          <a:lstStyle/>
+          <a:p>
+            <a:pPr algn="ctr"/>
+            <a:r>
+              <a:rPr lang="fr-FR" dirty="0" smtClean="0"/>
+              <a:t>FAT</a:t>
+            </a:r>
+            <a:endParaRPr lang="fr-FR" dirty="0"/>
+          </a:p>
+        </p:txBody>
+      </p:sp>
+      <p:sp>
+        <p:nvSpPr>
+          <p:cNvPr id="7" name="Rectangle 6"/>
+          <p:cNvSpPr/>
+          <p:nvPr/>
+        </p:nvSpPr>
+        <p:spPr>
+          <a:xfrm>
+            <a:off x="3296051" y="5142816"/>
+            <a:ext cx="1428783" cy="735308"/>
+          </a:xfrm>
+          <a:prstGeom prst="rect">
+            <a:avLst/>
+          </a:prstGeom>
+        </p:spPr>
+        <p:style>
+          <a:lnRef idx="1">
+            <a:schemeClr val="accent3"/>
+          </a:lnRef>
+          <a:fillRef idx="3">
+            <a:schemeClr val="accent3"/>
+          </a:fillRef>
+          <a:effectRef idx="2">
+            <a:schemeClr val="accent3"/>
+          </a:effectRef>
+          <a:fontRef idx="minor">
+            <a:schemeClr val="lt1"/>
+          </a:fontRef>
+        </p:style>
+        <p:txBody>
+          <a:bodyPr rtlCol="0" anchor="ctr"/>
+          <a:lstStyle/>
+          <a:p>
+            <a:pPr algn="ctr"/>
+            <a:r>
+              <a:rPr lang="fr-FR" dirty="0" err="1" smtClean="0"/>
+              <a:t>Root</a:t>
+            </a:r>
+            <a:r>
+              <a:rPr lang="fr-FR" dirty="0" smtClean="0"/>
+              <a:t> /</a:t>
+            </a:r>
+            <a:endParaRPr lang="fr-FR" dirty="0"/>
+          </a:p>
+        </p:txBody>
+      </p:sp>
+      <p:sp>
+        <p:nvSpPr>
+          <p:cNvPr id="8" name="Rectangle 7"/>
+          <p:cNvSpPr/>
+          <p:nvPr/>
+        </p:nvSpPr>
+        <p:spPr>
+          <a:xfrm>
+            <a:off x="4760262" y="5144812"/>
+            <a:ext cx="1030068" cy="735308"/>
+          </a:xfrm>
+          <a:prstGeom prst="rect">
+            <a:avLst/>
+          </a:prstGeom>
+        </p:spPr>
+        <p:style>
+          <a:lnRef idx="1">
+            <a:schemeClr val="accent1"/>
+          </a:lnRef>
+          <a:fillRef idx="3">
+            <a:schemeClr val="accent1"/>
+          </a:fillRef>
+          <a:effectRef idx="2">
+            <a:schemeClr val="accent1"/>
+          </a:effectRef>
+          <a:fontRef idx="minor">
+            <a:schemeClr val="lt1"/>
+          </a:fontRef>
+        </p:style>
+        <p:txBody>
+          <a:bodyPr rtlCol="0" anchor="ctr"/>
+          <a:lstStyle/>
+          <a:p>
+            <a:pPr algn="ctr"/>
+            <a:r>
+              <a:rPr lang="fr-FR" dirty="0" err="1" smtClean="0"/>
+              <a:t>Sector</a:t>
+            </a:r>
+            <a:r>
+              <a:rPr lang="fr-FR" dirty="0" smtClean="0"/>
+              <a:t> 1</a:t>
+            </a:r>
+            <a:endParaRPr lang="fr-FR" dirty="0"/>
+          </a:p>
+        </p:txBody>
+      </p:sp>
+      <p:sp>
+        <p:nvSpPr>
+          <p:cNvPr id="9" name="Rectangle 8"/>
+          <p:cNvSpPr/>
+          <p:nvPr/>
+        </p:nvSpPr>
+        <p:spPr>
+          <a:xfrm>
+            <a:off x="5823406" y="5146808"/>
+            <a:ext cx="1030068" cy="735308"/>
+          </a:xfrm>
+          <a:prstGeom prst="rect">
+            <a:avLst/>
+          </a:prstGeom>
+        </p:spPr>
+        <p:style>
+          <a:lnRef idx="1">
+            <a:schemeClr val="accent1"/>
+          </a:lnRef>
+          <a:fillRef idx="3">
+            <a:schemeClr val="accent1"/>
+          </a:fillRef>
+          <a:effectRef idx="2">
+            <a:schemeClr val="accent1"/>
+          </a:effectRef>
+          <a:fontRef idx="minor">
+            <a:schemeClr val="lt1"/>
+          </a:fontRef>
+        </p:style>
+        <p:txBody>
+          <a:bodyPr rtlCol="0" anchor="ctr"/>
+          <a:lstStyle/>
+          <a:p>
+            <a:pPr algn="ctr"/>
+            <a:r>
+              <a:rPr lang="fr-FR" dirty="0" err="1" smtClean="0"/>
+              <a:t>Sector</a:t>
+            </a:r>
+            <a:r>
+              <a:rPr lang="fr-FR" dirty="0" smtClean="0"/>
+              <a:t> 2</a:t>
+            </a:r>
+            <a:endParaRPr lang="fr-FR" dirty="0"/>
+          </a:p>
+        </p:txBody>
+      </p:sp>
+      <p:sp>
+        <p:nvSpPr>
+          <p:cNvPr id="10" name="Rectangle 9"/>
+          <p:cNvSpPr/>
+          <p:nvPr/>
+        </p:nvSpPr>
+        <p:spPr>
+          <a:xfrm>
+            <a:off x="6878195" y="5140448"/>
+            <a:ext cx="1030068" cy="735308"/>
+          </a:xfrm>
+          <a:prstGeom prst="rect">
+            <a:avLst/>
+          </a:prstGeom>
+        </p:spPr>
+        <p:style>
+          <a:lnRef idx="1">
+            <a:schemeClr val="accent1"/>
+          </a:lnRef>
+          <a:fillRef idx="3">
+            <a:schemeClr val="accent1"/>
+          </a:fillRef>
+          <a:effectRef idx="2">
+            <a:schemeClr val="accent1"/>
+          </a:effectRef>
+          <a:fontRef idx="minor">
+            <a:schemeClr val="lt1"/>
+          </a:fontRef>
+        </p:style>
+        <p:txBody>
+          <a:bodyPr rtlCol="0" anchor="ctr"/>
+          <a:lstStyle/>
+          <a:p>
+            <a:pPr algn="ctr"/>
+            <a:r>
+              <a:rPr lang="fr-FR" dirty="0" err="1" smtClean="0"/>
+              <a:t>Sector</a:t>
+            </a:r>
+            <a:r>
+              <a:rPr lang="fr-FR" dirty="0" smtClean="0"/>
+              <a:t> 3</a:t>
+            </a:r>
+            <a:endParaRPr lang="fr-FR" dirty="0"/>
+          </a:p>
+        </p:txBody>
+      </p:sp>
+    </p:spTree>
+    <p:extLst>
+      <p:ext uri="{BB962C8B-B14F-4D97-AF65-F5344CB8AC3E}">
+        <p14:creationId xmlns:p14="http://schemas.microsoft.com/office/powerpoint/2010/main" val="2213780484"/>
+      </p:ext>
+    </p:extLst>
+  </p:cSld>
+  <p:clrMapOvr>
+    <a:masterClrMapping/>
+  </p:clrMapOvr>
+  <p:timing>
+    <p:tnLst>
+      <p:par>
+        <p:cTn xmlns:p14="http://schemas.microsoft.com/office/powerpoint/2010/main" id="1" dur="indefinite" restart="never" nodeType="tmRoot"/>
+      </p:par>
+    </p:tnLst>
+  </p:timing>
+</p:sld>
+</file>
+
 <file path=ppt/slides/slide2.xml><?xml version="1.0" encoding="utf-8"?>
 <p:sld xmlns:a="http://schemas.openxmlformats.org/drawingml/2006/main" xmlns:r="http://schemas.openxmlformats.org/officeDocument/2006/relationships" xmlns:p="http://schemas.openxmlformats.org/presentationml/2006/main">
   <p:cSld>
@@ -7002,7 +7469,7 @@
   <p:timing>
     <p:tnLst>
       <p:par>
-        <p:cTn id="1" dur="indefinite" restart="never" nodeType="tmRoot"/>
+        <p:cTn xmlns:p14="http://schemas.microsoft.com/office/powerpoint/2010/main" id="1" dur="indefinite" restart="never" nodeType="tmRoot"/>
       </p:par>
     </p:tnLst>
   </p:timing>
@@ -7129,7 +7596,7 @@
   <p:timing>
     <p:tnLst>
       <p:par>
-        <p:cTn id="1" dur="indefinite" restart="never" nodeType="tmRoot"/>
+        <p:cTn xmlns:p14="http://schemas.microsoft.com/office/powerpoint/2010/main" id="1" dur="indefinite" restart="never" nodeType="tmRoot"/>
       </p:par>
     </p:tnLst>
   </p:timing>
@@ -7937,7 +8404,7 @@
   <p:timing>
     <p:tnLst>
       <p:par>
-        <p:cTn id="1" dur="indefinite" restart="never" nodeType="tmRoot">
+        <p:cTn xmlns:p14="http://schemas.microsoft.com/office/powerpoint/2010/main" id="1" dur="indefinite" restart="never" nodeType="tmRoot">
           <p:childTnLst>
             <p:seq concurrent="1" nextAc="seek">
               <p:cTn id="2" dur="indefinite" nodeType="mainSeq">
@@ -8361,7 +8828,7 @@
   <p:timing>
     <p:tnLst>
       <p:par>
-        <p:cTn id="1" dur="indefinite" restart="never" nodeType="tmRoot"/>
+        <p:cTn xmlns:p14="http://schemas.microsoft.com/office/powerpoint/2010/main" id="1" dur="indefinite" restart="never" nodeType="tmRoot"/>
       </p:par>
     </p:tnLst>
   </p:timing>
@@ -8497,7 +8964,6 @@
               <a:rPr lang="fr-FR" dirty="0" smtClean="0"/>
               <a:t>Architecture</a:t>
             </a:r>
-            <a:endParaRPr lang="fr-FR" dirty="0" smtClean="0"/>
           </a:p>
           <a:p>
             <a:pPr>
@@ -8524,7 +8990,6 @@
               <a:rPr lang="fr-FR" dirty="0" smtClean="0"/>
               <a:t>Ordonnanceurs</a:t>
             </a:r>
-            <a:endParaRPr lang="fr-FR" dirty="0" smtClean="0"/>
           </a:p>
           <a:p>
             <a:pPr>
@@ -8534,11 +8999,7 @@
             </a:pPr>
             <a:r>
               <a:rPr lang="fr-FR" dirty="0" smtClean="0"/>
-              <a:t>Allocateur </a:t>
-            </a:r>
-            <a:r>
-              <a:rPr lang="fr-FR" dirty="0" smtClean="0"/>
-              <a:t>mémoire</a:t>
+              <a:t>Allocateur mémoire</a:t>
             </a:r>
           </a:p>
           <a:p>
@@ -8584,7 +9045,7 @@
   <p:timing>
     <p:tnLst>
       <p:par>
-        <p:cTn id="1" dur="indefinite" restart="never" nodeType="tmRoot"/>
+        <p:cTn xmlns:p14="http://schemas.microsoft.com/office/powerpoint/2010/main" id="1" dur="indefinite" restart="never" nodeType="tmRoot"/>
       </p:par>
     </p:tnLst>
   </p:timing>
@@ -9200,7 +9661,7 @@
   <p:timing>
     <p:tnLst>
       <p:par>
-        <p:cTn id="1" dur="indefinite" restart="never" nodeType="tmRoot"/>
+        <p:cTn xmlns:p14="http://schemas.microsoft.com/office/powerpoint/2010/main" id="1" dur="indefinite" restart="never" nodeType="tmRoot"/>
       </p:par>
     </p:tnLst>
   </p:timing>
@@ -9270,15 +9731,7 @@
           <a:p>
             <a:r>
               <a:rPr lang="fr-FR" dirty="0" smtClean="0"/>
-              <a:t>Un </a:t>
-            </a:r>
-            <a:r>
-              <a:rPr lang="fr-FR" dirty="0" smtClean="0"/>
-              <a:t>PID </a:t>
-            </a:r>
-            <a:r>
-              <a:rPr lang="fr-FR" dirty="0" smtClean="0"/>
-              <a:t>unique</a:t>
+              <a:t>Un PID unique</a:t>
             </a:r>
           </a:p>
           <a:p>
@@ -9721,7 +10174,7 @@
   <p:timing>
     <p:tnLst>
       <p:par>
-        <p:cTn id="1" dur="indefinite" restart="never" nodeType="tmRoot"/>
+        <p:cTn xmlns:p14="http://schemas.microsoft.com/office/powerpoint/2010/main" id="1" dur="indefinite" restart="never" nodeType="tmRoot"/>
       </p:par>
     </p:tnLst>
   </p:timing>
@@ -10405,7 +10858,7 @@
   <p:timing>
     <p:tnLst>
       <p:par>
-        <p:cTn id="1" dur="indefinite" restart="never" nodeType="tmRoot">
+        <p:cTn xmlns:p14="http://schemas.microsoft.com/office/powerpoint/2010/main" id="1" dur="indefinite" restart="never" nodeType="tmRoot">
           <p:childTnLst>
             <p:seq concurrent="1" nextAc="seek">
               <p:cTn id="2" dur="indefinite" nodeType="mainSeq">

</xml_diff>

<commit_message>
SEA PPT minor changes
</commit_message>
<xml_diff>
--- a/ppt/presentation.pptx
+++ b/ppt/presentation.pptx
@@ -3606,7 +3606,6 @@
               <a:rPr lang="fr-FR" dirty="0" smtClean="0"/>
               <a:t>LED : deux processus</a:t>
             </a:r>
-            <a:endParaRPr lang="fr-FR" dirty="0" smtClean="0"/>
           </a:p>
           <a:p>
             <a:pPr>
@@ -3618,7 +3617,6 @@
               <a:rPr lang="fr-FR" dirty="0" smtClean="0"/>
               <a:t>Philosophes</a:t>
             </a:r>
-            <a:endParaRPr lang="fr-FR" dirty="0" smtClean="0"/>
           </a:p>
         </p:txBody>
       </p:sp>
@@ -4261,7 +4259,7 @@
           <a:p>
             <a:r>
               <a:rPr lang="fr-FR" sz="3200" dirty="0" smtClean="0"/>
-              <a:t>P1</a:t>
+              <a:t>P5</a:t>
             </a:r>
             <a:endParaRPr lang="fr-FR" sz="3200" dirty="0"/>
           </a:p>
@@ -4291,7 +4289,7 @@
           <a:p>
             <a:r>
               <a:rPr lang="fr-FR" sz="3200" dirty="0" smtClean="0"/>
-              <a:t>P4</a:t>
+              <a:t>P3</a:t>
             </a:r>
             <a:endParaRPr lang="fr-FR" sz="3200" dirty="0"/>
           </a:p>
@@ -4321,7 +4319,7 @@
           <a:p>
             <a:r>
               <a:rPr lang="fr-FR" sz="3200" dirty="0" smtClean="0"/>
-              <a:t>P3</a:t>
+              <a:t>P2</a:t>
             </a:r>
             <a:endParaRPr lang="fr-FR" sz="3200" dirty="0"/>
           </a:p>
@@ -4351,7 +4349,7 @@
           <a:p>
             <a:r>
               <a:rPr lang="fr-FR" sz="3200" dirty="0" smtClean="0"/>
-              <a:t>P2</a:t>
+              <a:t>P1</a:t>
             </a:r>
             <a:endParaRPr lang="fr-FR" sz="3200" dirty="0"/>
           </a:p>
@@ -4381,7 +4379,7 @@
           <a:p>
             <a:r>
               <a:rPr lang="fr-FR" sz="3200" dirty="0" smtClean="0"/>
-              <a:t>P5</a:t>
+              <a:t>P4</a:t>
             </a:r>
             <a:endParaRPr lang="fr-FR" sz="3200" dirty="0"/>
           </a:p>
@@ -4741,7 +4739,7 @@
         </p:nvSpPr>
         <p:spPr>
           <a:xfrm rot="1579794">
-            <a:off x="6345856" y="3935272"/>
+            <a:off x="4197000" y="5498658"/>
             <a:ext cx="534657" cy="547418"/>
           </a:xfrm>
           <a:prstGeom prst="ellipse">
@@ -5023,21 +5021,162 @@
                             </p:childTnLst>
                           </p:cTn>
                         </p:par>
+                      </p:childTnLst>
+                    </p:cTn>
+                  </p:par>
+                  <p:par>
+                    <p:cTn id="24" fill="hold">
+                      <p:stCondLst>
+                        <p:cond delay="indefinite"/>
+                      </p:stCondLst>
+                      <p:childTnLst>
                         <p:par>
-                          <p:cTn id="24" fill="hold">
+                          <p:cTn id="25" fill="hold">
                             <p:stCondLst>
-                              <p:cond delay="6500"/>
+                              <p:cond delay="0"/>
                             </p:stCondLst>
                             <p:childTnLst>
                               <p:par>
-                                <p:cTn id="25" presetID="10" presetClass="entr" presetSubtype="0" fill="hold" grpId="0" nodeType="afterEffect">
+                                <p:cTn id="26" presetID="10" presetClass="entr" presetSubtype="0" fill="hold" grpId="0" nodeType="clickEffect">
+                                  <p:stCondLst>
+                                    <p:cond delay="0"/>
+                                  </p:stCondLst>
+                                  <p:childTnLst>
+                                    <p:set>
+                                      <p:cBhvr>
+                                        <p:cTn id="27" dur="1" fill="hold">
+                                          <p:stCondLst>
+                                            <p:cond delay="0"/>
+                                          </p:stCondLst>
+                                        </p:cTn>
+                                        <p:tgtEl>
+                                          <p:spTgt spid="24"/>
+                                        </p:tgtEl>
+                                        <p:attrNameLst>
+                                          <p:attrName>style.visibility</p:attrName>
+                                        </p:attrNameLst>
+                                      </p:cBhvr>
+                                      <p:to>
+                                        <p:strVal val="visible"/>
+                                      </p:to>
+                                    </p:set>
+                                    <p:animEffect transition="in" filter="fade">
+                                      <p:cBhvr>
+                                        <p:cTn id="28" dur="500"/>
+                                        <p:tgtEl>
+                                          <p:spTgt spid="24"/>
+                                        </p:tgtEl>
+                                      </p:cBhvr>
+                                    </p:animEffect>
+                                  </p:childTnLst>
+                                </p:cTn>
+                              </p:par>
+                            </p:childTnLst>
+                          </p:cTn>
+                        </p:par>
+                        <p:par>
+                          <p:cTn id="29" fill="hold">
+                            <p:stCondLst>
+                              <p:cond delay="500"/>
+                            </p:stCondLst>
+                            <p:childTnLst>
+                              <p:par>
+                                <p:cTn id="30" presetID="10" presetClass="entr" presetSubtype="0" fill="hold" grpId="0" nodeType="afterEffect">
                                   <p:stCondLst>
                                     <p:cond delay="1000"/>
                                   </p:stCondLst>
                                   <p:childTnLst>
                                     <p:set>
                                       <p:cBhvr>
-                                        <p:cTn id="26" dur="1" fill="hold">
+                                        <p:cTn id="31" dur="1" fill="hold">
+                                          <p:stCondLst>
+                                            <p:cond delay="0"/>
+                                          </p:stCondLst>
+                                        </p:cTn>
+                                        <p:tgtEl>
+                                          <p:spTgt spid="25"/>
+                                        </p:tgtEl>
+                                        <p:attrNameLst>
+                                          <p:attrName>style.visibility</p:attrName>
+                                        </p:attrNameLst>
+                                      </p:cBhvr>
+                                      <p:to>
+                                        <p:strVal val="visible"/>
+                                      </p:to>
+                                    </p:set>
+                                    <p:animEffect transition="in" filter="fade">
+                                      <p:cBhvr>
+                                        <p:cTn id="32" dur="500"/>
+                                        <p:tgtEl>
+                                          <p:spTgt spid="25"/>
+                                        </p:tgtEl>
+                                      </p:cBhvr>
+                                    </p:animEffect>
+                                  </p:childTnLst>
+                                </p:cTn>
+                              </p:par>
+                            </p:childTnLst>
+                          </p:cTn>
+                        </p:par>
+                        <p:par>
+                          <p:cTn id="33" fill="hold">
+                            <p:stCondLst>
+                              <p:cond delay="2000"/>
+                            </p:stCondLst>
+                            <p:childTnLst>
+                              <p:par>
+                                <p:cTn id="34" presetID="10" presetClass="entr" presetSubtype="0" fill="hold" grpId="0" nodeType="afterEffect">
+                                  <p:stCondLst>
+                                    <p:cond delay="1000"/>
+                                  </p:stCondLst>
+                                  <p:childTnLst>
+                                    <p:set>
+                                      <p:cBhvr>
+                                        <p:cTn id="35" dur="1" fill="hold">
+                                          <p:stCondLst>
+                                            <p:cond delay="0"/>
+                                          </p:stCondLst>
+                                        </p:cTn>
+                                        <p:tgtEl>
+                                          <p:spTgt spid="26"/>
+                                        </p:tgtEl>
+                                        <p:attrNameLst>
+                                          <p:attrName>style.visibility</p:attrName>
+                                        </p:attrNameLst>
+                                      </p:cBhvr>
+                                      <p:to>
+                                        <p:strVal val="visible"/>
+                                      </p:to>
+                                    </p:set>
+                                    <p:animEffect transition="in" filter="fade">
+                                      <p:cBhvr>
+                                        <p:cTn id="36" dur="500"/>
+                                        <p:tgtEl>
+                                          <p:spTgt spid="26"/>
+                                        </p:tgtEl>
+                                      </p:cBhvr>
+                                    </p:animEffect>
+                                  </p:childTnLst>
+                                </p:cTn>
+                              </p:par>
+                            </p:childTnLst>
+                          </p:cTn>
+                        </p:par>
+                        <p:par>
+                          <p:cTn id="37" fill="hold">
+                            <p:stCondLst>
+                              <p:cond delay="3500"/>
+                            </p:stCondLst>
+                            <p:childTnLst>
+                              <p:par>
+                                <p:cTn id="38" presetID="10" presetClass="entr" presetSubtype="0" fill="hold" grpId="0" nodeType="afterEffect">
+                                  <p:stCondLst>
+                                    <p:cond delay="1000"/>
+                                  </p:stCondLst>
+                                  <p:childTnLst>
+                                    <p:set>
+                                      <p:cBhvr>
+                                        <p:cTn id="39" dur="1" fill="hold">
                                           <p:stCondLst>
                                             <p:cond delay="0"/>
                                           </p:stCondLst>
@@ -5055,7 +5194,7 @@
                                     </p:set>
                                     <p:animEffect transition="in" filter="fade">
                                       <p:cBhvr>
-                                        <p:cTn id="27" dur="500"/>
+                                        <p:cTn id="40" dur="500"/>
                                         <p:tgtEl>
                                           <p:spTgt spid="6"/>
                                         </p:tgtEl>
@@ -5068,20 +5207,20 @@
                           </p:cTn>
                         </p:par>
                         <p:par>
-                          <p:cTn id="28" fill="hold">
+                          <p:cTn id="41" fill="hold">
                             <p:stCondLst>
-                              <p:cond delay="8000"/>
+                              <p:cond delay="5000"/>
                             </p:stCondLst>
                             <p:childTnLst>
                               <p:par>
-                                <p:cTn id="29" presetID="10" presetClass="entr" presetSubtype="0" fill="hold" grpId="0" nodeType="afterEffect">
+                                <p:cTn id="42" presetID="10" presetClass="entr" presetSubtype="0" fill="hold" grpId="0" nodeType="afterEffect">
                                   <p:stCondLst>
                                     <p:cond delay="1000"/>
                                   </p:stCondLst>
                                   <p:childTnLst>
                                     <p:set>
                                       <p:cBhvr>
-                                        <p:cTn id="30" dur="1" fill="hold">
+                                        <p:cTn id="43" dur="1" fill="hold">
                                           <p:stCondLst>
                                             <p:cond delay="0"/>
                                           </p:stCondLst>
@@ -5099,7 +5238,7 @@
                                     </p:set>
                                     <p:animEffect transition="in" filter="fade">
                                       <p:cBhvr>
-                                        <p:cTn id="31" dur="500"/>
+                                        <p:cTn id="44" dur="500"/>
                                         <p:tgtEl>
                                           <p:spTgt spid="23"/>
                                         </p:tgtEl>
@@ -5108,149 +5247,8 @@
                                   </p:childTnLst>
                                 </p:cTn>
                               </p:par>
-                            </p:childTnLst>
-                          </p:cTn>
-                        </p:par>
-                        <p:par>
-                          <p:cTn id="32" fill="hold">
-                            <p:stCondLst>
-                              <p:cond delay="9500"/>
-                            </p:stCondLst>
-                            <p:childTnLst>
                               <p:par>
-                                <p:cTn id="33" presetID="10" presetClass="entr" presetSubtype="0" fill="hold" grpId="0" nodeType="afterEffect">
-                                  <p:stCondLst>
-                                    <p:cond delay="1000"/>
-                                  </p:stCondLst>
-                                  <p:childTnLst>
-                                    <p:set>
-                                      <p:cBhvr>
-                                        <p:cTn id="34" dur="1" fill="hold">
-                                          <p:stCondLst>
-                                            <p:cond delay="0"/>
-                                          </p:stCondLst>
-                                        </p:cTn>
-                                        <p:tgtEl>
-                                          <p:spTgt spid="24"/>
-                                        </p:tgtEl>
-                                        <p:attrNameLst>
-                                          <p:attrName>style.visibility</p:attrName>
-                                        </p:attrNameLst>
-                                      </p:cBhvr>
-                                      <p:to>
-                                        <p:strVal val="visible"/>
-                                      </p:to>
-                                    </p:set>
-                                    <p:animEffect transition="in" filter="fade">
-                                      <p:cBhvr>
-                                        <p:cTn id="35" dur="500"/>
-                                        <p:tgtEl>
-                                          <p:spTgt spid="24"/>
-                                        </p:tgtEl>
-                                      </p:cBhvr>
-                                    </p:animEffect>
-                                  </p:childTnLst>
-                                </p:cTn>
-                              </p:par>
-                            </p:childTnLst>
-                          </p:cTn>
-                        </p:par>
-                        <p:par>
-                          <p:cTn id="36" fill="hold">
-                            <p:stCondLst>
-                              <p:cond delay="11000"/>
-                            </p:stCondLst>
-                            <p:childTnLst>
-                              <p:par>
-                                <p:cTn id="37" presetID="10" presetClass="entr" presetSubtype="0" fill="hold" grpId="0" nodeType="afterEffect">
-                                  <p:stCondLst>
-                                    <p:cond delay="1000"/>
-                                  </p:stCondLst>
-                                  <p:childTnLst>
-                                    <p:set>
-                                      <p:cBhvr>
-                                        <p:cTn id="38" dur="1" fill="hold">
-                                          <p:stCondLst>
-                                            <p:cond delay="0"/>
-                                          </p:stCondLst>
-                                        </p:cTn>
-                                        <p:tgtEl>
-                                          <p:spTgt spid="25"/>
-                                        </p:tgtEl>
-                                        <p:attrNameLst>
-                                          <p:attrName>style.visibility</p:attrName>
-                                        </p:attrNameLst>
-                                      </p:cBhvr>
-                                      <p:to>
-                                        <p:strVal val="visible"/>
-                                      </p:to>
-                                    </p:set>
-                                    <p:animEffect transition="in" filter="fade">
-                                      <p:cBhvr>
-                                        <p:cTn id="39" dur="500"/>
-                                        <p:tgtEl>
-                                          <p:spTgt spid="25"/>
-                                        </p:tgtEl>
-                                      </p:cBhvr>
-                                    </p:animEffect>
-                                  </p:childTnLst>
-                                </p:cTn>
-                              </p:par>
-                            </p:childTnLst>
-                          </p:cTn>
-                        </p:par>
-                        <p:par>
-                          <p:cTn id="40" fill="hold">
-                            <p:stCondLst>
-                              <p:cond delay="12500"/>
-                            </p:stCondLst>
-                            <p:childTnLst>
-                              <p:par>
-                                <p:cTn id="41" presetID="10" presetClass="entr" presetSubtype="0" fill="hold" grpId="0" nodeType="afterEffect">
-                                  <p:stCondLst>
-                                    <p:cond delay="1000"/>
-                                  </p:stCondLst>
-                                  <p:childTnLst>
-                                    <p:set>
-                                      <p:cBhvr>
-                                        <p:cTn id="42" dur="1" fill="hold">
-                                          <p:stCondLst>
-                                            <p:cond delay="0"/>
-                                          </p:stCondLst>
-                                        </p:cTn>
-                                        <p:tgtEl>
-                                          <p:spTgt spid="26"/>
-                                        </p:tgtEl>
-                                        <p:attrNameLst>
-                                          <p:attrName>style.visibility</p:attrName>
-                                        </p:attrNameLst>
-                                      </p:cBhvr>
-                                      <p:to>
-                                        <p:strVal val="visible"/>
-                                      </p:to>
-                                    </p:set>
-                                    <p:animEffect transition="in" filter="fade">
-                                      <p:cBhvr>
-                                        <p:cTn id="43" dur="500"/>
-                                        <p:tgtEl>
-                                          <p:spTgt spid="26"/>
-                                        </p:tgtEl>
-                                      </p:cBhvr>
-                                    </p:animEffect>
-                                  </p:childTnLst>
-                                </p:cTn>
-                              </p:par>
-                            </p:childTnLst>
-                          </p:cTn>
-                        </p:par>
-                        <p:par>
-                          <p:cTn id="44" fill="hold">
-                            <p:stCondLst>
-                              <p:cond delay="14000"/>
-                            </p:stCondLst>
-                            <p:childTnLst>
-                              <p:par>
-                                <p:cTn id="45" presetID="10" presetClass="entr" presetSubtype="0" fill="hold" grpId="0" nodeType="afterEffect">
+                                <p:cTn id="45" presetID="10" presetClass="entr" presetSubtype="0" fill="hold" grpId="0" nodeType="withEffect">
                                   <p:stCondLst>
                                     <p:cond delay="1000"/>
                                   </p:stCondLst>
@@ -7471,6 +7469,9 @@
           <a:lstStyle/>
           <a:p>
             <a:pPr marL="457200" indent="-457200">
+              <a:lnSpc>
+                <a:spcPct val="250000"/>
+              </a:lnSpc>
               <a:buFont typeface="+mj-lt"/>
               <a:buAutoNum type="arabicPeriod"/>
             </a:pPr>
@@ -7481,6 +7482,9 @@
           </a:p>
           <a:p>
             <a:pPr marL="457200" indent="-457200">
+              <a:lnSpc>
+                <a:spcPct val="250000"/>
+              </a:lnSpc>
               <a:buFont typeface="+mj-lt"/>
               <a:buAutoNum type="arabicPeriod"/>
             </a:pPr>
@@ -7492,6 +7496,9 @@
           </a:p>
           <a:p>
             <a:pPr marL="457200" indent="-457200">
+              <a:lnSpc>
+                <a:spcPct val="250000"/>
+              </a:lnSpc>
               <a:buFont typeface="+mj-lt"/>
               <a:buAutoNum type="arabicPeriod"/>
             </a:pPr>
@@ -7628,7 +7635,7 @@
           <a:p>
             <a:r>
               <a:rPr lang="fr-FR" dirty="0" smtClean="0"/>
-              <a:t>Tous disponibles à l’exécution !</a:t>
+              <a:t>Tous disponibles à l’exécution </a:t>
             </a:r>
           </a:p>
           <a:p>
@@ -7692,11 +7699,7 @@
           <a:p>
             <a:r>
               <a:rPr lang="fr-FR" dirty="0" smtClean="0"/>
-              <a:t>Ordonnanceur </a:t>
-            </a:r>
-            <a:r>
-              <a:rPr lang="fr-FR" dirty="0" smtClean="0"/>
-              <a:t>Round-Robin</a:t>
+              <a:t>Ordonnanceur Round-Robin</a:t>
             </a:r>
             <a:endParaRPr lang="fr-FR" dirty="0"/>
           </a:p>
@@ -7962,11 +7965,7 @@
             </a:r>
             <a:r>
               <a:rPr lang="fr-FR" i="1" dirty="0" smtClean="0"/>
-              <a:t> </a:t>
-            </a:r>
-            <a:r>
-              <a:rPr lang="fr-FR" i="1" dirty="0" smtClean="0"/>
-              <a:t>time</a:t>
+              <a:t> time</a:t>
             </a:r>
             <a:r>
               <a:rPr lang="fr-FR" dirty="0" smtClean="0"/>
@@ -8710,13 +8709,8 @@
             </a:r>
             <a:r>
               <a:rPr lang="fr-FR" dirty="0" smtClean="0"/>
-              <a:t> potentiellement très </a:t>
-            </a:r>
-            <a:r>
-              <a:rPr lang="fr-FR" dirty="0" smtClean="0"/>
-              <a:t>grands</a:t>
-            </a:r>
-            <a:endParaRPr lang="fr-FR" dirty="0" smtClean="0"/>
+              <a:t> potentiellement très grands</a:t>
+            </a:r>
           </a:p>
           <a:p>
             <a:r>
@@ -9026,13 +9020,8 @@
             </a:r>
             <a:r>
               <a:rPr lang="fr-FR" dirty="0" smtClean="0"/>
-              <a:t> Control </a:t>
-            </a:r>
-            <a:r>
-              <a:rPr lang="fr-FR" dirty="0" smtClean="0"/>
-              <a:t>Block</a:t>
-            </a:r>
-            <a:endParaRPr lang="fr-FR" dirty="0" smtClean="0"/>
+              <a:t> Control Block</a:t>
+            </a:r>
           </a:p>
           <a:p>
             <a:pPr>

</xml_diff>